<commit_message>
completed rbn_ent logic and all holding & worker logic
</commit_message>
<xml_diff>
--- a/puzzle9_resourceGuide.pptx
+++ b/puzzle9_resourceGuide.pptx
@@ -12,6 +12,7 @@
     <p:sldId id="261" r:id="rId6"/>
     <p:sldId id="262" r:id="rId7"/>
     <p:sldId id="263" r:id="rId8"/>
+    <p:sldId id="264" r:id="rId9"/>
   </p:sldIdLst>
   <p:sldSz cx="9144000" cy="6858000" type="screen4x3"/>
   <p:notesSz cx="6858000" cy="9144000"/>
@@ -294,7 +295,7 @@
           <a:p>
             <a:fld id="{83C2B043-E5D7-564F-B47B-C0FE35424682}" type="datetimeFigureOut">
               <a:rPr lang="en-US" smtClean="0"/>
-              <a:t>10/24/15</a:t>
+              <a:t>11/7/15</a:t>
             </a:fld>
             <a:endParaRPr lang="en-US"/>
           </a:p>
@@ -464,7 +465,7 @@
           <a:p>
             <a:fld id="{83C2B043-E5D7-564F-B47B-C0FE35424682}" type="datetimeFigureOut">
               <a:rPr lang="en-US" smtClean="0"/>
-              <a:t>10/24/15</a:t>
+              <a:t>11/7/15</a:t>
             </a:fld>
             <a:endParaRPr lang="en-US"/>
           </a:p>
@@ -644,7 +645,7 @@
           <a:p>
             <a:fld id="{83C2B043-E5D7-564F-B47B-C0FE35424682}" type="datetimeFigureOut">
               <a:rPr lang="en-US" smtClean="0"/>
-              <a:t>10/24/15</a:t>
+              <a:t>11/7/15</a:t>
             </a:fld>
             <a:endParaRPr lang="en-US"/>
           </a:p>
@@ -814,7 +815,7 @@
           <a:p>
             <a:fld id="{83C2B043-E5D7-564F-B47B-C0FE35424682}" type="datetimeFigureOut">
               <a:rPr lang="en-US" smtClean="0"/>
-              <a:t>10/24/15</a:t>
+              <a:t>11/7/15</a:t>
             </a:fld>
             <a:endParaRPr lang="en-US"/>
           </a:p>
@@ -1060,7 +1061,7 @@
           <a:p>
             <a:fld id="{83C2B043-E5D7-564F-B47B-C0FE35424682}" type="datetimeFigureOut">
               <a:rPr lang="en-US" smtClean="0"/>
-              <a:t>10/24/15</a:t>
+              <a:t>11/7/15</a:t>
             </a:fld>
             <a:endParaRPr lang="en-US"/>
           </a:p>
@@ -1348,7 +1349,7 @@
           <a:p>
             <a:fld id="{83C2B043-E5D7-564F-B47B-C0FE35424682}" type="datetimeFigureOut">
               <a:rPr lang="en-US" smtClean="0"/>
-              <a:t>10/24/15</a:t>
+              <a:t>11/7/15</a:t>
             </a:fld>
             <a:endParaRPr lang="en-US"/>
           </a:p>
@@ -1770,7 +1771,7 @@
           <a:p>
             <a:fld id="{83C2B043-E5D7-564F-B47B-C0FE35424682}" type="datetimeFigureOut">
               <a:rPr lang="en-US" smtClean="0"/>
-              <a:t>10/24/15</a:t>
+              <a:t>11/7/15</a:t>
             </a:fld>
             <a:endParaRPr lang="en-US"/>
           </a:p>
@@ -1888,7 +1889,7 @@
           <a:p>
             <a:fld id="{83C2B043-E5D7-564F-B47B-C0FE35424682}" type="datetimeFigureOut">
               <a:rPr lang="en-US" smtClean="0"/>
-              <a:t>10/24/15</a:t>
+              <a:t>11/7/15</a:t>
             </a:fld>
             <a:endParaRPr lang="en-US"/>
           </a:p>
@@ -1983,7 +1984,7 @@
           <a:p>
             <a:fld id="{83C2B043-E5D7-564F-B47B-C0FE35424682}" type="datetimeFigureOut">
               <a:rPr lang="en-US" smtClean="0"/>
-              <a:t>10/24/15</a:t>
+              <a:t>11/7/15</a:t>
             </a:fld>
             <a:endParaRPr lang="en-US"/>
           </a:p>
@@ -2260,7 +2261,7 @@
           <a:p>
             <a:fld id="{83C2B043-E5D7-564F-B47B-C0FE35424682}" type="datetimeFigureOut">
               <a:rPr lang="en-US" smtClean="0"/>
-              <a:t>10/24/15</a:t>
+              <a:t>11/7/15</a:t>
             </a:fld>
             <a:endParaRPr lang="en-US"/>
           </a:p>
@@ -2513,7 +2514,7 @@
           <a:p>
             <a:fld id="{83C2B043-E5D7-564F-B47B-C0FE35424682}" type="datetimeFigureOut">
               <a:rPr lang="en-US" smtClean="0"/>
-              <a:t>10/24/15</a:t>
+              <a:t>11/7/15</a:t>
             </a:fld>
             <a:endParaRPr lang="en-US"/>
           </a:p>
@@ -2726,7 +2727,7 @@
           <a:p>
             <a:fld id="{83C2B043-E5D7-564F-B47B-C0FE35424682}" type="datetimeFigureOut">
               <a:rPr lang="en-US" smtClean="0"/>
-              <a:t>10/24/15</a:t>
+              <a:t>11/7/15</a:t>
             </a:fld>
             <a:endParaRPr lang="en-US"/>
           </a:p>
@@ -6264,7 +6265,7 @@
         <p:spPr>
           <a:xfrm>
             <a:off x="2751415" y="2957387"/>
-            <a:ext cx="820545" cy="246221"/>
+            <a:ext cx="521359" cy="246221"/>
           </a:xfrm>
           <a:prstGeom prst="rect">
             <a:avLst/>
@@ -6279,7 +6280,37 @@
           <a:p>
             <a:r>
               <a:rPr lang="en-US" sz="1000" dirty="0" smtClean="0"/>
-              <a:t>Identity info</a:t>
+              <a:t>emails</a:t>
+            </a:r>
+            <a:endParaRPr lang="en-US" sz="1000" dirty="0"/>
+          </a:p>
+        </p:txBody>
+      </p:sp>
+      <p:sp>
+        <p:nvSpPr>
+          <p:cNvPr id="91" name="TextBox 90"/>
+          <p:cNvSpPr txBox="1"/>
+          <p:nvPr/>
+        </p:nvSpPr>
+        <p:spPr>
+          <a:xfrm>
+            <a:off x="3145778" y="3222995"/>
+            <a:ext cx="735322" cy="246221"/>
+          </a:xfrm>
+          <a:prstGeom prst="rect">
+            <a:avLst/>
+          </a:prstGeom>
+          <a:noFill/>
+        </p:spPr>
+        <p:txBody>
+          <a:bodyPr wrap="none" rtlCol="0">
+            <a:spAutoFit/>
+          </a:bodyPr>
+          <a:lstStyle/>
+          <a:p>
+            <a:r>
+              <a:rPr lang="en-US" sz="1000" dirty="0" smtClean="0"/>
+              <a:t>passwords</a:t>
             </a:r>
             <a:endParaRPr lang="en-US" sz="1000" dirty="0"/>
           </a:p>
@@ -6287,14 +6318,16 @@
       </p:sp>
       <p:cxnSp>
         <p:nvCxnSpPr>
-          <p:cNvPr id="89" name="Straight Arrow Connector 88"/>
-          <p:cNvCxnSpPr/>
+          <p:cNvPr id="108" name="Straight Arrow Connector 107"/>
+          <p:cNvCxnSpPr>
+            <a:endCxn id="16" idx="2"/>
+          </p:cNvCxnSpPr>
           <p:nvPr/>
         </p:nvCxnSpPr>
         <p:spPr>
           <a:xfrm flipH="1" flipV="1">
-            <a:off x="2704106" y="3272947"/>
-            <a:ext cx="451900" cy="1115549"/>
+            <a:off x="5482319" y="3715437"/>
+            <a:ext cx="22874" cy="628951"/>
           </a:xfrm>
           <a:prstGeom prst="straightConnector1">
             <a:avLst/>
@@ -6323,14 +6356,14 @@
       </p:cxnSp>
       <p:sp>
         <p:nvSpPr>
-          <p:cNvPr id="91" name="TextBox 90"/>
+          <p:cNvPr id="114" name="TextBox 113"/>
           <p:cNvSpPr txBox="1"/>
           <p:nvPr/>
         </p:nvSpPr>
         <p:spPr>
           <a:xfrm>
-            <a:off x="3145778" y="3222995"/>
-            <a:ext cx="735322" cy="246221"/>
+            <a:off x="5044659" y="3818604"/>
+            <a:ext cx="412781" cy="246221"/>
           </a:xfrm>
           <a:prstGeom prst="rect">
             <a:avLst/>
@@ -6345,7 +6378,7 @@
           <a:p>
             <a:r>
               <a:rPr lang="en-US" sz="1000" dirty="0" smtClean="0"/>
-              <a:t>passwords</a:t>
+              <a:t>bots</a:t>
             </a:r>
             <a:endParaRPr lang="en-US" sz="1000" dirty="0"/>
           </a:p>
@@ -6353,16 +6386,16 @@
       </p:sp>
       <p:cxnSp>
         <p:nvCxnSpPr>
-          <p:cNvPr id="108" name="Straight Arrow Connector 107"/>
+          <p:cNvPr id="115" name="Straight Arrow Connector 114"/>
           <p:cNvCxnSpPr>
-            <a:endCxn id="16" idx="2"/>
+            <a:endCxn id="114" idx="2"/>
           </p:cNvCxnSpPr>
           <p:nvPr/>
         </p:nvCxnSpPr>
         <p:spPr>
           <a:xfrm flipH="1" flipV="1">
-            <a:off x="5482319" y="3715437"/>
-            <a:ext cx="22874" cy="628951"/>
+            <a:off x="5251050" y="4064825"/>
+            <a:ext cx="50075" cy="403053"/>
           </a:xfrm>
           <a:prstGeom prst="straightConnector1">
             <a:avLst/>
@@ -6391,14 +6424,14 @@
       </p:cxnSp>
       <p:sp>
         <p:nvSpPr>
-          <p:cNvPr id="114" name="TextBox 113"/>
+          <p:cNvPr id="117" name="TextBox 116"/>
           <p:cNvSpPr txBox="1"/>
           <p:nvPr/>
         </p:nvSpPr>
         <p:spPr>
           <a:xfrm>
-            <a:off x="3455676" y="3607561"/>
-            <a:ext cx="412781" cy="246221"/>
+            <a:off x="4644247" y="5367348"/>
+            <a:ext cx="618917" cy="246221"/>
           </a:xfrm>
           <a:prstGeom prst="rect">
             <a:avLst/>
@@ -6412,8 +6445,48 @@
           <a:lstStyle/>
           <a:p>
             <a:r>
+              <a:rPr lang="en-US" sz="1000" dirty="0" err="1"/>
+              <a:t>b</a:t>
+            </a:r>
+            <a:r>
+              <a:rPr lang="en-US" sz="1000" dirty="0" err="1" smtClean="0"/>
+              <a:t>tc+pills</a:t>
+            </a:r>
+            <a:endParaRPr lang="en-US" sz="1000" dirty="0"/>
+          </a:p>
+        </p:txBody>
+      </p:sp>
+      <p:sp>
+        <p:nvSpPr>
+          <p:cNvPr id="118" name="TextBox 117"/>
+          <p:cNvSpPr txBox="1"/>
+          <p:nvPr/>
+        </p:nvSpPr>
+        <p:spPr>
+          <a:xfrm>
+            <a:off x="5562656" y="3720705"/>
+            <a:ext cx="746969" cy="400110"/>
+          </a:xfrm>
+          <a:prstGeom prst="rect">
+            <a:avLst/>
+          </a:prstGeom>
+          <a:noFill/>
+        </p:spPr>
+        <p:txBody>
+          <a:bodyPr wrap="none" rtlCol="0">
+            <a:spAutoFit/>
+          </a:bodyPr>
+          <a:lstStyle/>
+          <a:p>
+            <a:r>
               <a:rPr lang="en-US" sz="1000" dirty="0" smtClean="0"/>
-              <a:t>bots</a:t>
+              <a:t>Diplomatic </a:t>
+            </a:r>
+          </a:p>
+          <a:p>
+            <a:r>
+              <a:rPr lang="en-US" sz="1000" dirty="0" err="1" smtClean="0"/>
+              <a:t>intel</a:t>
             </a:r>
             <a:endParaRPr lang="en-US" sz="1000" dirty="0"/>
           </a:p>
@@ -6421,14 +6494,14 @@
       </p:sp>
       <p:cxnSp>
         <p:nvCxnSpPr>
-          <p:cNvPr id="115" name="Straight Arrow Connector 114"/>
+          <p:cNvPr id="119" name="Straight Arrow Connector 118"/>
           <p:cNvCxnSpPr/>
           <p:nvPr/>
         </p:nvCxnSpPr>
         <p:spPr>
           <a:xfrm flipV="1">
-            <a:off x="3143047" y="3853782"/>
-            <a:ext cx="312629" cy="547448"/>
+            <a:off x="5787449" y="4171361"/>
+            <a:ext cx="0" cy="242369"/>
           </a:xfrm>
           <a:prstGeom prst="straightConnector1">
             <a:avLst/>
@@ -6457,14 +6530,14 @@
       </p:cxnSp>
       <p:sp>
         <p:nvSpPr>
-          <p:cNvPr id="117" name="TextBox 116"/>
+          <p:cNvPr id="123" name="TextBox 122"/>
           <p:cNvSpPr txBox="1"/>
           <p:nvPr/>
         </p:nvSpPr>
         <p:spPr>
           <a:xfrm>
-            <a:off x="4644247" y="5367348"/>
-            <a:ext cx="618917" cy="246221"/>
+            <a:off x="6929723" y="5120772"/>
+            <a:ext cx="598316" cy="246221"/>
           </a:xfrm>
           <a:prstGeom prst="rect">
             <a:avLst/>
@@ -6478,12 +6551,8 @@
           <a:lstStyle/>
           <a:p>
             <a:r>
-              <a:rPr lang="en-US" sz="1000" dirty="0" err="1"/>
-              <a:t>b</a:t>
-            </a:r>
-            <a:r>
-              <a:rPr lang="en-US" sz="1000" dirty="0" err="1" smtClean="0"/>
-              <a:t>tc+pills</a:t>
+              <a:rPr lang="en-US" sz="1000" dirty="0" smtClean="0"/>
+              <a:t>echelon</a:t>
             </a:r>
             <a:endParaRPr lang="en-US" sz="1000" dirty="0"/>
           </a:p>
@@ -6491,14 +6560,14 @@
       </p:sp>
       <p:sp>
         <p:nvSpPr>
-          <p:cNvPr id="118" name="TextBox 117"/>
+          <p:cNvPr id="139" name="TextBox 138"/>
           <p:cNvSpPr txBox="1"/>
           <p:nvPr/>
         </p:nvSpPr>
         <p:spPr>
           <a:xfrm>
-            <a:off x="5562656" y="3720705"/>
-            <a:ext cx="746969" cy="400110"/>
+            <a:off x="3692000" y="5080037"/>
+            <a:ext cx="813043" cy="246221"/>
           </a:xfrm>
           <a:prstGeom prst="rect">
             <a:avLst/>
@@ -6513,13 +6582,7 @@
           <a:p>
             <a:r>
               <a:rPr lang="en-US" sz="1000" dirty="0" smtClean="0"/>
-              <a:t>Diplomatic </a:t>
-            </a:r>
-          </a:p>
-          <a:p>
-            <a:r>
-              <a:rPr lang="en-US" sz="1000" dirty="0" err="1" smtClean="0"/>
-              <a:t>intel</a:t>
+              <a:t>E-pharmacy</a:t>
             </a:r>
             <a:endParaRPr lang="en-US" sz="1000" dirty="0"/>
           </a:p>
@@ -6527,22 +6590,20 @@
       </p:sp>
       <p:cxnSp>
         <p:nvCxnSpPr>
-          <p:cNvPr id="119" name="Straight Arrow Connector 118"/>
+          <p:cNvPr id="14" name="Straight Arrow Connector 13"/>
           <p:cNvCxnSpPr/>
           <p:nvPr/>
         </p:nvCxnSpPr>
         <p:spPr>
           <a:xfrm flipV="1">
-            <a:off x="5787449" y="4171361"/>
-            <a:ext cx="0" cy="242369"/>
+            <a:off x="4907731" y="3388403"/>
+            <a:ext cx="0" cy="1541916"/>
           </a:xfrm>
           <a:prstGeom prst="straightConnector1">
             <a:avLst/>
           </a:prstGeom>
           <a:ln>
-            <a:solidFill>
-              <a:schemeClr val="accent3"/>
-            </a:solidFill>
+            <a:headEnd type="arrow"/>
             <a:tailEnd type="arrow"/>
           </a:ln>
         </p:spPr>
@@ -6563,14 +6624,14 @@
       </p:cxnSp>
       <p:sp>
         <p:nvSpPr>
-          <p:cNvPr id="123" name="TextBox 122"/>
+          <p:cNvPr id="62" name="TextBox 61"/>
           <p:cNvSpPr txBox="1"/>
           <p:nvPr/>
         </p:nvSpPr>
         <p:spPr>
           <a:xfrm>
-            <a:off x="6929723" y="5120772"/>
-            <a:ext cx="598316" cy="246221"/>
+            <a:off x="3614642" y="5385258"/>
+            <a:ext cx="1146468" cy="400110"/>
           </a:xfrm>
           <a:prstGeom prst="rect">
             <a:avLst/>
@@ -6584,38 +6645,18 @@
           <a:lstStyle/>
           <a:p>
             <a:r>
+              <a:rPr lang="en-US" sz="1000" dirty="0" err="1" smtClean="0"/>
+              <a:t>Usd+identity</a:t>
+            </a:r>
+            <a:r>
               <a:rPr lang="en-US" sz="1000" dirty="0" smtClean="0"/>
-              <a:t>echelon</a:t>
-            </a:r>
-            <a:endParaRPr lang="en-US" sz="1000" dirty="0"/>
-          </a:p>
-        </p:txBody>
-      </p:sp>
-      <p:sp>
-        <p:nvSpPr>
-          <p:cNvPr id="139" name="TextBox 138"/>
-          <p:cNvSpPr txBox="1"/>
-          <p:nvPr/>
-        </p:nvSpPr>
-        <p:spPr>
-          <a:xfrm>
-            <a:off x="3692000" y="5080037"/>
-            <a:ext cx="813043" cy="246221"/>
-          </a:xfrm>
-          <a:prstGeom prst="rect">
-            <a:avLst/>
-          </a:prstGeom>
-          <a:noFill/>
-        </p:spPr>
-        <p:txBody>
-          <a:bodyPr wrap="none" rtlCol="0">
-            <a:spAutoFit/>
-          </a:bodyPr>
-          <a:lstStyle/>
+              <a:t> info+</a:t>
+            </a:r>
+          </a:p>
           <a:p>
             <a:r>
               <a:rPr lang="en-US" sz="1000" dirty="0" smtClean="0"/>
-              <a:t>E-pharmacy</a:t>
+              <a:t>passwords</a:t>
             </a:r>
             <a:endParaRPr lang="en-US" sz="1000" dirty="0"/>
           </a:p>
@@ -6623,20 +6664,19 @@
       </p:sp>
       <p:cxnSp>
         <p:nvCxnSpPr>
-          <p:cNvPr id="14" name="Straight Arrow Connector 13"/>
+          <p:cNvPr id="63" name="Straight Arrow Connector 62"/>
           <p:cNvCxnSpPr/>
           <p:nvPr/>
         </p:nvCxnSpPr>
         <p:spPr>
-          <a:xfrm flipV="1">
-            <a:off x="4907731" y="3388403"/>
-            <a:ext cx="0" cy="1541916"/>
+          <a:xfrm flipH="1" flipV="1">
+            <a:off x="4066226" y="4746413"/>
+            <a:ext cx="2" cy="304617"/>
           </a:xfrm>
           <a:prstGeom prst="straightConnector1">
             <a:avLst/>
           </a:prstGeom>
           <a:ln>
-            <a:headEnd type="arrow"/>
             <a:tailEnd type="arrow"/>
           </a:ln>
         </p:spPr>
@@ -6657,14 +6697,14 @@
       </p:cxnSp>
       <p:sp>
         <p:nvSpPr>
-          <p:cNvPr id="62" name="TextBox 61"/>
+          <p:cNvPr id="66" name="TextBox 65"/>
           <p:cNvSpPr txBox="1"/>
           <p:nvPr/>
         </p:nvSpPr>
         <p:spPr>
           <a:xfrm>
-            <a:off x="3614642" y="5385258"/>
-            <a:ext cx="1146468" cy="400110"/>
+            <a:off x="3011322" y="4453517"/>
+            <a:ext cx="532568" cy="246221"/>
           </a:xfrm>
           <a:prstGeom prst="rect">
             <a:avLst/>
@@ -6678,81 +6718,8 @@
           <a:lstStyle/>
           <a:p>
             <a:r>
-              <a:rPr lang="en-US" sz="1000" dirty="0" err="1" smtClean="0"/>
-              <a:t>Usd+identity</a:t>
-            </a:r>
-            <a:r>
               <a:rPr lang="en-US" sz="1000" dirty="0" smtClean="0"/>
-              <a:t> info+</a:t>
-            </a:r>
-          </a:p>
-          <a:p>
-            <a:r>
-              <a:rPr lang="en-US" sz="1000" dirty="0" smtClean="0"/>
-              <a:t>passwords</a:t>
-            </a:r>
-            <a:endParaRPr lang="en-US" sz="1000" dirty="0"/>
-          </a:p>
-        </p:txBody>
-      </p:sp>
-      <p:cxnSp>
-        <p:nvCxnSpPr>
-          <p:cNvPr id="63" name="Straight Arrow Connector 62"/>
-          <p:cNvCxnSpPr/>
-          <p:nvPr/>
-        </p:nvCxnSpPr>
-        <p:spPr>
-          <a:xfrm flipH="1" flipV="1">
-            <a:off x="4066226" y="4746413"/>
-            <a:ext cx="2" cy="304617"/>
-          </a:xfrm>
-          <a:prstGeom prst="straightConnector1">
-            <a:avLst/>
-          </a:prstGeom>
-          <a:ln>
-            <a:tailEnd type="arrow"/>
-          </a:ln>
-        </p:spPr>
-        <p:style>
-          <a:lnRef idx="2">
-            <a:schemeClr val="accent1"/>
-          </a:lnRef>
-          <a:fillRef idx="0">
-            <a:schemeClr val="accent1"/>
-          </a:fillRef>
-          <a:effectRef idx="1">
-            <a:schemeClr val="accent1"/>
-          </a:effectRef>
-          <a:fontRef idx="minor">
-            <a:schemeClr val="tx1"/>
-          </a:fontRef>
-        </p:style>
-      </p:cxnSp>
-      <p:sp>
-        <p:nvSpPr>
-          <p:cNvPr id="66" name="TextBox 65"/>
-          <p:cNvSpPr txBox="1"/>
-          <p:nvPr/>
-        </p:nvSpPr>
-        <p:spPr>
-          <a:xfrm>
-            <a:off x="3011322" y="4453517"/>
-            <a:ext cx="714033" cy="246221"/>
-          </a:xfrm>
-          <a:prstGeom prst="rect">
-            <a:avLst/>
-          </a:prstGeom>
-          <a:noFill/>
-        </p:spPr>
-        <p:txBody>
-          <a:bodyPr wrap="none" rtlCol="0">
-            <a:spAutoFit/>
-          </a:bodyPr>
-          <a:lstStyle/>
-          <a:p>
-            <a:r>
-              <a:rPr lang="en-US" sz="1000" dirty="0" smtClean="0"/>
-              <a:t>scammers</a:t>
+              <a:t>coders</a:t>
             </a:r>
             <a:endParaRPr lang="en-US" sz="1000" dirty="0"/>
           </a:p>
@@ -8596,6 +8563,205 @@
           </a:p>
         </p:txBody>
       </p:sp>
+      <p:sp>
+        <p:nvSpPr>
+          <p:cNvPr id="104" name="TextBox 103"/>
+          <p:cNvSpPr txBox="1"/>
+          <p:nvPr/>
+        </p:nvSpPr>
+        <p:spPr>
+          <a:xfrm>
+            <a:off x="2641871" y="4051624"/>
+            <a:ext cx="636450" cy="246221"/>
+          </a:xfrm>
+          <a:prstGeom prst="rect">
+            <a:avLst/>
+          </a:prstGeom>
+          <a:noFill/>
+        </p:spPr>
+        <p:txBody>
+          <a:bodyPr wrap="none" rtlCol="0">
+            <a:spAutoFit/>
+          </a:bodyPr>
+          <a:lstStyle/>
+          <a:p>
+            <a:r>
+              <a:rPr lang="en-US" sz="1000" dirty="0" smtClean="0"/>
+              <a:t>passport</a:t>
+            </a:r>
+            <a:endParaRPr lang="en-US" sz="1000" dirty="0"/>
+          </a:p>
+        </p:txBody>
+      </p:sp>
+      <p:sp>
+        <p:nvSpPr>
+          <p:cNvPr id="112" name="TextBox 111"/>
+          <p:cNvSpPr txBox="1"/>
+          <p:nvPr/>
+        </p:nvSpPr>
+        <p:spPr>
+          <a:xfrm>
+            <a:off x="2465414" y="5232437"/>
+            <a:ext cx="836512" cy="246221"/>
+          </a:xfrm>
+          <a:prstGeom prst="rect">
+            <a:avLst/>
+          </a:prstGeom>
+          <a:noFill/>
+        </p:spPr>
+        <p:txBody>
+          <a:bodyPr wrap="none" rtlCol="0">
+            <a:spAutoFit/>
+          </a:bodyPr>
+          <a:lstStyle/>
+          <a:p>
+            <a:r>
+              <a:rPr lang="en-US" sz="1000" dirty="0" smtClean="0"/>
+              <a:t>E-Z-Passport</a:t>
+            </a:r>
+            <a:endParaRPr lang="en-US" sz="1000" dirty="0"/>
+          </a:p>
+        </p:txBody>
+      </p:sp>
+      <p:sp>
+        <p:nvSpPr>
+          <p:cNvPr id="124" name="TextBox 123"/>
+          <p:cNvSpPr txBox="1"/>
+          <p:nvPr/>
+        </p:nvSpPr>
+        <p:spPr>
+          <a:xfrm>
+            <a:off x="2388056" y="5537658"/>
+            <a:ext cx="1146468" cy="400110"/>
+          </a:xfrm>
+          <a:prstGeom prst="rect">
+            <a:avLst/>
+          </a:prstGeom>
+          <a:noFill/>
+        </p:spPr>
+        <p:txBody>
+          <a:bodyPr wrap="none" rtlCol="0">
+            <a:spAutoFit/>
+          </a:bodyPr>
+          <a:lstStyle/>
+          <a:p>
+            <a:r>
+              <a:rPr lang="en-US" sz="1000" dirty="0" err="1" smtClean="0"/>
+              <a:t>Usd+identity</a:t>
+            </a:r>
+            <a:r>
+              <a:rPr lang="en-US" sz="1000" dirty="0" smtClean="0"/>
+              <a:t> info+</a:t>
+            </a:r>
+          </a:p>
+          <a:p>
+            <a:r>
+              <a:rPr lang="en-US" sz="1000" dirty="0" smtClean="0"/>
+              <a:t>passwords</a:t>
+            </a:r>
+            <a:endParaRPr lang="en-US" sz="1000" dirty="0"/>
+          </a:p>
+        </p:txBody>
+      </p:sp>
+      <p:cxnSp>
+        <p:nvCxnSpPr>
+          <p:cNvPr id="125" name="Straight Arrow Connector 124"/>
+          <p:cNvCxnSpPr/>
+          <p:nvPr/>
+        </p:nvCxnSpPr>
+        <p:spPr>
+          <a:xfrm flipH="1" flipV="1">
+            <a:off x="2839640" y="4898813"/>
+            <a:ext cx="2" cy="304617"/>
+          </a:xfrm>
+          <a:prstGeom prst="straightConnector1">
+            <a:avLst/>
+          </a:prstGeom>
+          <a:ln>
+            <a:tailEnd type="arrow"/>
+          </a:ln>
+        </p:spPr>
+        <p:style>
+          <a:lnRef idx="2">
+            <a:schemeClr val="accent1"/>
+          </a:lnRef>
+          <a:fillRef idx="0">
+            <a:schemeClr val="accent1"/>
+          </a:fillRef>
+          <a:effectRef idx="1">
+            <a:schemeClr val="accent1"/>
+          </a:effectRef>
+          <a:fontRef idx="minor">
+            <a:schemeClr val="tx1"/>
+          </a:fontRef>
+        </p:style>
+      </p:cxnSp>
+      <p:sp>
+        <p:nvSpPr>
+          <p:cNvPr id="127" name="TextBox 126"/>
+          <p:cNvSpPr txBox="1"/>
+          <p:nvPr/>
+        </p:nvSpPr>
+        <p:spPr>
+          <a:xfrm>
+            <a:off x="2590701" y="4602355"/>
+            <a:ext cx="485292" cy="246221"/>
+          </a:xfrm>
+          <a:prstGeom prst="rect">
+            <a:avLst/>
+          </a:prstGeom>
+          <a:noFill/>
+        </p:spPr>
+        <p:txBody>
+          <a:bodyPr wrap="none" rtlCol="0">
+            <a:spAutoFit/>
+          </a:bodyPr>
+          <a:lstStyle/>
+          <a:p>
+            <a:r>
+              <a:rPr lang="en-US" sz="1000" dirty="0" smtClean="0"/>
+              <a:t>clerks</a:t>
+            </a:r>
+            <a:endParaRPr lang="en-US" sz="1000" dirty="0"/>
+          </a:p>
+        </p:txBody>
+      </p:sp>
+      <p:cxnSp>
+        <p:nvCxnSpPr>
+          <p:cNvPr id="128" name="Straight Arrow Connector 127"/>
+          <p:cNvCxnSpPr/>
+          <p:nvPr/>
+        </p:nvCxnSpPr>
+        <p:spPr>
+          <a:xfrm flipH="1" flipV="1">
+            <a:off x="2837116" y="4323761"/>
+            <a:ext cx="203" cy="314476"/>
+          </a:xfrm>
+          <a:prstGeom prst="straightConnector1">
+            <a:avLst/>
+          </a:prstGeom>
+          <a:ln>
+            <a:solidFill>
+              <a:schemeClr val="accent3"/>
+            </a:solidFill>
+            <a:tailEnd type="arrow"/>
+          </a:ln>
+        </p:spPr>
+        <p:style>
+          <a:lnRef idx="2">
+            <a:schemeClr val="accent1"/>
+          </a:lnRef>
+          <a:fillRef idx="0">
+            <a:schemeClr val="accent1"/>
+          </a:fillRef>
+          <a:effectRef idx="1">
+            <a:schemeClr val="accent1"/>
+          </a:effectRef>
+          <a:fontRef idx="minor">
+            <a:schemeClr val="tx1"/>
+          </a:fontRef>
+        </p:style>
+      </p:cxnSp>
     </p:spTree>
     <p:extLst>
       <p:ext uri="{BB962C8B-B14F-4D97-AF65-F5344CB8AC3E}">
@@ -12454,6 +12620,1989 @@
 </p:sld>
 </file>
 
+<file path=ppt/slides/slide8.xml><?xml version="1.0" encoding="utf-8"?>
+<p:sld xmlns:a="http://schemas.openxmlformats.org/drawingml/2006/main" xmlns:r="http://schemas.openxmlformats.org/officeDocument/2006/relationships" xmlns:p="http://schemas.openxmlformats.org/presentationml/2006/main">
+  <p:cSld>
+    <p:spTree>
+      <p:nvGrpSpPr>
+        <p:cNvPr id="1" name=""/>
+        <p:cNvGrpSpPr/>
+        <p:nvPr/>
+      </p:nvGrpSpPr>
+      <p:grpSpPr>
+        <a:xfrm>
+          <a:off x="0" y="0"/>
+          <a:ext cx="0" cy="0"/>
+          <a:chOff x="0" y="0"/>
+          <a:chExt cx="0" cy="0"/>
+        </a:xfrm>
+      </p:grpSpPr>
+      <p:sp>
+        <p:nvSpPr>
+          <p:cNvPr id="2" name="Title 1"/>
+          <p:cNvSpPr>
+            <a:spLocks noGrp="1"/>
+          </p:cNvSpPr>
+          <p:nvPr>
+            <p:ph type="title"/>
+          </p:nvPr>
+        </p:nvSpPr>
+        <p:spPr/>
+        <p:txBody>
+          <a:bodyPr/>
+          <a:lstStyle/>
+          <a:p>
+            <a:r>
+              <a:rPr lang="en-US" dirty="0" smtClean="0"/>
+              <a:t>Inventory</a:t>
+            </a:r>
+            <a:endParaRPr lang="en-US" dirty="0"/>
+          </a:p>
+        </p:txBody>
+      </p:sp>
+      <p:sp>
+        <p:nvSpPr>
+          <p:cNvPr id="4" name="Rectangle 3"/>
+          <p:cNvSpPr/>
+          <p:nvPr/>
+        </p:nvSpPr>
+        <p:spPr>
+          <a:xfrm>
+            <a:off x="193268" y="5452391"/>
+            <a:ext cx="1156943" cy="414172"/>
+          </a:xfrm>
+          <a:prstGeom prst="rect">
+            <a:avLst/>
+          </a:prstGeom>
+        </p:spPr>
+        <p:style>
+          <a:lnRef idx="2">
+            <a:schemeClr val="dk1"/>
+          </a:lnRef>
+          <a:fillRef idx="1">
+            <a:schemeClr val="lt1"/>
+          </a:fillRef>
+          <a:effectRef idx="0">
+            <a:schemeClr val="dk1"/>
+          </a:effectRef>
+          <a:fontRef idx="minor">
+            <a:schemeClr val="dk1"/>
+          </a:fontRef>
+        </p:style>
+        <p:txBody>
+          <a:bodyPr rtlCol="0" anchor="ctr"/>
+          <a:lstStyle/>
+          <a:p>
+            <a:pPr algn="ctr"/>
+            <a:r>
+              <a:rPr lang="en-US" dirty="0" err="1" smtClean="0"/>
+              <a:t>btc</a:t>
+            </a:r>
+            <a:endParaRPr lang="en-US" dirty="0"/>
+          </a:p>
+        </p:txBody>
+      </p:sp>
+      <p:sp>
+        <p:nvSpPr>
+          <p:cNvPr id="12" name="Rectangle 11"/>
+          <p:cNvSpPr/>
+          <p:nvPr/>
+        </p:nvSpPr>
+        <p:spPr>
+          <a:xfrm>
+            <a:off x="1502611" y="5452391"/>
+            <a:ext cx="1156943" cy="414172"/>
+          </a:xfrm>
+          <a:prstGeom prst="rect">
+            <a:avLst/>
+          </a:prstGeom>
+        </p:spPr>
+        <p:style>
+          <a:lnRef idx="2">
+            <a:schemeClr val="dk1"/>
+          </a:lnRef>
+          <a:fillRef idx="1">
+            <a:schemeClr val="lt1"/>
+          </a:fillRef>
+          <a:effectRef idx="0">
+            <a:schemeClr val="dk1"/>
+          </a:effectRef>
+          <a:fontRef idx="minor">
+            <a:schemeClr val="dk1"/>
+          </a:fontRef>
+        </p:style>
+        <p:txBody>
+          <a:bodyPr rtlCol="0" anchor="ctr"/>
+          <a:lstStyle/>
+          <a:p>
+            <a:pPr algn="ctr"/>
+            <a:r>
+              <a:rPr lang="en-US" dirty="0" smtClean="0"/>
+              <a:t>emails</a:t>
+            </a:r>
+            <a:endParaRPr lang="en-US" dirty="0"/>
+          </a:p>
+        </p:txBody>
+      </p:sp>
+      <p:sp>
+        <p:nvSpPr>
+          <p:cNvPr id="13" name="Rectangle 12"/>
+          <p:cNvSpPr/>
+          <p:nvPr/>
+        </p:nvSpPr>
+        <p:spPr>
+          <a:xfrm>
+            <a:off x="2792090" y="5452391"/>
+            <a:ext cx="1156943" cy="414172"/>
+          </a:xfrm>
+          <a:prstGeom prst="rect">
+            <a:avLst/>
+          </a:prstGeom>
+        </p:spPr>
+        <p:style>
+          <a:lnRef idx="2">
+            <a:schemeClr val="dk1"/>
+          </a:lnRef>
+          <a:fillRef idx="1">
+            <a:schemeClr val="lt1"/>
+          </a:fillRef>
+          <a:effectRef idx="0">
+            <a:schemeClr val="dk1"/>
+          </a:effectRef>
+          <a:fontRef idx="minor">
+            <a:schemeClr val="dk1"/>
+          </a:fontRef>
+        </p:style>
+        <p:txBody>
+          <a:bodyPr rtlCol="0" anchor="ctr"/>
+          <a:lstStyle/>
+          <a:p>
+            <a:pPr algn="ctr"/>
+            <a:r>
+              <a:rPr lang="en-US" dirty="0" smtClean="0"/>
+              <a:t>pills</a:t>
+            </a:r>
+            <a:endParaRPr lang="en-US" dirty="0"/>
+          </a:p>
+        </p:txBody>
+      </p:sp>
+      <p:sp>
+        <p:nvSpPr>
+          <p:cNvPr id="14" name="Rectangle 13"/>
+          <p:cNvSpPr/>
+          <p:nvPr/>
+        </p:nvSpPr>
+        <p:spPr>
+          <a:xfrm>
+            <a:off x="4101433" y="5452391"/>
+            <a:ext cx="1156943" cy="414172"/>
+          </a:xfrm>
+          <a:prstGeom prst="rect">
+            <a:avLst/>
+          </a:prstGeom>
+        </p:spPr>
+        <p:style>
+          <a:lnRef idx="2">
+            <a:schemeClr val="dk1"/>
+          </a:lnRef>
+          <a:fillRef idx="1">
+            <a:schemeClr val="lt1"/>
+          </a:fillRef>
+          <a:effectRef idx="0">
+            <a:schemeClr val="dk1"/>
+          </a:effectRef>
+          <a:fontRef idx="minor">
+            <a:schemeClr val="dk1"/>
+          </a:fontRef>
+        </p:style>
+        <p:txBody>
+          <a:bodyPr rtlCol="0" anchor="ctr"/>
+          <a:lstStyle/>
+          <a:p>
+            <a:pPr algn="ctr"/>
+            <a:r>
+              <a:rPr lang="en-US" dirty="0" smtClean="0"/>
+              <a:t>dictionary</a:t>
+            </a:r>
+            <a:endParaRPr lang="en-US" dirty="0"/>
+          </a:p>
+        </p:txBody>
+      </p:sp>
+      <p:sp>
+        <p:nvSpPr>
+          <p:cNvPr id="15" name="Rectangle 14"/>
+          <p:cNvSpPr/>
+          <p:nvPr/>
+        </p:nvSpPr>
+        <p:spPr>
+          <a:xfrm>
+            <a:off x="5410776" y="5452391"/>
+            <a:ext cx="1156943" cy="414172"/>
+          </a:xfrm>
+          <a:prstGeom prst="rect">
+            <a:avLst/>
+          </a:prstGeom>
+        </p:spPr>
+        <p:style>
+          <a:lnRef idx="2">
+            <a:schemeClr val="dk1"/>
+          </a:lnRef>
+          <a:fillRef idx="1">
+            <a:schemeClr val="lt1"/>
+          </a:fillRef>
+          <a:effectRef idx="0">
+            <a:schemeClr val="dk1"/>
+          </a:effectRef>
+          <a:fontRef idx="minor">
+            <a:schemeClr val="dk1"/>
+          </a:fontRef>
+        </p:style>
+        <p:txBody>
+          <a:bodyPr rtlCol="0" anchor="ctr"/>
+          <a:lstStyle/>
+          <a:p>
+            <a:pPr algn="ctr"/>
+            <a:r>
+              <a:rPr lang="en-US" dirty="0" smtClean="0"/>
+              <a:t>sniffer</a:t>
+            </a:r>
+            <a:endParaRPr lang="en-US" dirty="0"/>
+          </a:p>
+        </p:txBody>
+      </p:sp>
+      <p:sp>
+        <p:nvSpPr>
+          <p:cNvPr id="16" name="Rectangle 15"/>
+          <p:cNvSpPr/>
+          <p:nvPr/>
+        </p:nvSpPr>
+        <p:spPr>
+          <a:xfrm>
+            <a:off x="6700255" y="5452391"/>
+            <a:ext cx="1156943" cy="414172"/>
+          </a:xfrm>
+          <a:prstGeom prst="rect">
+            <a:avLst/>
+          </a:prstGeom>
+        </p:spPr>
+        <p:style>
+          <a:lnRef idx="2">
+            <a:schemeClr val="dk1"/>
+          </a:lnRef>
+          <a:fillRef idx="1">
+            <a:schemeClr val="lt1"/>
+          </a:fillRef>
+          <a:effectRef idx="0">
+            <a:schemeClr val="dk1"/>
+          </a:effectRef>
+          <a:fontRef idx="minor">
+            <a:schemeClr val="dk1"/>
+          </a:fontRef>
+        </p:style>
+        <p:txBody>
+          <a:bodyPr rtlCol="0" anchor="ctr"/>
+          <a:lstStyle/>
+          <a:p>
+            <a:pPr algn="ctr"/>
+            <a:r>
+              <a:rPr lang="en-US" dirty="0" err="1" smtClean="0"/>
+              <a:t>trojan</a:t>
+            </a:r>
+            <a:endParaRPr lang="en-US" dirty="0"/>
+          </a:p>
+        </p:txBody>
+      </p:sp>
+      <p:sp>
+        <p:nvSpPr>
+          <p:cNvPr id="17" name="Rectangle 16"/>
+          <p:cNvSpPr/>
+          <p:nvPr/>
+        </p:nvSpPr>
+        <p:spPr>
+          <a:xfrm>
+            <a:off x="193268" y="4864181"/>
+            <a:ext cx="1156943" cy="414172"/>
+          </a:xfrm>
+          <a:prstGeom prst="rect">
+            <a:avLst/>
+          </a:prstGeom>
+        </p:spPr>
+        <p:style>
+          <a:lnRef idx="2">
+            <a:schemeClr val="dk1"/>
+          </a:lnRef>
+          <a:fillRef idx="1">
+            <a:schemeClr val="lt1"/>
+          </a:fillRef>
+          <a:effectRef idx="0">
+            <a:schemeClr val="dk1"/>
+          </a:effectRef>
+          <a:fontRef idx="minor">
+            <a:schemeClr val="dk1"/>
+          </a:fontRef>
+        </p:style>
+        <p:txBody>
+          <a:bodyPr rtlCol="0" anchor="ctr"/>
+          <a:lstStyle/>
+          <a:p>
+            <a:pPr algn="ctr"/>
+            <a:r>
+              <a:rPr lang="en-US" dirty="0" err="1" smtClean="0"/>
+              <a:t>usd</a:t>
+            </a:r>
+            <a:endParaRPr lang="en-US" dirty="0"/>
+          </a:p>
+        </p:txBody>
+      </p:sp>
+      <p:sp>
+        <p:nvSpPr>
+          <p:cNvPr id="18" name="Rectangle 17"/>
+          <p:cNvSpPr/>
+          <p:nvPr/>
+        </p:nvSpPr>
+        <p:spPr>
+          <a:xfrm>
+            <a:off x="1502611" y="4864181"/>
+            <a:ext cx="1156943" cy="414172"/>
+          </a:xfrm>
+          <a:prstGeom prst="rect">
+            <a:avLst/>
+          </a:prstGeom>
+        </p:spPr>
+        <p:style>
+          <a:lnRef idx="2">
+            <a:schemeClr val="dk1"/>
+          </a:lnRef>
+          <a:fillRef idx="1">
+            <a:schemeClr val="lt1"/>
+          </a:fillRef>
+          <a:effectRef idx="0">
+            <a:schemeClr val="dk1"/>
+          </a:effectRef>
+          <a:fontRef idx="minor">
+            <a:schemeClr val="dk1"/>
+          </a:fontRef>
+        </p:style>
+        <p:txBody>
+          <a:bodyPr rtlCol="0" anchor="ctr"/>
+          <a:lstStyle/>
+          <a:p>
+            <a:pPr algn="ctr"/>
+            <a:r>
+              <a:rPr lang="en-US" dirty="0" smtClean="0"/>
+              <a:t>password</a:t>
+            </a:r>
+            <a:endParaRPr lang="en-US" dirty="0"/>
+          </a:p>
+        </p:txBody>
+      </p:sp>
+      <p:sp>
+        <p:nvSpPr>
+          <p:cNvPr id="19" name="Rectangle 18"/>
+          <p:cNvSpPr/>
+          <p:nvPr/>
+        </p:nvSpPr>
+        <p:spPr>
+          <a:xfrm>
+            <a:off x="2792090" y="4864181"/>
+            <a:ext cx="1156943" cy="414172"/>
+          </a:xfrm>
+          <a:prstGeom prst="rect">
+            <a:avLst/>
+          </a:prstGeom>
+        </p:spPr>
+        <p:style>
+          <a:lnRef idx="2">
+            <a:schemeClr val="dk1"/>
+          </a:lnRef>
+          <a:fillRef idx="1">
+            <a:schemeClr val="lt1"/>
+          </a:fillRef>
+          <a:effectRef idx="0">
+            <a:schemeClr val="dk1"/>
+          </a:effectRef>
+          <a:fontRef idx="minor">
+            <a:schemeClr val="dk1"/>
+          </a:fontRef>
+        </p:style>
+        <p:txBody>
+          <a:bodyPr rtlCol="0" anchor="ctr"/>
+          <a:lstStyle/>
+          <a:p>
+            <a:pPr algn="ctr"/>
+            <a:r>
+              <a:rPr lang="en-US" dirty="0" smtClean="0"/>
+              <a:t>passports</a:t>
+            </a:r>
+            <a:endParaRPr lang="en-US" dirty="0"/>
+          </a:p>
+        </p:txBody>
+      </p:sp>
+      <p:sp>
+        <p:nvSpPr>
+          <p:cNvPr id="20" name="Rectangle 19"/>
+          <p:cNvSpPr/>
+          <p:nvPr/>
+        </p:nvSpPr>
+        <p:spPr>
+          <a:xfrm>
+            <a:off x="4101433" y="4864181"/>
+            <a:ext cx="1156943" cy="414172"/>
+          </a:xfrm>
+          <a:prstGeom prst="rect">
+            <a:avLst/>
+          </a:prstGeom>
+        </p:spPr>
+        <p:style>
+          <a:lnRef idx="2">
+            <a:schemeClr val="dk1"/>
+          </a:lnRef>
+          <a:fillRef idx="1">
+            <a:schemeClr val="lt1"/>
+          </a:fillRef>
+          <a:effectRef idx="0">
+            <a:schemeClr val="dk1"/>
+          </a:effectRef>
+          <a:fontRef idx="minor">
+            <a:schemeClr val="dk1"/>
+          </a:fontRef>
+        </p:style>
+        <p:txBody>
+          <a:bodyPr rtlCol="0" anchor="ctr"/>
+          <a:lstStyle/>
+          <a:p>
+            <a:pPr algn="ctr"/>
+            <a:r>
+              <a:rPr lang="en-US" dirty="0" smtClean="0"/>
+              <a:t>bots</a:t>
+            </a:r>
+            <a:endParaRPr lang="en-US" dirty="0"/>
+          </a:p>
+        </p:txBody>
+      </p:sp>
+      <p:sp>
+        <p:nvSpPr>
+          <p:cNvPr id="21" name="Rectangle 20"/>
+          <p:cNvSpPr/>
+          <p:nvPr/>
+        </p:nvSpPr>
+        <p:spPr>
+          <a:xfrm>
+            <a:off x="5410776" y="4864181"/>
+            <a:ext cx="1156943" cy="414172"/>
+          </a:xfrm>
+          <a:prstGeom prst="rect">
+            <a:avLst/>
+          </a:prstGeom>
+        </p:spPr>
+        <p:style>
+          <a:lnRef idx="2">
+            <a:schemeClr val="dk1"/>
+          </a:lnRef>
+          <a:fillRef idx="1">
+            <a:schemeClr val="lt1"/>
+          </a:fillRef>
+          <a:effectRef idx="0">
+            <a:schemeClr val="dk1"/>
+          </a:effectRef>
+          <a:fontRef idx="minor">
+            <a:schemeClr val="dk1"/>
+          </a:fontRef>
+        </p:style>
+        <p:txBody>
+          <a:bodyPr rtlCol="0" anchor="ctr"/>
+          <a:lstStyle/>
+          <a:p>
+            <a:pPr algn="ctr"/>
+            <a:r>
+              <a:rPr lang="en-US" dirty="0" smtClean="0"/>
+              <a:t>ripper</a:t>
+            </a:r>
+            <a:endParaRPr lang="en-US" dirty="0"/>
+          </a:p>
+        </p:txBody>
+      </p:sp>
+      <p:sp>
+        <p:nvSpPr>
+          <p:cNvPr id="22" name="Rectangle 21"/>
+          <p:cNvSpPr/>
+          <p:nvPr/>
+        </p:nvSpPr>
+        <p:spPr>
+          <a:xfrm>
+            <a:off x="6700255" y="4864181"/>
+            <a:ext cx="1156943" cy="414172"/>
+          </a:xfrm>
+          <a:prstGeom prst="rect">
+            <a:avLst/>
+          </a:prstGeom>
+        </p:spPr>
+        <p:style>
+          <a:lnRef idx="2">
+            <a:schemeClr val="dk1"/>
+          </a:lnRef>
+          <a:fillRef idx="1">
+            <a:schemeClr val="lt1"/>
+          </a:fillRef>
+          <a:effectRef idx="0">
+            <a:schemeClr val="dk1"/>
+          </a:effectRef>
+          <a:fontRef idx="minor">
+            <a:schemeClr val="dk1"/>
+          </a:fontRef>
+        </p:style>
+        <p:txBody>
+          <a:bodyPr rtlCol="0" anchor="ctr"/>
+          <a:lstStyle/>
+          <a:p>
+            <a:pPr algn="ctr"/>
+            <a:r>
+              <a:rPr lang="en-US" dirty="0" smtClean="0"/>
+              <a:t>virus</a:t>
+            </a:r>
+            <a:endParaRPr lang="en-US" dirty="0"/>
+          </a:p>
+        </p:txBody>
+      </p:sp>
+      <p:sp>
+        <p:nvSpPr>
+          <p:cNvPr id="23" name="Rectangle 22"/>
+          <p:cNvSpPr/>
+          <p:nvPr/>
+        </p:nvSpPr>
+        <p:spPr>
+          <a:xfrm>
+            <a:off x="193268" y="4262603"/>
+            <a:ext cx="1156943" cy="414172"/>
+          </a:xfrm>
+          <a:prstGeom prst="rect">
+            <a:avLst/>
+          </a:prstGeom>
+        </p:spPr>
+        <p:style>
+          <a:lnRef idx="2">
+            <a:schemeClr val="dk1"/>
+          </a:lnRef>
+          <a:fillRef idx="1">
+            <a:schemeClr val="lt1"/>
+          </a:fillRef>
+          <a:effectRef idx="0">
+            <a:schemeClr val="dk1"/>
+          </a:effectRef>
+          <a:fontRef idx="minor">
+            <a:schemeClr val="dk1"/>
+          </a:fontRef>
+        </p:style>
+        <p:txBody>
+          <a:bodyPr rtlCol="0" anchor="ctr"/>
+          <a:lstStyle/>
+          <a:p>
+            <a:pPr algn="ctr"/>
+            <a:endParaRPr lang="en-US" dirty="0"/>
+          </a:p>
+        </p:txBody>
+      </p:sp>
+      <p:sp>
+        <p:nvSpPr>
+          <p:cNvPr id="24" name="Rectangle 23"/>
+          <p:cNvSpPr/>
+          <p:nvPr/>
+        </p:nvSpPr>
+        <p:spPr>
+          <a:xfrm>
+            <a:off x="1502611" y="4262603"/>
+            <a:ext cx="1156943" cy="414172"/>
+          </a:xfrm>
+          <a:prstGeom prst="rect">
+            <a:avLst/>
+          </a:prstGeom>
+        </p:spPr>
+        <p:style>
+          <a:lnRef idx="2">
+            <a:schemeClr val="dk1"/>
+          </a:lnRef>
+          <a:fillRef idx="1">
+            <a:schemeClr val="lt1"/>
+          </a:fillRef>
+          <a:effectRef idx="0">
+            <a:schemeClr val="dk1"/>
+          </a:effectRef>
+          <a:fontRef idx="minor">
+            <a:schemeClr val="dk1"/>
+          </a:fontRef>
+        </p:style>
+        <p:txBody>
+          <a:bodyPr rtlCol="0" anchor="ctr"/>
+          <a:lstStyle/>
+          <a:p>
+            <a:pPr algn="ctr"/>
+            <a:r>
+              <a:rPr lang="en-US" dirty="0" smtClean="0"/>
+              <a:t>Trade sec</a:t>
+            </a:r>
+            <a:endParaRPr lang="en-US" dirty="0"/>
+          </a:p>
+        </p:txBody>
+      </p:sp>
+      <p:sp>
+        <p:nvSpPr>
+          <p:cNvPr id="25" name="Rectangle 24"/>
+          <p:cNvSpPr/>
+          <p:nvPr/>
+        </p:nvSpPr>
+        <p:spPr>
+          <a:xfrm>
+            <a:off x="2792090" y="4262603"/>
+            <a:ext cx="1156943" cy="414172"/>
+          </a:xfrm>
+          <a:prstGeom prst="rect">
+            <a:avLst/>
+          </a:prstGeom>
+        </p:spPr>
+        <p:style>
+          <a:lnRef idx="2">
+            <a:schemeClr val="dk1"/>
+          </a:lnRef>
+          <a:fillRef idx="1">
+            <a:schemeClr val="lt1"/>
+          </a:fillRef>
+          <a:effectRef idx="0">
+            <a:schemeClr val="dk1"/>
+          </a:effectRef>
+          <a:fontRef idx="minor">
+            <a:schemeClr val="dk1"/>
+          </a:fontRef>
+        </p:style>
+        <p:txBody>
+          <a:bodyPr rtlCol="0" anchor="ctr"/>
+          <a:lstStyle/>
+          <a:p>
+            <a:pPr algn="ctr"/>
+            <a:endParaRPr lang="en-US" dirty="0"/>
+          </a:p>
+        </p:txBody>
+      </p:sp>
+      <p:sp>
+        <p:nvSpPr>
+          <p:cNvPr id="26" name="Rectangle 25"/>
+          <p:cNvSpPr/>
+          <p:nvPr/>
+        </p:nvSpPr>
+        <p:spPr>
+          <a:xfrm>
+            <a:off x="4101433" y="4262603"/>
+            <a:ext cx="1156943" cy="414172"/>
+          </a:xfrm>
+          <a:prstGeom prst="rect">
+            <a:avLst/>
+          </a:prstGeom>
+        </p:spPr>
+        <p:style>
+          <a:lnRef idx="2">
+            <a:schemeClr val="dk1"/>
+          </a:lnRef>
+          <a:fillRef idx="1">
+            <a:schemeClr val="lt1"/>
+          </a:fillRef>
+          <a:effectRef idx="0">
+            <a:schemeClr val="dk1"/>
+          </a:effectRef>
+          <a:fontRef idx="minor">
+            <a:schemeClr val="dk1"/>
+          </a:fontRef>
+        </p:style>
+        <p:txBody>
+          <a:bodyPr rtlCol="0" anchor="ctr"/>
+          <a:lstStyle/>
+          <a:p>
+            <a:pPr algn="ctr"/>
+            <a:endParaRPr lang="en-US" dirty="0"/>
+          </a:p>
+        </p:txBody>
+      </p:sp>
+      <p:sp>
+        <p:nvSpPr>
+          <p:cNvPr id="27" name="Rectangle 26"/>
+          <p:cNvSpPr/>
+          <p:nvPr/>
+        </p:nvSpPr>
+        <p:spPr>
+          <a:xfrm>
+            <a:off x="5410776" y="4262603"/>
+            <a:ext cx="1156943" cy="414172"/>
+          </a:xfrm>
+          <a:prstGeom prst="rect">
+            <a:avLst/>
+          </a:prstGeom>
+        </p:spPr>
+        <p:style>
+          <a:lnRef idx="2">
+            <a:schemeClr val="dk1"/>
+          </a:lnRef>
+          <a:fillRef idx="1">
+            <a:schemeClr val="lt1"/>
+          </a:fillRef>
+          <a:effectRef idx="0">
+            <a:schemeClr val="dk1"/>
+          </a:effectRef>
+          <a:fontRef idx="minor">
+            <a:schemeClr val="dk1"/>
+          </a:fontRef>
+        </p:style>
+        <p:txBody>
+          <a:bodyPr rtlCol="0" anchor="ctr"/>
+          <a:lstStyle/>
+          <a:p>
+            <a:pPr algn="ctr"/>
+            <a:r>
+              <a:rPr lang="en-US" dirty="0" smtClean="0"/>
+              <a:t>Deep </a:t>
+            </a:r>
+            <a:r>
+              <a:rPr lang="en-US" dirty="0" err="1" smtClean="0"/>
+              <a:t>Ckd</a:t>
+            </a:r>
+            <a:endParaRPr lang="en-US" dirty="0"/>
+          </a:p>
+        </p:txBody>
+      </p:sp>
+      <p:sp>
+        <p:nvSpPr>
+          <p:cNvPr id="28" name="Rectangle 27"/>
+          <p:cNvSpPr/>
+          <p:nvPr/>
+        </p:nvSpPr>
+        <p:spPr>
+          <a:xfrm>
+            <a:off x="6700255" y="4262603"/>
+            <a:ext cx="1156943" cy="414172"/>
+          </a:xfrm>
+          <a:prstGeom prst="rect">
+            <a:avLst/>
+          </a:prstGeom>
+        </p:spPr>
+        <p:style>
+          <a:lnRef idx="2">
+            <a:schemeClr val="dk1"/>
+          </a:lnRef>
+          <a:fillRef idx="1">
+            <a:schemeClr val="lt1"/>
+          </a:fillRef>
+          <a:effectRef idx="0">
+            <a:schemeClr val="dk1"/>
+          </a:effectRef>
+          <a:fontRef idx="minor">
+            <a:schemeClr val="dk1"/>
+          </a:fontRef>
+        </p:style>
+        <p:txBody>
+          <a:bodyPr rtlCol="0" anchor="ctr"/>
+          <a:lstStyle/>
+          <a:p>
+            <a:pPr algn="ctr"/>
+            <a:r>
+              <a:rPr lang="en-US" dirty="0" smtClean="0"/>
+              <a:t>rootkit</a:t>
+            </a:r>
+            <a:endParaRPr lang="en-US" dirty="0"/>
+          </a:p>
+        </p:txBody>
+      </p:sp>
+      <p:sp>
+        <p:nvSpPr>
+          <p:cNvPr id="29" name="Rectangle 28"/>
+          <p:cNvSpPr/>
+          <p:nvPr/>
+        </p:nvSpPr>
+        <p:spPr>
+          <a:xfrm>
+            <a:off x="193268" y="3714497"/>
+            <a:ext cx="1156943" cy="414172"/>
+          </a:xfrm>
+          <a:prstGeom prst="rect">
+            <a:avLst/>
+          </a:prstGeom>
+        </p:spPr>
+        <p:style>
+          <a:lnRef idx="2">
+            <a:schemeClr val="dk1"/>
+          </a:lnRef>
+          <a:fillRef idx="1">
+            <a:schemeClr val="lt1"/>
+          </a:fillRef>
+          <a:effectRef idx="0">
+            <a:schemeClr val="dk1"/>
+          </a:effectRef>
+          <a:fontRef idx="minor">
+            <a:schemeClr val="dk1"/>
+          </a:fontRef>
+        </p:style>
+        <p:txBody>
+          <a:bodyPr rtlCol="0" anchor="ctr"/>
+          <a:lstStyle/>
+          <a:p>
+            <a:pPr algn="ctr"/>
+            <a:r>
+              <a:rPr lang="en-US" dirty="0" smtClean="0"/>
+              <a:t>workers</a:t>
+            </a:r>
+            <a:endParaRPr lang="en-US" dirty="0"/>
+          </a:p>
+        </p:txBody>
+      </p:sp>
+      <p:sp>
+        <p:nvSpPr>
+          <p:cNvPr id="30" name="Rectangle 29"/>
+          <p:cNvSpPr/>
+          <p:nvPr/>
+        </p:nvSpPr>
+        <p:spPr>
+          <a:xfrm>
+            <a:off x="1502611" y="3714497"/>
+            <a:ext cx="1156943" cy="414172"/>
+          </a:xfrm>
+          <a:prstGeom prst="rect">
+            <a:avLst/>
+          </a:prstGeom>
+        </p:spPr>
+        <p:style>
+          <a:lnRef idx="2">
+            <a:schemeClr val="dk1"/>
+          </a:lnRef>
+          <a:fillRef idx="1">
+            <a:schemeClr val="lt1"/>
+          </a:fillRef>
+          <a:effectRef idx="0">
+            <a:schemeClr val="dk1"/>
+          </a:effectRef>
+          <a:fontRef idx="minor">
+            <a:schemeClr val="dk1"/>
+          </a:fontRef>
+        </p:style>
+        <p:txBody>
+          <a:bodyPr rtlCol="0" anchor="ctr"/>
+          <a:lstStyle/>
+          <a:p>
+            <a:pPr algn="ctr"/>
+            <a:r>
+              <a:rPr lang="en-US" dirty="0" smtClean="0"/>
+              <a:t>For </a:t>
+            </a:r>
+            <a:r>
+              <a:rPr lang="en-US" dirty="0" err="1" smtClean="0"/>
+              <a:t>intel</a:t>
+            </a:r>
+            <a:endParaRPr lang="en-US" dirty="0"/>
+          </a:p>
+        </p:txBody>
+      </p:sp>
+      <p:sp>
+        <p:nvSpPr>
+          <p:cNvPr id="31" name="Rectangle 30"/>
+          <p:cNvSpPr/>
+          <p:nvPr/>
+        </p:nvSpPr>
+        <p:spPr>
+          <a:xfrm>
+            <a:off x="2792090" y="3714497"/>
+            <a:ext cx="1156943" cy="414172"/>
+          </a:xfrm>
+          <a:prstGeom prst="rect">
+            <a:avLst/>
+          </a:prstGeom>
+        </p:spPr>
+        <p:style>
+          <a:lnRef idx="2">
+            <a:schemeClr val="dk1"/>
+          </a:lnRef>
+          <a:fillRef idx="1">
+            <a:schemeClr val="lt1"/>
+          </a:fillRef>
+          <a:effectRef idx="0">
+            <a:schemeClr val="dk1"/>
+          </a:effectRef>
+          <a:fontRef idx="minor">
+            <a:schemeClr val="dk1"/>
+          </a:fontRef>
+        </p:style>
+        <p:txBody>
+          <a:bodyPr rtlCol="0" anchor="ctr"/>
+          <a:lstStyle/>
+          <a:p>
+            <a:pPr algn="ctr"/>
+            <a:r>
+              <a:rPr lang="en-US" dirty="0" smtClean="0"/>
+              <a:t>exploits</a:t>
+            </a:r>
+            <a:endParaRPr lang="en-US" dirty="0"/>
+          </a:p>
+        </p:txBody>
+      </p:sp>
+      <p:sp>
+        <p:nvSpPr>
+          <p:cNvPr id="32" name="Rectangle 31"/>
+          <p:cNvSpPr/>
+          <p:nvPr/>
+        </p:nvSpPr>
+        <p:spPr>
+          <a:xfrm>
+            <a:off x="4101433" y="3714497"/>
+            <a:ext cx="1156943" cy="414172"/>
+          </a:xfrm>
+          <a:prstGeom prst="rect">
+            <a:avLst/>
+          </a:prstGeom>
+        </p:spPr>
+        <p:style>
+          <a:lnRef idx="2">
+            <a:schemeClr val="dk1"/>
+          </a:lnRef>
+          <a:fillRef idx="1">
+            <a:schemeClr val="lt1"/>
+          </a:fillRef>
+          <a:effectRef idx="0">
+            <a:schemeClr val="dk1"/>
+          </a:effectRef>
+          <a:fontRef idx="minor">
+            <a:schemeClr val="dk1"/>
+          </a:fontRef>
+        </p:style>
+        <p:txBody>
+          <a:bodyPr rtlCol="0" anchor="ctr"/>
+          <a:lstStyle/>
+          <a:p>
+            <a:pPr algn="ctr"/>
+            <a:endParaRPr lang="en-US" dirty="0"/>
+          </a:p>
+        </p:txBody>
+      </p:sp>
+      <p:sp>
+        <p:nvSpPr>
+          <p:cNvPr id="33" name="Rectangle 32"/>
+          <p:cNvSpPr/>
+          <p:nvPr/>
+        </p:nvSpPr>
+        <p:spPr>
+          <a:xfrm>
+            <a:off x="5410776" y="3714497"/>
+            <a:ext cx="1156943" cy="414172"/>
+          </a:xfrm>
+          <a:prstGeom prst="rect">
+            <a:avLst/>
+          </a:prstGeom>
+        </p:spPr>
+        <p:style>
+          <a:lnRef idx="2">
+            <a:schemeClr val="dk1"/>
+          </a:lnRef>
+          <a:fillRef idx="1">
+            <a:schemeClr val="lt1"/>
+          </a:fillRef>
+          <a:effectRef idx="0">
+            <a:schemeClr val="dk1"/>
+          </a:effectRef>
+          <a:fontRef idx="minor">
+            <a:schemeClr val="dk1"/>
+          </a:fontRef>
+        </p:style>
+        <p:txBody>
+          <a:bodyPr rtlCol="0" anchor="ctr"/>
+          <a:lstStyle/>
+          <a:p>
+            <a:pPr algn="ctr"/>
+            <a:r>
+              <a:rPr lang="en-US" dirty="0" smtClean="0"/>
+              <a:t>Quark II</a:t>
+            </a:r>
+            <a:endParaRPr lang="en-US" dirty="0"/>
+          </a:p>
+        </p:txBody>
+      </p:sp>
+      <p:sp>
+        <p:nvSpPr>
+          <p:cNvPr id="34" name="Rectangle 33"/>
+          <p:cNvSpPr/>
+          <p:nvPr/>
+        </p:nvSpPr>
+        <p:spPr>
+          <a:xfrm>
+            <a:off x="6700255" y="3714497"/>
+            <a:ext cx="1156943" cy="414172"/>
+          </a:xfrm>
+          <a:prstGeom prst="rect">
+            <a:avLst/>
+          </a:prstGeom>
+        </p:spPr>
+        <p:style>
+          <a:lnRef idx="2">
+            <a:schemeClr val="dk1"/>
+          </a:lnRef>
+          <a:fillRef idx="1">
+            <a:schemeClr val="lt1"/>
+          </a:fillRef>
+          <a:effectRef idx="0">
+            <a:schemeClr val="dk1"/>
+          </a:effectRef>
+          <a:fontRef idx="minor">
+            <a:schemeClr val="dk1"/>
+          </a:fontRef>
+        </p:style>
+        <p:txBody>
+          <a:bodyPr rtlCol="0" anchor="ctr"/>
+          <a:lstStyle/>
+          <a:p>
+            <a:pPr algn="ctr"/>
+            <a:r>
+              <a:rPr lang="en-US" dirty="0" smtClean="0"/>
+              <a:t>worm</a:t>
+            </a:r>
+            <a:endParaRPr lang="en-US" dirty="0"/>
+          </a:p>
+        </p:txBody>
+      </p:sp>
+      <p:sp>
+        <p:nvSpPr>
+          <p:cNvPr id="35" name="Rectangle 34"/>
+          <p:cNvSpPr/>
+          <p:nvPr/>
+        </p:nvSpPr>
+        <p:spPr>
+          <a:xfrm>
+            <a:off x="193268" y="3153023"/>
+            <a:ext cx="1156943" cy="414172"/>
+          </a:xfrm>
+          <a:prstGeom prst="rect">
+            <a:avLst/>
+          </a:prstGeom>
+        </p:spPr>
+        <p:style>
+          <a:lnRef idx="2">
+            <a:schemeClr val="dk1"/>
+          </a:lnRef>
+          <a:fillRef idx="1">
+            <a:schemeClr val="lt1"/>
+          </a:fillRef>
+          <a:effectRef idx="0">
+            <a:schemeClr val="dk1"/>
+          </a:effectRef>
+          <a:fontRef idx="minor">
+            <a:schemeClr val="dk1"/>
+          </a:fontRef>
+        </p:style>
+        <p:txBody>
+          <a:bodyPr rtlCol="0" anchor="ctr"/>
+          <a:lstStyle/>
+          <a:p>
+            <a:pPr algn="ctr"/>
+            <a:r>
+              <a:rPr lang="en-US" dirty="0" smtClean="0"/>
+              <a:t>ads</a:t>
+            </a:r>
+            <a:endParaRPr lang="en-US" dirty="0"/>
+          </a:p>
+        </p:txBody>
+      </p:sp>
+      <p:sp>
+        <p:nvSpPr>
+          <p:cNvPr id="36" name="Rectangle 35"/>
+          <p:cNvSpPr/>
+          <p:nvPr/>
+        </p:nvSpPr>
+        <p:spPr>
+          <a:xfrm>
+            <a:off x="1502611" y="3153023"/>
+            <a:ext cx="1156943" cy="414172"/>
+          </a:xfrm>
+          <a:prstGeom prst="rect">
+            <a:avLst/>
+          </a:prstGeom>
+        </p:spPr>
+        <p:style>
+          <a:lnRef idx="2">
+            <a:schemeClr val="dk1"/>
+          </a:lnRef>
+          <a:fillRef idx="1">
+            <a:schemeClr val="lt1"/>
+          </a:fillRef>
+          <a:effectRef idx="0">
+            <a:schemeClr val="dk1"/>
+          </a:effectRef>
+          <a:fontRef idx="minor">
+            <a:schemeClr val="dk1"/>
+          </a:fontRef>
+        </p:style>
+        <p:txBody>
+          <a:bodyPr rtlCol="0" anchor="ctr"/>
+          <a:lstStyle/>
+          <a:p>
+            <a:pPr algn="ctr"/>
+            <a:endParaRPr lang="en-US"/>
+          </a:p>
+        </p:txBody>
+      </p:sp>
+      <p:sp>
+        <p:nvSpPr>
+          <p:cNvPr id="37" name="Rectangle 36"/>
+          <p:cNvSpPr/>
+          <p:nvPr/>
+        </p:nvSpPr>
+        <p:spPr>
+          <a:xfrm>
+            <a:off x="2792090" y="3153023"/>
+            <a:ext cx="1156943" cy="414172"/>
+          </a:xfrm>
+          <a:prstGeom prst="rect">
+            <a:avLst/>
+          </a:prstGeom>
+        </p:spPr>
+        <p:style>
+          <a:lnRef idx="2">
+            <a:schemeClr val="dk1"/>
+          </a:lnRef>
+          <a:fillRef idx="1">
+            <a:schemeClr val="lt1"/>
+          </a:fillRef>
+          <a:effectRef idx="0">
+            <a:schemeClr val="dk1"/>
+          </a:effectRef>
+          <a:fontRef idx="minor">
+            <a:schemeClr val="dk1"/>
+          </a:fontRef>
+        </p:style>
+        <p:txBody>
+          <a:bodyPr rtlCol="0" anchor="ctr"/>
+          <a:lstStyle/>
+          <a:p>
+            <a:pPr algn="ctr"/>
+            <a:r>
+              <a:rPr lang="en-US" dirty="0" smtClean="0"/>
+              <a:t>hardware</a:t>
+            </a:r>
+            <a:endParaRPr lang="en-US" dirty="0"/>
+          </a:p>
+        </p:txBody>
+      </p:sp>
+      <p:sp>
+        <p:nvSpPr>
+          <p:cNvPr id="38" name="Rectangle 37"/>
+          <p:cNvSpPr/>
+          <p:nvPr/>
+        </p:nvSpPr>
+        <p:spPr>
+          <a:xfrm>
+            <a:off x="4101433" y="3153023"/>
+            <a:ext cx="1156943" cy="414172"/>
+          </a:xfrm>
+          <a:prstGeom prst="rect">
+            <a:avLst/>
+          </a:prstGeom>
+        </p:spPr>
+        <p:style>
+          <a:lnRef idx="2">
+            <a:schemeClr val="dk1"/>
+          </a:lnRef>
+          <a:fillRef idx="1">
+            <a:schemeClr val="lt1"/>
+          </a:fillRef>
+          <a:effectRef idx="0">
+            <a:schemeClr val="dk1"/>
+          </a:effectRef>
+          <a:fontRef idx="minor">
+            <a:schemeClr val="dk1"/>
+          </a:fontRef>
+        </p:style>
+        <p:txBody>
+          <a:bodyPr rtlCol="0" anchor="ctr"/>
+          <a:lstStyle/>
+          <a:p>
+            <a:pPr algn="ctr"/>
+            <a:endParaRPr lang="en-US"/>
+          </a:p>
+        </p:txBody>
+      </p:sp>
+      <p:sp>
+        <p:nvSpPr>
+          <p:cNvPr id="39" name="Rectangle 38"/>
+          <p:cNvSpPr/>
+          <p:nvPr/>
+        </p:nvSpPr>
+        <p:spPr>
+          <a:xfrm>
+            <a:off x="5410776" y="3153023"/>
+            <a:ext cx="1156943" cy="414172"/>
+          </a:xfrm>
+          <a:prstGeom prst="rect">
+            <a:avLst/>
+          </a:prstGeom>
+        </p:spPr>
+        <p:style>
+          <a:lnRef idx="2">
+            <a:schemeClr val="dk1"/>
+          </a:lnRef>
+          <a:fillRef idx="1">
+            <a:schemeClr val="lt1"/>
+          </a:fillRef>
+          <a:effectRef idx="0">
+            <a:schemeClr val="dk1"/>
+          </a:effectRef>
+          <a:fontRef idx="minor">
+            <a:schemeClr val="dk1"/>
+          </a:fontRef>
+        </p:style>
+        <p:txBody>
+          <a:bodyPr rtlCol="0" anchor="ctr"/>
+          <a:lstStyle/>
+          <a:p>
+            <a:pPr algn="ctr"/>
+            <a:endParaRPr lang="en-US"/>
+          </a:p>
+        </p:txBody>
+      </p:sp>
+      <p:sp>
+        <p:nvSpPr>
+          <p:cNvPr id="40" name="Rectangle 39"/>
+          <p:cNvSpPr/>
+          <p:nvPr/>
+        </p:nvSpPr>
+        <p:spPr>
+          <a:xfrm>
+            <a:off x="6700255" y="3153023"/>
+            <a:ext cx="1156943" cy="414172"/>
+          </a:xfrm>
+          <a:prstGeom prst="rect">
+            <a:avLst/>
+          </a:prstGeom>
+        </p:spPr>
+        <p:style>
+          <a:lnRef idx="2">
+            <a:schemeClr val="dk1"/>
+          </a:lnRef>
+          <a:fillRef idx="1">
+            <a:schemeClr val="lt1"/>
+          </a:fillRef>
+          <a:effectRef idx="0">
+            <a:schemeClr val="dk1"/>
+          </a:effectRef>
+          <a:fontRef idx="minor">
+            <a:schemeClr val="dk1"/>
+          </a:fontRef>
+        </p:style>
+        <p:txBody>
+          <a:bodyPr rtlCol="0" anchor="ctr"/>
+          <a:lstStyle/>
+          <a:p>
+            <a:pPr algn="ctr"/>
+            <a:endParaRPr lang="en-US"/>
+          </a:p>
+        </p:txBody>
+      </p:sp>
+      <p:sp>
+        <p:nvSpPr>
+          <p:cNvPr id="41" name="Rectangle 40"/>
+          <p:cNvSpPr/>
+          <p:nvPr/>
+        </p:nvSpPr>
+        <p:spPr>
+          <a:xfrm>
+            <a:off x="193268" y="2604918"/>
+            <a:ext cx="1156943" cy="414172"/>
+          </a:xfrm>
+          <a:prstGeom prst="rect">
+            <a:avLst/>
+          </a:prstGeom>
+        </p:spPr>
+        <p:style>
+          <a:lnRef idx="2">
+            <a:schemeClr val="dk1"/>
+          </a:lnRef>
+          <a:fillRef idx="1">
+            <a:schemeClr val="lt1"/>
+          </a:fillRef>
+          <a:effectRef idx="0">
+            <a:schemeClr val="dk1"/>
+          </a:effectRef>
+          <a:fontRef idx="minor">
+            <a:schemeClr val="dk1"/>
+          </a:fontRef>
+        </p:style>
+        <p:txBody>
+          <a:bodyPr rtlCol="0" anchor="ctr"/>
+          <a:lstStyle/>
+          <a:p>
+            <a:pPr algn="ctr"/>
+            <a:endParaRPr lang="en-US"/>
+          </a:p>
+        </p:txBody>
+      </p:sp>
+      <p:sp>
+        <p:nvSpPr>
+          <p:cNvPr id="42" name="Rectangle 41"/>
+          <p:cNvSpPr/>
+          <p:nvPr/>
+        </p:nvSpPr>
+        <p:spPr>
+          <a:xfrm>
+            <a:off x="1502611" y="2604918"/>
+            <a:ext cx="1156943" cy="414172"/>
+          </a:xfrm>
+          <a:prstGeom prst="rect">
+            <a:avLst/>
+          </a:prstGeom>
+        </p:spPr>
+        <p:style>
+          <a:lnRef idx="2">
+            <a:schemeClr val="dk1"/>
+          </a:lnRef>
+          <a:fillRef idx="1">
+            <a:schemeClr val="lt1"/>
+          </a:fillRef>
+          <a:effectRef idx="0">
+            <a:schemeClr val="dk1"/>
+          </a:effectRef>
+          <a:fontRef idx="minor">
+            <a:schemeClr val="dk1"/>
+          </a:fontRef>
+        </p:style>
+        <p:txBody>
+          <a:bodyPr rtlCol="0" anchor="ctr"/>
+          <a:lstStyle/>
+          <a:p>
+            <a:pPr algn="ctr"/>
+            <a:endParaRPr lang="en-US"/>
+          </a:p>
+        </p:txBody>
+      </p:sp>
+      <p:sp>
+        <p:nvSpPr>
+          <p:cNvPr id="43" name="Rectangle 42"/>
+          <p:cNvSpPr/>
+          <p:nvPr/>
+        </p:nvSpPr>
+        <p:spPr>
+          <a:xfrm>
+            <a:off x="2792090" y="2604918"/>
+            <a:ext cx="1156943" cy="414172"/>
+          </a:xfrm>
+          <a:prstGeom prst="rect">
+            <a:avLst/>
+          </a:prstGeom>
+        </p:spPr>
+        <p:style>
+          <a:lnRef idx="2">
+            <a:schemeClr val="dk1"/>
+          </a:lnRef>
+          <a:fillRef idx="1">
+            <a:schemeClr val="lt1"/>
+          </a:fillRef>
+          <a:effectRef idx="0">
+            <a:schemeClr val="dk1"/>
+          </a:effectRef>
+          <a:fontRef idx="minor">
+            <a:schemeClr val="dk1"/>
+          </a:fontRef>
+        </p:style>
+        <p:txBody>
+          <a:bodyPr rtlCol="0" anchor="ctr"/>
+          <a:lstStyle/>
+          <a:p>
+            <a:pPr algn="ctr"/>
+            <a:r>
+              <a:rPr lang="en-US" dirty="0" smtClean="0"/>
+              <a:t>silicon</a:t>
+            </a:r>
+            <a:endParaRPr lang="en-US" dirty="0"/>
+          </a:p>
+        </p:txBody>
+      </p:sp>
+      <p:sp>
+        <p:nvSpPr>
+          <p:cNvPr id="44" name="Rectangle 43"/>
+          <p:cNvSpPr/>
+          <p:nvPr/>
+        </p:nvSpPr>
+        <p:spPr>
+          <a:xfrm>
+            <a:off x="4101433" y="2604918"/>
+            <a:ext cx="1156943" cy="414172"/>
+          </a:xfrm>
+          <a:prstGeom prst="rect">
+            <a:avLst/>
+          </a:prstGeom>
+        </p:spPr>
+        <p:style>
+          <a:lnRef idx="2">
+            <a:schemeClr val="dk1"/>
+          </a:lnRef>
+          <a:fillRef idx="1">
+            <a:schemeClr val="lt1"/>
+          </a:fillRef>
+          <a:effectRef idx="0">
+            <a:schemeClr val="dk1"/>
+          </a:effectRef>
+          <a:fontRef idx="minor">
+            <a:schemeClr val="dk1"/>
+          </a:fontRef>
+        </p:style>
+        <p:txBody>
+          <a:bodyPr rtlCol="0" anchor="ctr"/>
+          <a:lstStyle/>
+          <a:p>
+            <a:pPr algn="ctr"/>
+            <a:endParaRPr lang="en-US"/>
+          </a:p>
+        </p:txBody>
+      </p:sp>
+      <p:sp>
+        <p:nvSpPr>
+          <p:cNvPr id="45" name="Rectangle 44"/>
+          <p:cNvSpPr/>
+          <p:nvPr/>
+        </p:nvSpPr>
+        <p:spPr>
+          <a:xfrm>
+            <a:off x="5410776" y="2604918"/>
+            <a:ext cx="1156943" cy="414172"/>
+          </a:xfrm>
+          <a:prstGeom prst="rect">
+            <a:avLst/>
+          </a:prstGeom>
+        </p:spPr>
+        <p:style>
+          <a:lnRef idx="2">
+            <a:schemeClr val="dk1"/>
+          </a:lnRef>
+          <a:fillRef idx="1">
+            <a:schemeClr val="lt1"/>
+          </a:fillRef>
+          <a:effectRef idx="0">
+            <a:schemeClr val="dk1"/>
+          </a:effectRef>
+          <a:fontRef idx="minor">
+            <a:schemeClr val="dk1"/>
+          </a:fontRef>
+        </p:style>
+        <p:txBody>
+          <a:bodyPr rtlCol="0" anchor="ctr"/>
+          <a:lstStyle/>
+          <a:p>
+            <a:pPr algn="ctr"/>
+            <a:endParaRPr lang="en-US"/>
+          </a:p>
+        </p:txBody>
+      </p:sp>
+      <p:sp>
+        <p:nvSpPr>
+          <p:cNvPr id="46" name="Rectangle 45"/>
+          <p:cNvSpPr/>
+          <p:nvPr/>
+        </p:nvSpPr>
+        <p:spPr>
+          <a:xfrm>
+            <a:off x="6700255" y="2604918"/>
+            <a:ext cx="1156943" cy="414172"/>
+          </a:xfrm>
+          <a:prstGeom prst="rect">
+            <a:avLst/>
+          </a:prstGeom>
+        </p:spPr>
+        <p:style>
+          <a:lnRef idx="2">
+            <a:schemeClr val="dk1"/>
+          </a:lnRef>
+          <a:fillRef idx="1">
+            <a:schemeClr val="lt1"/>
+          </a:fillRef>
+          <a:effectRef idx="0">
+            <a:schemeClr val="dk1"/>
+          </a:effectRef>
+          <a:fontRef idx="minor">
+            <a:schemeClr val="dk1"/>
+          </a:fontRef>
+        </p:style>
+        <p:txBody>
+          <a:bodyPr rtlCol="0" anchor="ctr"/>
+          <a:lstStyle/>
+          <a:p>
+            <a:pPr algn="ctr"/>
+            <a:endParaRPr lang="en-US"/>
+          </a:p>
+        </p:txBody>
+      </p:sp>
+      <p:sp>
+        <p:nvSpPr>
+          <p:cNvPr id="47" name="Rectangle 46"/>
+          <p:cNvSpPr/>
+          <p:nvPr/>
+        </p:nvSpPr>
+        <p:spPr>
+          <a:xfrm>
+            <a:off x="193268" y="2083550"/>
+            <a:ext cx="1156943" cy="414172"/>
+          </a:xfrm>
+          <a:prstGeom prst="rect">
+            <a:avLst/>
+          </a:prstGeom>
+        </p:spPr>
+        <p:style>
+          <a:lnRef idx="2">
+            <a:schemeClr val="dk1"/>
+          </a:lnRef>
+          <a:fillRef idx="1">
+            <a:schemeClr val="lt1"/>
+          </a:fillRef>
+          <a:effectRef idx="0">
+            <a:schemeClr val="dk1"/>
+          </a:effectRef>
+          <a:fontRef idx="minor">
+            <a:schemeClr val="dk1"/>
+          </a:fontRef>
+        </p:style>
+        <p:txBody>
+          <a:bodyPr rtlCol="0" anchor="ctr"/>
+          <a:lstStyle/>
+          <a:p>
+            <a:pPr algn="ctr"/>
+            <a:endParaRPr lang="en-US"/>
+          </a:p>
+        </p:txBody>
+      </p:sp>
+      <p:sp>
+        <p:nvSpPr>
+          <p:cNvPr id="48" name="Rectangle 47"/>
+          <p:cNvSpPr/>
+          <p:nvPr/>
+        </p:nvSpPr>
+        <p:spPr>
+          <a:xfrm>
+            <a:off x="1502611" y="2083550"/>
+            <a:ext cx="1156943" cy="414172"/>
+          </a:xfrm>
+          <a:prstGeom prst="rect">
+            <a:avLst/>
+          </a:prstGeom>
+        </p:spPr>
+        <p:style>
+          <a:lnRef idx="2">
+            <a:schemeClr val="dk1"/>
+          </a:lnRef>
+          <a:fillRef idx="1">
+            <a:schemeClr val="lt1"/>
+          </a:fillRef>
+          <a:effectRef idx="0">
+            <a:schemeClr val="dk1"/>
+          </a:effectRef>
+          <a:fontRef idx="minor">
+            <a:schemeClr val="dk1"/>
+          </a:fontRef>
+        </p:style>
+        <p:txBody>
+          <a:bodyPr rtlCol="0" anchor="ctr"/>
+          <a:lstStyle/>
+          <a:p>
+            <a:pPr algn="ctr"/>
+            <a:endParaRPr lang="en-US"/>
+          </a:p>
+        </p:txBody>
+      </p:sp>
+      <p:sp>
+        <p:nvSpPr>
+          <p:cNvPr id="49" name="Rectangle 48"/>
+          <p:cNvSpPr/>
+          <p:nvPr/>
+        </p:nvSpPr>
+        <p:spPr>
+          <a:xfrm>
+            <a:off x="2792090" y="2083550"/>
+            <a:ext cx="1156943" cy="414172"/>
+          </a:xfrm>
+          <a:prstGeom prst="rect">
+            <a:avLst/>
+          </a:prstGeom>
+        </p:spPr>
+        <p:style>
+          <a:lnRef idx="2">
+            <a:schemeClr val="dk1"/>
+          </a:lnRef>
+          <a:fillRef idx="1">
+            <a:schemeClr val="lt1"/>
+          </a:fillRef>
+          <a:effectRef idx="0">
+            <a:schemeClr val="dk1"/>
+          </a:effectRef>
+          <a:fontRef idx="minor">
+            <a:schemeClr val="dk1"/>
+          </a:fontRef>
+        </p:style>
+        <p:txBody>
+          <a:bodyPr rtlCol="0" anchor="ctr"/>
+          <a:lstStyle/>
+          <a:p>
+            <a:pPr algn="ctr"/>
+            <a:endParaRPr lang="en-US" dirty="0"/>
+          </a:p>
+        </p:txBody>
+      </p:sp>
+      <p:sp>
+        <p:nvSpPr>
+          <p:cNvPr id="50" name="Rectangle 49"/>
+          <p:cNvSpPr/>
+          <p:nvPr/>
+        </p:nvSpPr>
+        <p:spPr>
+          <a:xfrm>
+            <a:off x="4101433" y="2083550"/>
+            <a:ext cx="1156943" cy="414172"/>
+          </a:xfrm>
+          <a:prstGeom prst="rect">
+            <a:avLst/>
+          </a:prstGeom>
+        </p:spPr>
+        <p:style>
+          <a:lnRef idx="2">
+            <a:schemeClr val="dk1"/>
+          </a:lnRef>
+          <a:fillRef idx="1">
+            <a:schemeClr val="lt1"/>
+          </a:fillRef>
+          <a:effectRef idx="0">
+            <a:schemeClr val="dk1"/>
+          </a:effectRef>
+          <a:fontRef idx="minor">
+            <a:schemeClr val="dk1"/>
+          </a:fontRef>
+        </p:style>
+        <p:txBody>
+          <a:bodyPr rtlCol="0" anchor="ctr"/>
+          <a:lstStyle/>
+          <a:p>
+            <a:pPr algn="ctr"/>
+            <a:endParaRPr lang="en-US"/>
+          </a:p>
+        </p:txBody>
+      </p:sp>
+      <p:sp>
+        <p:nvSpPr>
+          <p:cNvPr id="51" name="Rectangle 50"/>
+          <p:cNvSpPr/>
+          <p:nvPr/>
+        </p:nvSpPr>
+        <p:spPr>
+          <a:xfrm>
+            <a:off x="5410776" y="2083550"/>
+            <a:ext cx="1156943" cy="414172"/>
+          </a:xfrm>
+          <a:prstGeom prst="rect">
+            <a:avLst/>
+          </a:prstGeom>
+        </p:spPr>
+        <p:style>
+          <a:lnRef idx="2">
+            <a:schemeClr val="dk1"/>
+          </a:lnRef>
+          <a:fillRef idx="1">
+            <a:schemeClr val="lt1"/>
+          </a:fillRef>
+          <a:effectRef idx="0">
+            <a:schemeClr val="dk1"/>
+          </a:effectRef>
+          <a:fontRef idx="minor">
+            <a:schemeClr val="dk1"/>
+          </a:fontRef>
+        </p:style>
+        <p:txBody>
+          <a:bodyPr rtlCol="0" anchor="ctr"/>
+          <a:lstStyle/>
+          <a:p>
+            <a:pPr algn="ctr"/>
+            <a:endParaRPr lang="en-US"/>
+          </a:p>
+        </p:txBody>
+      </p:sp>
+      <p:sp>
+        <p:nvSpPr>
+          <p:cNvPr id="52" name="Rectangle 51"/>
+          <p:cNvSpPr/>
+          <p:nvPr/>
+        </p:nvSpPr>
+        <p:spPr>
+          <a:xfrm>
+            <a:off x="6700255" y="2083550"/>
+            <a:ext cx="1156943" cy="414172"/>
+          </a:xfrm>
+          <a:prstGeom prst="rect">
+            <a:avLst/>
+          </a:prstGeom>
+        </p:spPr>
+        <p:style>
+          <a:lnRef idx="2">
+            <a:schemeClr val="dk1"/>
+          </a:lnRef>
+          <a:fillRef idx="1">
+            <a:schemeClr val="lt1"/>
+          </a:fillRef>
+          <a:effectRef idx="0">
+            <a:schemeClr val="dk1"/>
+          </a:effectRef>
+          <a:fontRef idx="minor">
+            <a:schemeClr val="dk1"/>
+          </a:fontRef>
+        </p:style>
+        <p:txBody>
+          <a:bodyPr rtlCol="0" anchor="ctr"/>
+          <a:lstStyle/>
+          <a:p>
+            <a:pPr algn="ctr"/>
+            <a:endParaRPr lang="en-US"/>
+          </a:p>
+        </p:txBody>
+      </p:sp>
+      <p:sp>
+        <p:nvSpPr>
+          <p:cNvPr id="3" name="TextBox 2"/>
+          <p:cNvSpPr txBox="1"/>
+          <p:nvPr/>
+        </p:nvSpPr>
+        <p:spPr>
+          <a:xfrm>
+            <a:off x="8000129" y="2094745"/>
+            <a:ext cx="301660" cy="369332"/>
+          </a:xfrm>
+          <a:prstGeom prst="rect">
+            <a:avLst/>
+          </a:prstGeom>
+          <a:noFill/>
+        </p:spPr>
+        <p:txBody>
+          <a:bodyPr wrap="none" rtlCol="0">
+            <a:spAutoFit/>
+          </a:bodyPr>
+          <a:lstStyle/>
+          <a:p>
+            <a:r>
+              <a:rPr lang="en-US" dirty="0"/>
+              <a:t>1</a:t>
+            </a:r>
+          </a:p>
+        </p:txBody>
+      </p:sp>
+      <p:sp>
+        <p:nvSpPr>
+          <p:cNvPr id="59" name="TextBox 58"/>
+          <p:cNvSpPr txBox="1"/>
+          <p:nvPr/>
+        </p:nvSpPr>
+        <p:spPr>
+          <a:xfrm>
+            <a:off x="8013497" y="2555233"/>
+            <a:ext cx="301660" cy="369332"/>
+          </a:xfrm>
+          <a:prstGeom prst="rect">
+            <a:avLst/>
+          </a:prstGeom>
+          <a:noFill/>
+        </p:spPr>
+        <p:txBody>
+          <a:bodyPr wrap="none" rtlCol="0">
+            <a:spAutoFit/>
+          </a:bodyPr>
+          <a:lstStyle/>
+          <a:p>
+            <a:r>
+              <a:rPr lang="en-US" dirty="0" smtClean="0"/>
+              <a:t>2</a:t>
+            </a:r>
+            <a:endParaRPr lang="en-US" dirty="0"/>
+          </a:p>
+        </p:txBody>
+      </p:sp>
+      <p:sp>
+        <p:nvSpPr>
+          <p:cNvPr id="60" name="TextBox 59"/>
+          <p:cNvSpPr txBox="1"/>
+          <p:nvPr/>
+        </p:nvSpPr>
+        <p:spPr>
+          <a:xfrm>
+            <a:off x="8000129" y="3153661"/>
+            <a:ext cx="301660" cy="369332"/>
+          </a:xfrm>
+          <a:prstGeom prst="rect">
+            <a:avLst/>
+          </a:prstGeom>
+          <a:noFill/>
+        </p:spPr>
+        <p:txBody>
+          <a:bodyPr wrap="none" rtlCol="0">
+            <a:spAutoFit/>
+          </a:bodyPr>
+          <a:lstStyle/>
+          <a:p>
+            <a:r>
+              <a:rPr lang="en-US" dirty="0"/>
+              <a:t>3</a:t>
+            </a:r>
+          </a:p>
+        </p:txBody>
+      </p:sp>
+      <p:sp>
+        <p:nvSpPr>
+          <p:cNvPr id="61" name="TextBox 60"/>
+          <p:cNvSpPr txBox="1"/>
+          <p:nvPr/>
+        </p:nvSpPr>
+        <p:spPr>
+          <a:xfrm>
+            <a:off x="8013497" y="3672219"/>
+            <a:ext cx="301660" cy="369332"/>
+          </a:xfrm>
+          <a:prstGeom prst="rect">
+            <a:avLst/>
+          </a:prstGeom>
+          <a:noFill/>
+        </p:spPr>
+        <p:txBody>
+          <a:bodyPr wrap="none" rtlCol="0">
+            <a:spAutoFit/>
+          </a:bodyPr>
+          <a:lstStyle/>
+          <a:p>
+            <a:r>
+              <a:rPr lang="en-US" dirty="0"/>
+              <a:t>4</a:t>
+            </a:r>
+          </a:p>
+        </p:txBody>
+      </p:sp>
+      <p:sp>
+        <p:nvSpPr>
+          <p:cNvPr id="62" name="TextBox 61"/>
+          <p:cNvSpPr txBox="1"/>
+          <p:nvPr/>
+        </p:nvSpPr>
+        <p:spPr>
+          <a:xfrm>
+            <a:off x="8001699" y="4233693"/>
+            <a:ext cx="301660" cy="369332"/>
+          </a:xfrm>
+          <a:prstGeom prst="rect">
+            <a:avLst/>
+          </a:prstGeom>
+          <a:noFill/>
+        </p:spPr>
+        <p:txBody>
+          <a:bodyPr wrap="none" rtlCol="0">
+            <a:spAutoFit/>
+          </a:bodyPr>
+          <a:lstStyle/>
+          <a:p>
+            <a:r>
+              <a:rPr lang="en-US" dirty="0"/>
+              <a:t>5</a:t>
+            </a:r>
+          </a:p>
+        </p:txBody>
+      </p:sp>
+      <p:sp>
+        <p:nvSpPr>
+          <p:cNvPr id="63" name="TextBox 62"/>
+          <p:cNvSpPr txBox="1"/>
+          <p:nvPr/>
+        </p:nvSpPr>
+        <p:spPr>
+          <a:xfrm>
+            <a:off x="8000129" y="4766869"/>
+            <a:ext cx="301660" cy="369332"/>
+          </a:xfrm>
+          <a:prstGeom prst="rect">
+            <a:avLst/>
+          </a:prstGeom>
+          <a:noFill/>
+        </p:spPr>
+        <p:txBody>
+          <a:bodyPr wrap="none" rtlCol="0">
+            <a:spAutoFit/>
+          </a:bodyPr>
+          <a:lstStyle/>
+          <a:p>
+            <a:r>
+              <a:rPr lang="en-US" dirty="0"/>
+              <a:t>6</a:t>
+            </a:r>
+          </a:p>
+        </p:txBody>
+      </p:sp>
+      <p:sp>
+        <p:nvSpPr>
+          <p:cNvPr id="64" name="TextBox 63"/>
+          <p:cNvSpPr txBox="1"/>
+          <p:nvPr/>
+        </p:nvSpPr>
+        <p:spPr>
+          <a:xfrm>
+            <a:off x="8013497" y="5383377"/>
+            <a:ext cx="301660" cy="369332"/>
+          </a:xfrm>
+          <a:prstGeom prst="rect">
+            <a:avLst/>
+          </a:prstGeom>
+          <a:noFill/>
+        </p:spPr>
+        <p:txBody>
+          <a:bodyPr wrap="none" rtlCol="0">
+            <a:spAutoFit/>
+          </a:bodyPr>
+          <a:lstStyle/>
+          <a:p>
+            <a:r>
+              <a:rPr lang="en-US" dirty="0"/>
+              <a:t>7</a:t>
+            </a:r>
+          </a:p>
+        </p:txBody>
+      </p:sp>
+      <p:sp>
+        <p:nvSpPr>
+          <p:cNvPr id="66" name="TextBox 65"/>
+          <p:cNvSpPr txBox="1"/>
+          <p:nvPr/>
+        </p:nvSpPr>
+        <p:spPr>
+          <a:xfrm>
+            <a:off x="639477" y="1206217"/>
+            <a:ext cx="6731380" cy="369332"/>
+          </a:xfrm>
+          <a:prstGeom prst="rect">
+            <a:avLst/>
+          </a:prstGeom>
+          <a:noFill/>
+        </p:spPr>
+        <p:txBody>
+          <a:bodyPr wrap="none" rtlCol="0">
+            <a:spAutoFit/>
+          </a:bodyPr>
+          <a:lstStyle/>
+          <a:p>
+            <a:r>
+              <a:rPr lang="en-US" dirty="0" smtClean="0"/>
+              <a:t>1                   2                       3                       4                        5                       6  </a:t>
+            </a:r>
+            <a:endParaRPr lang="en-US" dirty="0"/>
+          </a:p>
+        </p:txBody>
+      </p:sp>
+    </p:spTree>
+    <p:extLst>
+      <p:ext uri="{BB962C8B-B14F-4D97-AF65-F5344CB8AC3E}">
+        <p14:creationId xmlns:p14="http://schemas.microsoft.com/office/powerpoint/2010/main" val="1574149826"/>
+      </p:ext>
+    </p:extLst>
+  </p:cSld>
+  <p:clrMapOvr>
+    <a:masterClrMapping/>
+  </p:clrMapOvr>
+</p:sld>
+</file>
+
 <file path=ppt/theme/theme1.xml><?xml version="1.0" encoding="utf-8"?>
 <a:theme xmlns:a="http://schemas.openxmlformats.org/drawingml/2006/main" name="Office Theme">
   <a:themeElements>

</xml_diff>

<commit_message>
restore point before I start going backbone...
</commit_message>
<xml_diff>
--- a/puzzle9_resourceGuide.pptx
+++ b/puzzle9_resourceGuide.pptx
@@ -11,8 +11,10 @@
     <p:sldId id="260" r:id="rId5"/>
     <p:sldId id="261" r:id="rId6"/>
     <p:sldId id="262" r:id="rId7"/>
-    <p:sldId id="263" r:id="rId8"/>
-    <p:sldId id="264" r:id="rId9"/>
+    <p:sldId id="266" r:id="rId8"/>
+    <p:sldId id="263" r:id="rId9"/>
+    <p:sldId id="264" r:id="rId10"/>
+    <p:sldId id="265" r:id="rId11"/>
   </p:sldIdLst>
   <p:sldSz cx="9144000" cy="6858000" type="screen4x3"/>
   <p:notesSz cx="6858000" cy="9144000"/>
@@ -295,7 +297,7 @@
           <a:p>
             <a:fld id="{83C2B043-E5D7-564F-B47B-C0FE35424682}" type="datetimeFigureOut">
               <a:rPr lang="en-US" smtClean="0"/>
-              <a:t>11/7/15</a:t>
+              <a:t>11/11/15</a:t>
             </a:fld>
             <a:endParaRPr lang="en-US"/>
           </a:p>
@@ -465,7 +467,7 @@
           <a:p>
             <a:fld id="{83C2B043-E5D7-564F-B47B-C0FE35424682}" type="datetimeFigureOut">
               <a:rPr lang="en-US" smtClean="0"/>
-              <a:t>11/7/15</a:t>
+              <a:t>11/11/15</a:t>
             </a:fld>
             <a:endParaRPr lang="en-US"/>
           </a:p>
@@ -645,7 +647,7 @@
           <a:p>
             <a:fld id="{83C2B043-E5D7-564F-B47B-C0FE35424682}" type="datetimeFigureOut">
               <a:rPr lang="en-US" smtClean="0"/>
-              <a:t>11/7/15</a:t>
+              <a:t>11/11/15</a:t>
             </a:fld>
             <a:endParaRPr lang="en-US"/>
           </a:p>
@@ -815,7 +817,7 @@
           <a:p>
             <a:fld id="{83C2B043-E5D7-564F-B47B-C0FE35424682}" type="datetimeFigureOut">
               <a:rPr lang="en-US" smtClean="0"/>
-              <a:t>11/7/15</a:t>
+              <a:t>11/11/15</a:t>
             </a:fld>
             <a:endParaRPr lang="en-US"/>
           </a:p>
@@ -1061,7 +1063,7 @@
           <a:p>
             <a:fld id="{83C2B043-E5D7-564F-B47B-C0FE35424682}" type="datetimeFigureOut">
               <a:rPr lang="en-US" smtClean="0"/>
-              <a:t>11/7/15</a:t>
+              <a:t>11/11/15</a:t>
             </a:fld>
             <a:endParaRPr lang="en-US"/>
           </a:p>
@@ -1349,7 +1351,7 @@
           <a:p>
             <a:fld id="{83C2B043-E5D7-564F-B47B-C0FE35424682}" type="datetimeFigureOut">
               <a:rPr lang="en-US" smtClean="0"/>
-              <a:t>11/7/15</a:t>
+              <a:t>11/11/15</a:t>
             </a:fld>
             <a:endParaRPr lang="en-US"/>
           </a:p>
@@ -1771,7 +1773,7 @@
           <a:p>
             <a:fld id="{83C2B043-E5D7-564F-B47B-C0FE35424682}" type="datetimeFigureOut">
               <a:rPr lang="en-US" smtClean="0"/>
-              <a:t>11/7/15</a:t>
+              <a:t>11/11/15</a:t>
             </a:fld>
             <a:endParaRPr lang="en-US"/>
           </a:p>
@@ -1889,7 +1891,7 @@
           <a:p>
             <a:fld id="{83C2B043-E5D7-564F-B47B-C0FE35424682}" type="datetimeFigureOut">
               <a:rPr lang="en-US" smtClean="0"/>
-              <a:t>11/7/15</a:t>
+              <a:t>11/11/15</a:t>
             </a:fld>
             <a:endParaRPr lang="en-US"/>
           </a:p>
@@ -1984,7 +1986,7 @@
           <a:p>
             <a:fld id="{83C2B043-E5D7-564F-B47B-C0FE35424682}" type="datetimeFigureOut">
               <a:rPr lang="en-US" smtClean="0"/>
-              <a:t>11/7/15</a:t>
+              <a:t>11/11/15</a:t>
             </a:fld>
             <a:endParaRPr lang="en-US"/>
           </a:p>
@@ -2261,7 +2263,7 @@
           <a:p>
             <a:fld id="{83C2B043-E5D7-564F-B47B-C0FE35424682}" type="datetimeFigureOut">
               <a:rPr lang="en-US" smtClean="0"/>
-              <a:t>11/7/15</a:t>
+              <a:t>11/11/15</a:t>
             </a:fld>
             <a:endParaRPr lang="en-US"/>
           </a:p>
@@ -2514,7 +2516,7 @@
           <a:p>
             <a:fld id="{83C2B043-E5D7-564F-B47B-C0FE35424682}" type="datetimeFigureOut">
               <a:rPr lang="en-US" smtClean="0"/>
-              <a:t>11/7/15</a:t>
+              <a:t>11/11/15</a:t>
             </a:fld>
             <a:endParaRPr lang="en-US"/>
           </a:p>
@@ -2727,7 +2729,7 @@
           <a:p>
             <a:fld id="{83C2B043-E5D7-564F-B47B-C0FE35424682}" type="datetimeFigureOut">
               <a:rPr lang="en-US" smtClean="0"/>
-              <a:t>11/7/15</a:t>
+              <a:t>11/11/15</a:t>
             </a:fld>
             <a:endParaRPr lang="en-US"/>
           </a:p>
@@ -5386,6 +5388,566 @@
 </p:sld>
 </file>
 
+<file path=ppt/slides/slide10.xml><?xml version="1.0" encoding="utf-8"?>
+<p:sld xmlns:a="http://schemas.openxmlformats.org/drawingml/2006/main" xmlns:r="http://schemas.openxmlformats.org/officeDocument/2006/relationships" xmlns:p="http://schemas.openxmlformats.org/presentationml/2006/main">
+  <p:cSld>
+    <p:spTree>
+      <p:nvGrpSpPr>
+        <p:cNvPr id="1" name=""/>
+        <p:cNvGrpSpPr/>
+        <p:nvPr/>
+      </p:nvGrpSpPr>
+      <p:grpSpPr>
+        <a:xfrm>
+          <a:off x="0" y="0"/>
+          <a:ext cx="0" cy="0"/>
+          <a:chOff x="0" y="0"/>
+          <a:chExt cx="0" cy="0"/>
+        </a:xfrm>
+      </p:grpSpPr>
+      <p:sp>
+        <p:nvSpPr>
+          <p:cNvPr id="2" name="Title 1"/>
+          <p:cNvSpPr>
+            <a:spLocks noGrp="1"/>
+          </p:cNvSpPr>
+          <p:nvPr>
+            <p:ph type="title"/>
+          </p:nvPr>
+        </p:nvSpPr>
+        <p:spPr>
+          <a:xfrm>
+            <a:off x="457200" y="-191848"/>
+            <a:ext cx="8229600" cy="1143000"/>
+          </a:xfrm>
+        </p:spPr>
+        <p:txBody>
+          <a:bodyPr/>
+          <a:lstStyle/>
+          <a:p>
+            <a:r>
+              <a:rPr lang="en-US" dirty="0" smtClean="0"/>
+              <a:t>Game Timeline</a:t>
+            </a:r>
+            <a:endParaRPr lang="en-US" dirty="0"/>
+          </a:p>
+        </p:txBody>
+      </p:sp>
+      <p:cxnSp>
+        <p:nvCxnSpPr>
+          <p:cNvPr id="5" name="Straight Connector 4"/>
+          <p:cNvCxnSpPr/>
+          <p:nvPr/>
+        </p:nvCxnSpPr>
+        <p:spPr>
+          <a:xfrm>
+            <a:off x="764565" y="951152"/>
+            <a:ext cx="0" cy="5126131"/>
+          </a:xfrm>
+          <a:prstGeom prst="line">
+            <a:avLst/>
+          </a:prstGeom>
+        </p:spPr>
+        <p:style>
+          <a:lnRef idx="2">
+            <a:schemeClr val="accent1"/>
+          </a:lnRef>
+          <a:fillRef idx="0">
+            <a:schemeClr val="accent1"/>
+          </a:fillRef>
+          <a:effectRef idx="1">
+            <a:schemeClr val="accent1"/>
+          </a:effectRef>
+          <a:fontRef idx="minor">
+            <a:schemeClr val="tx1"/>
+          </a:fontRef>
+        </p:style>
+      </p:cxnSp>
+      <p:cxnSp>
+        <p:nvCxnSpPr>
+          <p:cNvPr id="6" name="Straight Connector 5"/>
+          <p:cNvCxnSpPr/>
+          <p:nvPr/>
+        </p:nvCxnSpPr>
+        <p:spPr>
+          <a:xfrm>
+            <a:off x="4571325" y="2798919"/>
+            <a:ext cx="0" cy="3278364"/>
+          </a:xfrm>
+          <a:prstGeom prst="line">
+            <a:avLst/>
+          </a:prstGeom>
+        </p:spPr>
+        <p:style>
+          <a:lnRef idx="2">
+            <a:schemeClr val="accent1"/>
+          </a:lnRef>
+          <a:fillRef idx="0">
+            <a:schemeClr val="accent1"/>
+          </a:fillRef>
+          <a:effectRef idx="1">
+            <a:schemeClr val="accent1"/>
+          </a:effectRef>
+          <a:fontRef idx="minor">
+            <a:schemeClr val="tx1"/>
+          </a:fontRef>
+        </p:style>
+      </p:cxnSp>
+      <p:sp>
+        <p:nvSpPr>
+          <p:cNvPr id="3" name="TextBox 2"/>
+          <p:cNvSpPr txBox="1"/>
+          <p:nvPr/>
+        </p:nvSpPr>
+        <p:spPr>
+          <a:xfrm>
+            <a:off x="1010781" y="945440"/>
+            <a:ext cx="1373624" cy="553998"/>
+          </a:xfrm>
+          <a:prstGeom prst="rect">
+            <a:avLst/>
+          </a:prstGeom>
+          <a:noFill/>
+        </p:spPr>
+        <p:txBody>
+          <a:bodyPr wrap="square" rtlCol="0">
+            <a:spAutoFit/>
+          </a:bodyPr>
+          <a:lstStyle/>
+          <a:p>
+            <a:r>
+              <a:rPr lang="en-US" sz="1000" dirty="0" err="1" smtClean="0"/>
+              <a:t>P.e.</a:t>
+            </a:r>
+            <a:r>
+              <a:rPr lang="en-US" sz="1000" dirty="0" smtClean="0"/>
+              <a:t> murders victim in an online blackmail scheme gone wrong</a:t>
+            </a:r>
+            <a:endParaRPr lang="en-US" sz="1000" dirty="0"/>
+          </a:p>
+        </p:txBody>
+      </p:sp>
+      <p:sp>
+        <p:nvSpPr>
+          <p:cNvPr id="7" name="TextBox 6"/>
+          <p:cNvSpPr txBox="1"/>
+          <p:nvPr/>
+        </p:nvSpPr>
+        <p:spPr>
+          <a:xfrm>
+            <a:off x="67028" y="6187395"/>
+            <a:ext cx="1887506" cy="369332"/>
+          </a:xfrm>
+          <a:prstGeom prst="rect">
+            <a:avLst/>
+          </a:prstGeom>
+          <a:noFill/>
+        </p:spPr>
+        <p:txBody>
+          <a:bodyPr wrap="none" rtlCol="0">
+            <a:spAutoFit/>
+          </a:bodyPr>
+          <a:lstStyle/>
+          <a:p>
+            <a:r>
+              <a:rPr lang="en-US" dirty="0" smtClean="0"/>
+              <a:t>Historical timeline</a:t>
+            </a:r>
+            <a:endParaRPr lang="en-US" dirty="0"/>
+          </a:p>
+        </p:txBody>
+      </p:sp>
+      <p:sp>
+        <p:nvSpPr>
+          <p:cNvPr id="8" name="TextBox 7"/>
+          <p:cNvSpPr txBox="1"/>
+          <p:nvPr/>
+        </p:nvSpPr>
+        <p:spPr>
+          <a:xfrm>
+            <a:off x="3550691" y="6187395"/>
+            <a:ext cx="2192389" cy="369332"/>
+          </a:xfrm>
+          <a:prstGeom prst="rect">
+            <a:avLst/>
+          </a:prstGeom>
+          <a:noFill/>
+        </p:spPr>
+        <p:txBody>
+          <a:bodyPr wrap="none" rtlCol="0">
+            <a:spAutoFit/>
+          </a:bodyPr>
+          <a:lstStyle/>
+          <a:p>
+            <a:r>
+              <a:rPr lang="en-US" dirty="0" smtClean="0"/>
+              <a:t>Game reveal timeline</a:t>
+            </a:r>
+            <a:endParaRPr lang="en-US" dirty="0"/>
+          </a:p>
+        </p:txBody>
+      </p:sp>
+      <p:sp>
+        <p:nvSpPr>
+          <p:cNvPr id="9" name="TextBox 8"/>
+          <p:cNvSpPr txBox="1"/>
+          <p:nvPr/>
+        </p:nvSpPr>
+        <p:spPr>
+          <a:xfrm>
+            <a:off x="1010781" y="1789154"/>
+            <a:ext cx="1373624" cy="1169551"/>
+          </a:xfrm>
+          <a:prstGeom prst="rect">
+            <a:avLst/>
+          </a:prstGeom>
+          <a:noFill/>
+        </p:spPr>
+        <p:txBody>
+          <a:bodyPr wrap="square" rtlCol="0">
+            <a:spAutoFit/>
+          </a:bodyPr>
+          <a:lstStyle/>
+          <a:p>
+            <a:r>
+              <a:rPr lang="en-US" sz="1000" dirty="0" err="1" smtClean="0"/>
+              <a:t>P.e.</a:t>
+            </a:r>
+            <a:r>
+              <a:rPr lang="en-US" sz="1000" dirty="0" smtClean="0"/>
+              <a:t> leaves the U.S. and joins an online criminal syndicate, eventually starting his own organization and becoming THE online crime kingpin</a:t>
+            </a:r>
+            <a:endParaRPr lang="en-US" sz="1000" dirty="0"/>
+          </a:p>
+        </p:txBody>
+      </p:sp>
+      <p:sp>
+        <p:nvSpPr>
+          <p:cNvPr id="14" name="TextBox 13"/>
+          <p:cNvSpPr txBox="1"/>
+          <p:nvPr/>
+        </p:nvSpPr>
+        <p:spPr>
+          <a:xfrm>
+            <a:off x="3967790" y="2361603"/>
+            <a:ext cx="1207069" cy="369332"/>
+          </a:xfrm>
+          <a:prstGeom prst="rect">
+            <a:avLst/>
+          </a:prstGeom>
+          <a:noFill/>
+        </p:spPr>
+        <p:txBody>
+          <a:bodyPr wrap="none" rtlCol="0">
+            <a:spAutoFit/>
+          </a:bodyPr>
+          <a:lstStyle/>
+          <a:p>
+            <a:r>
+              <a:rPr lang="en-US" dirty="0" smtClean="0"/>
+              <a:t>Start game</a:t>
+            </a:r>
+            <a:endParaRPr lang="en-US" dirty="0"/>
+          </a:p>
+        </p:txBody>
+      </p:sp>
+      <p:sp>
+        <p:nvSpPr>
+          <p:cNvPr id="16" name="TextBox 15"/>
+          <p:cNvSpPr txBox="1"/>
+          <p:nvPr/>
+        </p:nvSpPr>
+        <p:spPr>
+          <a:xfrm>
+            <a:off x="1010781" y="3418762"/>
+            <a:ext cx="1373624" cy="400110"/>
+          </a:xfrm>
+          <a:prstGeom prst="rect">
+            <a:avLst/>
+          </a:prstGeom>
+          <a:noFill/>
+        </p:spPr>
+        <p:txBody>
+          <a:bodyPr wrap="square" rtlCol="0">
+            <a:spAutoFit/>
+          </a:bodyPr>
+          <a:lstStyle/>
+          <a:p>
+            <a:r>
+              <a:rPr lang="en-US" sz="1000" dirty="0" smtClean="0"/>
+              <a:t>E.Q. group posts a puzzle</a:t>
+            </a:r>
+            <a:endParaRPr lang="en-US" sz="1000" dirty="0"/>
+          </a:p>
+        </p:txBody>
+      </p:sp>
+      <p:cxnSp>
+        <p:nvCxnSpPr>
+          <p:cNvPr id="18" name="Straight Arrow Connector 17"/>
+          <p:cNvCxnSpPr>
+            <a:stCxn id="16" idx="3"/>
+          </p:cNvCxnSpPr>
+          <p:nvPr/>
+        </p:nvCxnSpPr>
+        <p:spPr>
+          <a:xfrm flipV="1">
+            <a:off x="2384405" y="2958705"/>
+            <a:ext cx="2086355" cy="660112"/>
+          </a:xfrm>
+          <a:prstGeom prst="straightConnector1">
+            <a:avLst/>
+          </a:prstGeom>
+          <a:ln>
+            <a:tailEnd type="arrow"/>
+          </a:ln>
+        </p:spPr>
+        <p:style>
+          <a:lnRef idx="2">
+            <a:schemeClr val="accent1"/>
+          </a:lnRef>
+          <a:fillRef idx="0">
+            <a:schemeClr val="accent1"/>
+          </a:fillRef>
+          <a:effectRef idx="1">
+            <a:schemeClr val="accent1"/>
+          </a:effectRef>
+          <a:fontRef idx="minor">
+            <a:schemeClr val="tx1"/>
+          </a:fontRef>
+        </p:style>
+      </p:cxnSp>
+      <p:sp>
+        <p:nvSpPr>
+          <p:cNvPr id="19" name="TextBox 18"/>
+          <p:cNvSpPr txBox="1"/>
+          <p:nvPr/>
+        </p:nvSpPr>
+        <p:spPr>
+          <a:xfrm>
+            <a:off x="4626263" y="2722207"/>
+            <a:ext cx="2594994" cy="369332"/>
+          </a:xfrm>
+          <a:prstGeom prst="rect">
+            <a:avLst/>
+          </a:prstGeom>
+          <a:noFill/>
+        </p:spPr>
+        <p:txBody>
+          <a:bodyPr wrap="none" rtlCol="0">
+            <a:spAutoFit/>
+          </a:bodyPr>
+          <a:lstStyle/>
+          <a:p>
+            <a:r>
+              <a:rPr lang="en-US" dirty="0" smtClean="0"/>
+              <a:t>Game starts with a puzzle</a:t>
+            </a:r>
+            <a:endParaRPr lang="en-US" dirty="0"/>
+          </a:p>
+        </p:txBody>
+      </p:sp>
+      <p:sp>
+        <p:nvSpPr>
+          <p:cNvPr id="20" name="TextBox 19"/>
+          <p:cNvSpPr txBox="1"/>
+          <p:nvPr/>
+        </p:nvSpPr>
+        <p:spPr>
+          <a:xfrm>
+            <a:off x="4695386" y="3880427"/>
+            <a:ext cx="4093263" cy="369332"/>
+          </a:xfrm>
+          <a:prstGeom prst="rect">
+            <a:avLst/>
+          </a:prstGeom>
+          <a:noFill/>
+        </p:spPr>
+        <p:txBody>
+          <a:bodyPr wrap="none" rtlCol="0">
+            <a:spAutoFit/>
+          </a:bodyPr>
+          <a:lstStyle/>
+          <a:p>
+            <a:r>
+              <a:rPr lang="en-US" dirty="0" smtClean="0"/>
+              <a:t>Player can read an article about P.E.’s rise</a:t>
+            </a:r>
+            <a:endParaRPr lang="en-US" dirty="0"/>
+          </a:p>
+        </p:txBody>
+      </p:sp>
+      <p:cxnSp>
+        <p:nvCxnSpPr>
+          <p:cNvPr id="21" name="Straight Arrow Connector 20"/>
+          <p:cNvCxnSpPr/>
+          <p:nvPr/>
+        </p:nvCxnSpPr>
+        <p:spPr>
+          <a:xfrm>
+            <a:off x="2135084" y="2034047"/>
+            <a:ext cx="2335676" cy="1938713"/>
+          </a:xfrm>
+          <a:prstGeom prst="straightConnector1">
+            <a:avLst/>
+          </a:prstGeom>
+          <a:ln>
+            <a:tailEnd type="arrow"/>
+          </a:ln>
+        </p:spPr>
+        <p:style>
+          <a:lnRef idx="2">
+            <a:schemeClr val="accent1"/>
+          </a:lnRef>
+          <a:fillRef idx="0">
+            <a:schemeClr val="accent1"/>
+          </a:fillRef>
+          <a:effectRef idx="1">
+            <a:schemeClr val="accent1"/>
+          </a:effectRef>
+          <a:fontRef idx="minor">
+            <a:schemeClr val="tx1"/>
+          </a:fontRef>
+        </p:style>
+      </p:cxnSp>
+      <p:cxnSp>
+        <p:nvCxnSpPr>
+          <p:cNvPr id="23" name="Straight Arrow Connector 22"/>
+          <p:cNvCxnSpPr/>
+          <p:nvPr/>
+        </p:nvCxnSpPr>
+        <p:spPr>
+          <a:xfrm>
+            <a:off x="2190022" y="1318311"/>
+            <a:ext cx="2280738" cy="3631629"/>
+          </a:xfrm>
+          <a:prstGeom prst="straightConnector1">
+            <a:avLst/>
+          </a:prstGeom>
+          <a:ln>
+            <a:tailEnd type="arrow"/>
+          </a:ln>
+        </p:spPr>
+        <p:style>
+          <a:lnRef idx="2">
+            <a:schemeClr val="accent1"/>
+          </a:lnRef>
+          <a:fillRef idx="0">
+            <a:schemeClr val="accent1"/>
+          </a:fillRef>
+          <a:effectRef idx="1">
+            <a:schemeClr val="accent1"/>
+          </a:effectRef>
+          <a:fontRef idx="minor">
+            <a:schemeClr val="tx1"/>
+          </a:fontRef>
+        </p:style>
+      </p:cxnSp>
+      <p:sp>
+        <p:nvSpPr>
+          <p:cNvPr id="25" name="TextBox 24"/>
+          <p:cNvSpPr txBox="1"/>
+          <p:nvPr/>
+        </p:nvSpPr>
+        <p:spPr>
+          <a:xfrm>
+            <a:off x="4643551" y="4765274"/>
+            <a:ext cx="4500450" cy="646331"/>
+          </a:xfrm>
+          <a:prstGeom prst="rect">
+            <a:avLst/>
+          </a:prstGeom>
+          <a:noFill/>
+        </p:spPr>
+        <p:txBody>
+          <a:bodyPr wrap="square" rtlCol="0">
+            <a:spAutoFit/>
+          </a:bodyPr>
+          <a:lstStyle/>
+          <a:p>
+            <a:r>
+              <a:rPr lang="en-US" dirty="0" smtClean="0"/>
+              <a:t>Player learns that P.E. murdered someone long ago</a:t>
+            </a:r>
+            <a:endParaRPr lang="en-US" dirty="0"/>
+          </a:p>
+        </p:txBody>
+      </p:sp>
+      <p:sp>
+        <p:nvSpPr>
+          <p:cNvPr id="28" name="TextBox 27"/>
+          <p:cNvSpPr txBox="1"/>
+          <p:nvPr/>
+        </p:nvSpPr>
+        <p:spPr>
+          <a:xfrm>
+            <a:off x="1010781" y="4395942"/>
+            <a:ext cx="1373624" cy="553998"/>
+          </a:xfrm>
+          <a:prstGeom prst="rect">
+            <a:avLst/>
+          </a:prstGeom>
+          <a:noFill/>
+        </p:spPr>
+        <p:txBody>
+          <a:bodyPr wrap="square" rtlCol="0">
+            <a:spAutoFit/>
+          </a:bodyPr>
+          <a:lstStyle/>
+          <a:p>
+            <a:r>
+              <a:rPr lang="en-US" sz="1000" dirty="0" smtClean="0"/>
+              <a:t>Contact made with E.Q. and worm is provided</a:t>
+            </a:r>
+            <a:endParaRPr lang="en-US" sz="1000" dirty="0"/>
+          </a:p>
+        </p:txBody>
+      </p:sp>
+      <p:cxnSp>
+        <p:nvCxnSpPr>
+          <p:cNvPr id="29" name="Straight Arrow Connector 28"/>
+          <p:cNvCxnSpPr/>
+          <p:nvPr/>
+        </p:nvCxnSpPr>
+        <p:spPr>
+          <a:xfrm>
+            <a:off x="2008789" y="4765274"/>
+            <a:ext cx="2461971" cy="962144"/>
+          </a:xfrm>
+          <a:prstGeom prst="straightConnector1">
+            <a:avLst/>
+          </a:prstGeom>
+          <a:ln>
+            <a:tailEnd type="arrow"/>
+          </a:ln>
+        </p:spPr>
+        <p:style>
+          <a:lnRef idx="2">
+            <a:schemeClr val="accent1"/>
+          </a:lnRef>
+          <a:fillRef idx="0">
+            <a:schemeClr val="accent1"/>
+          </a:fillRef>
+          <a:effectRef idx="1">
+            <a:schemeClr val="accent1"/>
+          </a:effectRef>
+          <a:fontRef idx="minor">
+            <a:schemeClr val="tx1"/>
+          </a:fontRef>
+        </p:style>
+      </p:cxnSp>
+    </p:spTree>
+    <p:extLst>
+      <p:ext uri="{BB962C8B-B14F-4D97-AF65-F5344CB8AC3E}">
+        <p14:creationId xmlns:p14="http://schemas.microsoft.com/office/powerpoint/2010/main" val="2909407887"/>
+      </p:ext>
+    </p:extLst>
+  </p:cSld>
+  <p:clrMapOvr>
+    <a:masterClrMapping/>
+  </p:clrMapOvr>
+</p:sld>
+</file>
+
 <file path=ppt/slides/slide2.xml><?xml version="1.0" encoding="utf-8"?>
 <p:sld xmlns:a="http://schemas.openxmlformats.org/drawingml/2006/main" xmlns:r="http://schemas.openxmlformats.org/officeDocument/2006/relationships" xmlns:p="http://schemas.openxmlformats.org/presentationml/2006/main">
   <p:cSld>
@@ -5555,17 +6117,29 @@
           <a:lstStyle/>
           <a:p>
             <a:r>
-              <a:rPr lang="en-US" sz="1000" dirty="0" smtClean="0"/>
+              <a:rPr lang="en-US" sz="1000" dirty="0" smtClean="0">
+                <a:solidFill>
+                  <a:schemeClr val="accent6"/>
+                </a:solidFill>
+              </a:rPr>
               <a:t>Spyware/</a:t>
             </a:r>
           </a:p>
           <a:p>
             <a:r>
-              <a:rPr lang="en-US" sz="1000" dirty="0" err="1" smtClean="0"/>
+              <a:rPr lang="en-US" sz="1000" dirty="0" err="1" smtClean="0">
+                <a:solidFill>
+                  <a:schemeClr val="accent6"/>
+                </a:solidFill>
+              </a:rPr>
               <a:t>Zyng</a:t>
             </a:r>
             <a:r>
-              <a:rPr lang="en-US" sz="1000" dirty="0" smtClean="0"/>
+              <a:rPr lang="en-US" sz="1000" dirty="0" smtClean="0">
+                <a:solidFill>
+                  <a:schemeClr val="accent6"/>
+                </a:solidFill>
+              </a:rPr>
               <a:t>!</a:t>
             </a:r>
           </a:p>
@@ -5580,7 +6154,7 @@
         <p:spPr>
           <a:xfrm>
             <a:off x="5285330" y="5141740"/>
-            <a:ext cx="781033" cy="246221"/>
+            <a:ext cx="909774" cy="246221"/>
           </a:xfrm>
           <a:prstGeom prst="rect">
             <a:avLst/>
@@ -5594,10 +6168,18 @@
           <a:lstStyle/>
           <a:p>
             <a:r>
-              <a:rPr lang="en-US" sz="1000" dirty="0" smtClean="0"/>
-              <a:t>Faction site</a:t>
-            </a:r>
-            <a:endParaRPr lang="en-US" sz="1000" dirty="0"/>
+              <a:rPr lang="en-US" sz="1000" dirty="0" err="1" smtClean="0">
+                <a:solidFill>
+                  <a:schemeClr val="accent6"/>
+                </a:solidFill>
+              </a:rPr>
+              <a:t>freedompress</a:t>
+            </a:r>
+            <a:endParaRPr lang="en-US" sz="1000" dirty="0">
+              <a:solidFill>
+                <a:schemeClr val="accent6"/>
+              </a:solidFill>
+            </a:endParaRPr>
           </a:p>
         </p:txBody>
       </p:sp>
@@ -5658,14 +6240,26 @@
           <a:lstStyle/>
           <a:p>
             <a:r>
-              <a:rPr lang="en-US" sz="1000" dirty="0"/>
+              <a:rPr lang="en-US" sz="1000" dirty="0">
+                <a:solidFill>
+                  <a:srgbClr val="9BBB59"/>
+                </a:solidFill>
+              </a:rPr>
               <a:t>t</a:t>
             </a:r>
             <a:r>
-              <a:rPr lang="en-US" sz="1000" dirty="0" smtClean="0"/>
+              <a:rPr lang="en-US" sz="1000" dirty="0" smtClean="0">
+                <a:solidFill>
+                  <a:srgbClr val="9BBB59"/>
+                </a:solidFill>
+              </a:rPr>
               <a:t>rade secrets</a:t>
             </a:r>
-            <a:endParaRPr lang="en-US" sz="1000" dirty="0"/>
+            <a:endParaRPr lang="en-US" sz="1000" dirty="0">
+              <a:solidFill>
+                <a:srgbClr val="9BBB59"/>
+              </a:solidFill>
+            </a:endParaRPr>
           </a:p>
         </p:txBody>
       </p:sp>
@@ -5722,10 +6316,18 @@
           <a:lstStyle/>
           <a:p>
             <a:r>
-              <a:rPr lang="en-US" sz="1000" dirty="0" smtClean="0"/>
+              <a:rPr lang="en-US" sz="1000" dirty="0" smtClean="0">
+                <a:solidFill>
+                  <a:srgbClr val="9BBB59"/>
+                </a:solidFill>
+              </a:rPr>
               <a:t>pills</a:t>
             </a:r>
-            <a:endParaRPr lang="en-US" sz="1000" dirty="0"/>
+            <a:endParaRPr lang="en-US" sz="1000" dirty="0">
+              <a:solidFill>
+                <a:srgbClr val="9BBB59"/>
+              </a:solidFill>
+            </a:endParaRPr>
           </a:p>
         </p:txBody>
       </p:sp>
@@ -6099,7 +6701,7 @@
         <p:spPr>
           <a:xfrm>
             <a:off x="5275713" y="4361964"/>
-            <a:ext cx="728059" cy="246221"/>
+            <a:ext cx="725993" cy="246221"/>
           </a:xfrm>
           <a:prstGeom prst="rect">
             <a:avLst/>
@@ -6113,8 +6715,8 @@
           <a:lstStyle/>
           <a:p>
             <a:r>
-              <a:rPr lang="en-US" sz="1000" dirty="0" err="1" smtClean="0"/>
-              <a:t>hacktivists</a:t>
+              <a:rPr lang="en-US" sz="1000" dirty="0" smtClean="0"/>
+              <a:t>journalists</a:t>
             </a:r>
             <a:endParaRPr lang="en-US" sz="1000" dirty="0"/>
           </a:p>
@@ -6279,10 +6881,18 @@
           <a:lstStyle/>
           <a:p>
             <a:r>
-              <a:rPr lang="en-US" sz="1000" dirty="0" smtClean="0"/>
+              <a:rPr lang="en-US" sz="1000" dirty="0" smtClean="0">
+                <a:solidFill>
+                  <a:srgbClr val="9BBB59"/>
+                </a:solidFill>
+              </a:rPr>
               <a:t>emails</a:t>
             </a:r>
-            <a:endParaRPr lang="en-US" sz="1000" dirty="0"/>
+            <a:endParaRPr lang="en-US" sz="1000" dirty="0">
+              <a:solidFill>
+                <a:srgbClr val="9BBB59"/>
+              </a:solidFill>
+            </a:endParaRPr>
           </a:p>
         </p:txBody>
       </p:sp>
@@ -6309,10 +6919,18 @@
           <a:lstStyle/>
           <a:p>
             <a:r>
-              <a:rPr lang="en-US" sz="1000" dirty="0" smtClean="0"/>
+              <a:rPr lang="en-US" sz="1000" dirty="0" smtClean="0">
+                <a:solidFill>
+                  <a:srgbClr val="9BBB59"/>
+                </a:solidFill>
+              </a:rPr>
               <a:t>passwords</a:t>
             </a:r>
-            <a:endParaRPr lang="en-US" sz="1000" dirty="0"/>
+            <a:endParaRPr lang="en-US" sz="1000" dirty="0">
+              <a:solidFill>
+                <a:srgbClr val="9BBB59"/>
+              </a:solidFill>
+            </a:endParaRPr>
           </a:p>
         </p:txBody>
       </p:sp>
@@ -6356,14 +6974,14 @@
       </p:cxnSp>
       <p:sp>
         <p:nvSpPr>
-          <p:cNvPr id="114" name="TextBox 113"/>
+          <p:cNvPr id="117" name="TextBox 116"/>
           <p:cNvSpPr txBox="1"/>
           <p:nvPr/>
         </p:nvSpPr>
         <p:spPr>
           <a:xfrm>
-            <a:off x="5044659" y="3818604"/>
-            <a:ext cx="412781" cy="246221"/>
+            <a:off x="4644247" y="5367348"/>
+            <a:ext cx="618917" cy="246221"/>
           </a:xfrm>
           <a:prstGeom prst="rect">
             <a:avLst/>
@@ -6377,25 +6995,75 @@
           <a:lstStyle/>
           <a:p>
             <a:r>
-              <a:rPr lang="en-US" sz="1000" dirty="0" smtClean="0"/>
-              <a:t>bots</a:t>
+              <a:rPr lang="en-US" sz="1000" dirty="0" err="1"/>
+              <a:t>b</a:t>
+            </a:r>
+            <a:r>
+              <a:rPr lang="en-US" sz="1000" dirty="0" err="1" smtClean="0"/>
+              <a:t>tc+pills</a:t>
             </a:r>
             <a:endParaRPr lang="en-US" sz="1000" dirty="0"/>
+          </a:p>
+        </p:txBody>
+      </p:sp>
+      <p:sp>
+        <p:nvSpPr>
+          <p:cNvPr id="118" name="TextBox 117"/>
+          <p:cNvSpPr txBox="1"/>
+          <p:nvPr/>
+        </p:nvSpPr>
+        <p:spPr>
+          <a:xfrm>
+            <a:off x="5562656" y="3720705"/>
+            <a:ext cx="746969" cy="400110"/>
+          </a:xfrm>
+          <a:prstGeom prst="rect">
+            <a:avLst/>
+          </a:prstGeom>
+          <a:noFill/>
+        </p:spPr>
+        <p:txBody>
+          <a:bodyPr wrap="none" rtlCol="0">
+            <a:spAutoFit/>
+          </a:bodyPr>
+          <a:lstStyle/>
+          <a:p>
+            <a:r>
+              <a:rPr lang="en-US" sz="1000" dirty="0" smtClean="0">
+                <a:solidFill>
+                  <a:srgbClr val="9BBB59"/>
+                </a:solidFill>
+              </a:rPr>
+              <a:t>Diplomatic </a:t>
+            </a:r>
+          </a:p>
+          <a:p>
+            <a:r>
+              <a:rPr lang="en-US" sz="1000" dirty="0" err="1" smtClean="0">
+                <a:solidFill>
+                  <a:srgbClr val="9BBB59"/>
+                </a:solidFill>
+              </a:rPr>
+              <a:t>intel</a:t>
+            </a:r>
+            <a:endParaRPr lang="en-US" sz="1000" dirty="0">
+              <a:solidFill>
+                <a:srgbClr val="9BBB59"/>
+              </a:solidFill>
+            </a:endParaRPr>
           </a:p>
         </p:txBody>
       </p:sp>
       <p:cxnSp>
         <p:nvCxnSpPr>
-          <p:cNvPr id="115" name="Straight Arrow Connector 114"/>
-          <p:cNvCxnSpPr>
-            <a:endCxn id="114" idx="2"/>
-          </p:cNvCxnSpPr>
+          <p:cNvPr id="119" name="Straight Arrow Connector 118"/>
+          <p:cNvCxnSpPr/>
           <p:nvPr/>
         </p:nvCxnSpPr>
         <p:spPr>
-          <a:xfrm flipH="1" flipV="1">
-            <a:off x="5251050" y="4064825"/>
-            <a:ext cx="50075" cy="403053"/>
+          <a:xfrm flipV="1">
+            <a:off x="5787449" y="4171361"/>
+            <a:ext cx="0" cy="242369"/>
           </a:xfrm>
           <a:prstGeom prst="straightConnector1">
             <a:avLst/>
@@ -6424,14 +7092,14 @@
       </p:cxnSp>
       <p:sp>
         <p:nvSpPr>
-          <p:cNvPr id="117" name="TextBox 116"/>
+          <p:cNvPr id="123" name="TextBox 122"/>
           <p:cNvSpPr txBox="1"/>
           <p:nvPr/>
         </p:nvSpPr>
         <p:spPr>
           <a:xfrm>
-            <a:off x="4644247" y="5367348"/>
-            <a:ext cx="618917" cy="246221"/>
+            <a:off x="6904352" y="5039616"/>
+            <a:ext cx="891052" cy="246221"/>
           </a:xfrm>
           <a:prstGeom prst="rect">
             <a:avLst/>
@@ -6445,12 +7113,8 @@
           <a:lstStyle/>
           <a:p>
             <a:r>
-              <a:rPr lang="en-US" sz="1000" dirty="0" err="1"/>
-              <a:t>b</a:t>
-            </a:r>
-            <a:r>
-              <a:rPr lang="en-US" sz="1000" dirty="0" err="1" smtClean="0"/>
-              <a:t>tc+pills</a:t>
+              <a:rPr lang="en-US" sz="1000" dirty="0" smtClean="0"/>
+              <a:t>operation137</a:t>
             </a:r>
             <a:endParaRPr lang="en-US" sz="1000" dirty="0"/>
           </a:p>
@@ -6458,14 +7122,14 @@
       </p:sp>
       <p:sp>
         <p:nvSpPr>
-          <p:cNvPr id="118" name="TextBox 117"/>
+          <p:cNvPr id="139" name="TextBox 138"/>
           <p:cNvSpPr txBox="1"/>
           <p:nvPr/>
         </p:nvSpPr>
         <p:spPr>
           <a:xfrm>
-            <a:off x="5562656" y="3720705"/>
-            <a:ext cx="746969" cy="400110"/>
+            <a:off x="3692000" y="5080037"/>
+            <a:ext cx="813043" cy="246221"/>
           </a:xfrm>
           <a:prstGeom prst="rect">
             <a:avLst/>
@@ -6479,37 +7143,37 @@
           <a:lstStyle/>
           <a:p>
             <a:r>
-              <a:rPr lang="en-US" sz="1000" dirty="0" smtClean="0"/>
-              <a:t>Diplomatic </a:t>
-            </a:r>
-          </a:p>
-          <a:p>
-            <a:r>
-              <a:rPr lang="en-US" sz="1000" dirty="0" err="1" smtClean="0"/>
-              <a:t>intel</a:t>
-            </a:r>
-            <a:endParaRPr lang="en-US" sz="1000" dirty="0"/>
+              <a:rPr lang="en-US" sz="1000" dirty="0" smtClean="0">
+                <a:solidFill>
+                  <a:schemeClr val="accent6"/>
+                </a:solidFill>
+              </a:rPr>
+              <a:t>E-pharmacy</a:t>
+            </a:r>
+            <a:endParaRPr lang="en-US" sz="1000" dirty="0">
+              <a:solidFill>
+                <a:schemeClr val="accent6"/>
+              </a:solidFill>
+            </a:endParaRPr>
           </a:p>
         </p:txBody>
       </p:sp>
       <p:cxnSp>
         <p:nvCxnSpPr>
-          <p:cNvPr id="119" name="Straight Arrow Connector 118"/>
+          <p:cNvPr id="14" name="Straight Arrow Connector 13"/>
           <p:cNvCxnSpPr/>
           <p:nvPr/>
         </p:nvCxnSpPr>
         <p:spPr>
           <a:xfrm flipV="1">
-            <a:off x="5787449" y="4171361"/>
-            <a:ext cx="0" cy="242369"/>
+            <a:off x="4907731" y="3388403"/>
+            <a:ext cx="0" cy="1541916"/>
           </a:xfrm>
           <a:prstGeom prst="straightConnector1">
             <a:avLst/>
           </a:prstGeom>
           <a:ln>
-            <a:solidFill>
-              <a:schemeClr val="accent3"/>
-            </a:solidFill>
+            <a:headEnd type="arrow"/>
             <a:tailEnd type="arrow"/>
           </a:ln>
         </p:spPr>
@@ -6530,14 +7194,14 @@
       </p:cxnSp>
       <p:sp>
         <p:nvSpPr>
-          <p:cNvPr id="123" name="TextBox 122"/>
+          <p:cNvPr id="62" name="TextBox 61"/>
           <p:cNvSpPr txBox="1"/>
           <p:nvPr/>
         </p:nvSpPr>
         <p:spPr>
           <a:xfrm>
-            <a:off x="6929723" y="5120772"/>
-            <a:ext cx="598316" cy="246221"/>
+            <a:off x="3614642" y="5385258"/>
+            <a:ext cx="1146468" cy="400110"/>
           </a:xfrm>
           <a:prstGeom prst="rect">
             <a:avLst/>
@@ -6551,38 +7215,18 @@
           <a:lstStyle/>
           <a:p>
             <a:r>
+              <a:rPr lang="en-US" sz="1000" dirty="0" err="1" smtClean="0"/>
+              <a:t>Usd+identity</a:t>
+            </a:r>
+            <a:r>
               <a:rPr lang="en-US" sz="1000" dirty="0" smtClean="0"/>
-              <a:t>echelon</a:t>
-            </a:r>
-            <a:endParaRPr lang="en-US" sz="1000" dirty="0"/>
-          </a:p>
-        </p:txBody>
-      </p:sp>
-      <p:sp>
-        <p:nvSpPr>
-          <p:cNvPr id="139" name="TextBox 138"/>
-          <p:cNvSpPr txBox="1"/>
-          <p:nvPr/>
-        </p:nvSpPr>
-        <p:spPr>
-          <a:xfrm>
-            <a:off x="3692000" y="5080037"/>
-            <a:ext cx="813043" cy="246221"/>
-          </a:xfrm>
-          <a:prstGeom prst="rect">
-            <a:avLst/>
-          </a:prstGeom>
-          <a:noFill/>
-        </p:spPr>
-        <p:txBody>
-          <a:bodyPr wrap="none" rtlCol="0">
-            <a:spAutoFit/>
-          </a:bodyPr>
-          <a:lstStyle/>
+              <a:t> info+</a:t>
+            </a:r>
+          </a:p>
           <a:p>
             <a:r>
               <a:rPr lang="en-US" sz="1000" dirty="0" smtClean="0"/>
-              <a:t>E-pharmacy</a:t>
+              <a:t>passwords</a:t>
             </a:r>
             <a:endParaRPr lang="en-US" sz="1000" dirty="0"/>
           </a:p>
@@ -6590,20 +7234,19 @@
       </p:sp>
       <p:cxnSp>
         <p:nvCxnSpPr>
-          <p:cNvPr id="14" name="Straight Arrow Connector 13"/>
+          <p:cNvPr id="63" name="Straight Arrow Connector 62"/>
           <p:cNvCxnSpPr/>
           <p:nvPr/>
         </p:nvCxnSpPr>
         <p:spPr>
-          <a:xfrm flipV="1">
-            <a:off x="4907731" y="3388403"/>
-            <a:ext cx="0" cy="1541916"/>
+          <a:xfrm flipH="1" flipV="1">
+            <a:off x="4066226" y="4746413"/>
+            <a:ext cx="2" cy="304617"/>
           </a:xfrm>
           <a:prstGeom prst="straightConnector1">
             <a:avLst/>
           </a:prstGeom>
           <a:ln>
-            <a:headEnd type="arrow"/>
             <a:tailEnd type="arrow"/>
           </a:ln>
         </p:spPr>
@@ -6624,14 +7267,14 @@
       </p:cxnSp>
       <p:sp>
         <p:nvSpPr>
-          <p:cNvPr id="62" name="TextBox 61"/>
+          <p:cNvPr id="66" name="TextBox 65"/>
           <p:cNvSpPr txBox="1"/>
           <p:nvPr/>
         </p:nvSpPr>
         <p:spPr>
           <a:xfrm>
-            <a:off x="3614642" y="5385258"/>
-            <a:ext cx="1146468" cy="400110"/>
+            <a:off x="3011322" y="4453517"/>
+            <a:ext cx="532568" cy="246221"/>
           </a:xfrm>
           <a:prstGeom prst="rect">
             <a:avLst/>
@@ -6645,18 +7288,8 @@
           <a:lstStyle/>
           <a:p>
             <a:r>
-              <a:rPr lang="en-US" sz="1000" dirty="0" err="1" smtClean="0"/>
-              <a:t>Usd+identity</a:t>
-            </a:r>
-            <a:r>
               <a:rPr lang="en-US" sz="1000" dirty="0" smtClean="0"/>
-              <a:t> info+</a:t>
-            </a:r>
-          </a:p>
-          <a:p>
-            <a:r>
-              <a:rPr lang="en-US" sz="1000" dirty="0" smtClean="0"/>
-              <a:t>passwords</a:t>
+              <a:t>coders</a:t>
             </a:r>
             <a:endParaRPr lang="en-US" sz="1000" dirty="0"/>
           </a:p>
@@ -6664,14 +7297,16 @@
       </p:sp>
       <p:cxnSp>
         <p:nvCxnSpPr>
-          <p:cNvPr id="63" name="Straight Arrow Connector 62"/>
-          <p:cNvCxnSpPr/>
+          <p:cNvPr id="68" name="Straight Arrow Connector 67"/>
+          <p:cNvCxnSpPr>
+            <a:stCxn id="9" idx="0"/>
+          </p:cNvCxnSpPr>
           <p:nvPr/>
         </p:nvCxnSpPr>
         <p:spPr>
           <a:xfrm flipH="1" flipV="1">
-            <a:off x="4066226" y="4746413"/>
-            <a:ext cx="2" cy="304617"/>
+            <a:off x="3302232" y="4709366"/>
+            <a:ext cx="17434" cy="309349"/>
           </a:xfrm>
           <a:prstGeom prst="straightConnector1">
             <a:avLst/>
@@ -6697,14 +7332,14 @@
       </p:cxnSp>
       <p:sp>
         <p:nvSpPr>
-          <p:cNvPr id="66" name="TextBox 65"/>
+          <p:cNvPr id="80" name="TextBox 79"/>
           <p:cNvSpPr txBox="1"/>
           <p:nvPr/>
         </p:nvSpPr>
         <p:spPr>
           <a:xfrm>
-            <a:off x="3011322" y="4453517"/>
-            <a:ext cx="532568" cy="246221"/>
+            <a:off x="3817287" y="4449955"/>
+            <a:ext cx="497878" cy="246221"/>
           </a:xfrm>
           <a:prstGeom prst="rect">
             <a:avLst/>
@@ -6719,24 +7354,412 @@
           <a:p>
             <a:r>
               <a:rPr lang="en-US" sz="1000" dirty="0" smtClean="0"/>
-              <a:t>coders</a:t>
+              <a:t>mules</a:t>
             </a:r>
             <a:endParaRPr lang="en-US" sz="1000" dirty="0"/>
+          </a:p>
+        </p:txBody>
+      </p:sp>
+      <p:sp>
+        <p:nvSpPr>
+          <p:cNvPr id="65" name="TextBox 64"/>
+          <p:cNvSpPr txBox="1"/>
+          <p:nvPr/>
+        </p:nvSpPr>
+        <p:spPr>
+          <a:xfrm>
+            <a:off x="3780760" y="1244585"/>
+            <a:ext cx="1109586" cy="246221"/>
+          </a:xfrm>
+          <a:prstGeom prst="rect">
+            <a:avLst/>
+          </a:prstGeom>
+          <a:noFill/>
+        </p:spPr>
+        <p:txBody>
+          <a:bodyPr wrap="none" rtlCol="0">
+            <a:spAutoFit/>
+          </a:bodyPr>
+          <a:lstStyle/>
+          <a:p>
+            <a:r>
+              <a:rPr lang="en-US" sz="1000" dirty="0" smtClean="0">
+                <a:solidFill>
+                  <a:schemeClr val="accent5"/>
+                </a:solidFill>
+              </a:rPr>
+              <a:t>John the Ripper(</a:t>
+            </a:r>
+            <a:r>
+              <a:rPr lang="en-US" sz="1000" dirty="0" err="1" smtClean="0">
+                <a:solidFill>
+                  <a:schemeClr val="accent5"/>
+                </a:solidFill>
+              </a:rPr>
+              <a:t>i</a:t>
+            </a:r>
+            <a:r>
+              <a:rPr lang="en-US" sz="1000" dirty="0" smtClean="0">
+                <a:solidFill>
+                  <a:schemeClr val="accent5"/>
+                </a:solidFill>
+              </a:rPr>
+              <a:t>)</a:t>
+            </a:r>
+            <a:endParaRPr lang="en-US" sz="1000" dirty="0">
+              <a:solidFill>
+                <a:schemeClr val="accent5"/>
+              </a:solidFill>
+            </a:endParaRPr>
+          </a:p>
+        </p:txBody>
+      </p:sp>
+      <p:sp>
+        <p:nvSpPr>
+          <p:cNvPr id="69" name="TextBox 68"/>
+          <p:cNvSpPr txBox="1"/>
+          <p:nvPr/>
+        </p:nvSpPr>
+        <p:spPr>
+          <a:xfrm>
+            <a:off x="4139464" y="1802398"/>
+            <a:ext cx="945967" cy="246221"/>
+          </a:xfrm>
+          <a:prstGeom prst="rect">
+            <a:avLst/>
+          </a:prstGeom>
+          <a:noFill/>
+        </p:spPr>
+        <p:txBody>
+          <a:bodyPr wrap="none" rtlCol="0">
+            <a:spAutoFit/>
+          </a:bodyPr>
+          <a:lstStyle/>
+          <a:p>
+            <a:r>
+              <a:rPr lang="en-US" sz="1000" dirty="0" smtClean="0">
+                <a:solidFill>
+                  <a:srgbClr val="3366FF"/>
+                </a:solidFill>
+              </a:rPr>
+              <a:t>Dictionaries(1)</a:t>
+            </a:r>
+            <a:endParaRPr lang="en-US" sz="1000" dirty="0">
+              <a:solidFill>
+                <a:srgbClr val="3366FF"/>
+              </a:solidFill>
+            </a:endParaRPr>
+          </a:p>
+        </p:txBody>
+      </p:sp>
+      <p:sp>
+        <p:nvSpPr>
+          <p:cNvPr id="76" name="TextBox 75"/>
+          <p:cNvSpPr txBox="1"/>
+          <p:nvPr/>
+        </p:nvSpPr>
+        <p:spPr>
+          <a:xfrm>
+            <a:off x="6374874" y="1679287"/>
+            <a:ext cx="981409" cy="400110"/>
+          </a:xfrm>
+          <a:prstGeom prst="rect">
+            <a:avLst/>
+          </a:prstGeom>
+          <a:noFill/>
+        </p:spPr>
+        <p:txBody>
+          <a:bodyPr wrap="none" rtlCol="0">
+            <a:spAutoFit/>
+          </a:bodyPr>
+          <a:lstStyle/>
+          <a:p>
+            <a:r>
+              <a:rPr lang="en-US" sz="1000" dirty="0" smtClean="0">
+                <a:solidFill>
+                  <a:srgbClr val="3366FF"/>
+                </a:solidFill>
+              </a:rPr>
+              <a:t>Trojan (d)</a:t>
+            </a:r>
+          </a:p>
+          <a:p>
+            <a:r>
+              <a:rPr lang="en-US" sz="1000" dirty="0" smtClean="0">
+                <a:solidFill>
+                  <a:srgbClr val="3366FF"/>
+                </a:solidFill>
+              </a:rPr>
+              <a:t>(+</a:t>
+            </a:r>
+            <a:r>
+              <a:rPr lang="en-US" sz="1000" dirty="0" err="1" smtClean="0">
+                <a:solidFill>
+                  <a:srgbClr val="3366FF"/>
+                </a:solidFill>
+              </a:rPr>
+              <a:t>exploits+usd</a:t>
+            </a:r>
+            <a:r>
+              <a:rPr lang="en-US" sz="1000" dirty="0" smtClean="0">
+                <a:solidFill>
+                  <a:srgbClr val="3366FF"/>
+                </a:solidFill>
+              </a:rPr>
+              <a:t>)</a:t>
+            </a:r>
+            <a:endParaRPr lang="en-US" sz="1000" dirty="0">
+              <a:solidFill>
+                <a:srgbClr val="3366FF"/>
+              </a:solidFill>
+            </a:endParaRPr>
+          </a:p>
+        </p:txBody>
+      </p:sp>
+      <p:sp>
+        <p:nvSpPr>
+          <p:cNvPr id="77" name="TextBox 76"/>
+          <p:cNvSpPr txBox="1"/>
+          <p:nvPr/>
+        </p:nvSpPr>
+        <p:spPr>
+          <a:xfrm>
+            <a:off x="6369380" y="1230295"/>
+            <a:ext cx="981409" cy="400110"/>
+          </a:xfrm>
+          <a:prstGeom prst="rect">
+            <a:avLst/>
+          </a:prstGeom>
+          <a:noFill/>
+        </p:spPr>
+        <p:txBody>
+          <a:bodyPr wrap="none" rtlCol="0">
+            <a:spAutoFit/>
+          </a:bodyPr>
+          <a:lstStyle/>
+          <a:p>
+            <a:r>
+              <a:rPr lang="en-US" sz="1000" dirty="0" smtClean="0">
+                <a:solidFill>
+                  <a:srgbClr val="3366FF"/>
+                </a:solidFill>
+              </a:rPr>
+              <a:t>Virus (1)</a:t>
+            </a:r>
+          </a:p>
+          <a:p>
+            <a:r>
+              <a:rPr lang="en-US" sz="1000" dirty="0" smtClean="0">
+                <a:solidFill>
+                  <a:srgbClr val="3366FF"/>
+                </a:solidFill>
+              </a:rPr>
+              <a:t>(+</a:t>
+            </a:r>
+            <a:r>
+              <a:rPr lang="en-US" sz="1000" dirty="0" err="1" smtClean="0">
+                <a:solidFill>
+                  <a:srgbClr val="3366FF"/>
+                </a:solidFill>
+              </a:rPr>
+              <a:t>exploits+usd</a:t>
+            </a:r>
+            <a:r>
+              <a:rPr lang="en-US" sz="1000" dirty="0" smtClean="0">
+                <a:solidFill>
+                  <a:srgbClr val="3366FF"/>
+                </a:solidFill>
+              </a:rPr>
+              <a:t>)</a:t>
+            </a:r>
+            <a:endParaRPr lang="en-US" sz="1000" dirty="0">
+              <a:solidFill>
+                <a:srgbClr val="3366FF"/>
+              </a:solidFill>
+            </a:endParaRPr>
+          </a:p>
+        </p:txBody>
+      </p:sp>
+      <p:sp>
+        <p:nvSpPr>
+          <p:cNvPr id="6" name="TextBox 5"/>
+          <p:cNvSpPr txBox="1"/>
+          <p:nvPr/>
+        </p:nvSpPr>
+        <p:spPr>
+          <a:xfrm>
+            <a:off x="0" y="1398128"/>
+            <a:ext cx="1043901" cy="246221"/>
+          </a:xfrm>
+          <a:prstGeom prst="rect">
+            <a:avLst/>
+          </a:prstGeom>
+          <a:noFill/>
+        </p:spPr>
+        <p:txBody>
+          <a:bodyPr wrap="none" rtlCol="0">
+            <a:spAutoFit/>
+          </a:bodyPr>
+          <a:lstStyle/>
+          <a:p>
+            <a:r>
+              <a:rPr lang="en-US" sz="1000" dirty="0" smtClean="0"/>
+              <a:t>HACKING TOOLS</a:t>
+            </a:r>
+            <a:endParaRPr lang="en-US" sz="1000" dirty="0"/>
+          </a:p>
+        </p:txBody>
+      </p:sp>
+      <p:sp>
+        <p:nvSpPr>
+          <p:cNvPr id="12" name="TextBox 11"/>
+          <p:cNvSpPr txBox="1"/>
+          <p:nvPr/>
+        </p:nvSpPr>
+        <p:spPr>
+          <a:xfrm>
+            <a:off x="1567699" y="1398128"/>
+            <a:ext cx="796124" cy="246221"/>
+          </a:xfrm>
+          <a:prstGeom prst="rect">
+            <a:avLst/>
+          </a:prstGeom>
+          <a:noFill/>
+        </p:spPr>
+        <p:txBody>
+          <a:bodyPr wrap="none" rtlCol="0">
+            <a:spAutoFit/>
+          </a:bodyPr>
+          <a:lstStyle/>
+          <a:p>
+            <a:r>
+              <a:rPr lang="en-US" sz="1000" dirty="0" err="1" smtClean="0">
+                <a:solidFill>
+                  <a:schemeClr val="accent5"/>
+                </a:solidFill>
+              </a:rPr>
+              <a:t>hackerware</a:t>
+            </a:r>
+            <a:endParaRPr lang="en-US" sz="1000" dirty="0">
+              <a:solidFill>
+                <a:schemeClr val="accent5"/>
+              </a:solidFill>
+            </a:endParaRPr>
+          </a:p>
+        </p:txBody>
+      </p:sp>
+      <p:sp>
+        <p:nvSpPr>
+          <p:cNvPr id="13" name="TextBox 12"/>
+          <p:cNvSpPr txBox="1"/>
+          <p:nvPr/>
+        </p:nvSpPr>
+        <p:spPr>
+          <a:xfrm>
+            <a:off x="4251369" y="952962"/>
+            <a:ext cx="1143086" cy="246221"/>
+          </a:xfrm>
+          <a:prstGeom prst="rect">
+            <a:avLst/>
+          </a:prstGeom>
+          <a:noFill/>
+        </p:spPr>
+        <p:txBody>
+          <a:bodyPr wrap="none" rtlCol="0">
+            <a:spAutoFit/>
+          </a:bodyPr>
+          <a:lstStyle/>
+          <a:p>
+            <a:r>
+              <a:rPr lang="en-US" sz="1000" u="sng" dirty="0" smtClean="0"/>
+              <a:t>Password cracking</a:t>
+            </a:r>
+            <a:endParaRPr lang="en-US" sz="1000" u="sng" dirty="0"/>
+          </a:p>
+        </p:txBody>
+      </p:sp>
+      <p:sp>
+        <p:nvSpPr>
+          <p:cNvPr id="78" name="TextBox 77"/>
+          <p:cNvSpPr txBox="1"/>
+          <p:nvPr/>
+        </p:nvSpPr>
+        <p:spPr>
+          <a:xfrm>
+            <a:off x="5447073" y="1244239"/>
+            <a:ext cx="788923" cy="400110"/>
+          </a:xfrm>
+          <a:prstGeom prst="rect">
+            <a:avLst/>
+          </a:prstGeom>
+          <a:noFill/>
+        </p:spPr>
+        <p:txBody>
+          <a:bodyPr wrap="none" rtlCol="0">
+            <a:spAutoFit/>
+          </a:bodyPr>
+          <a:lstStyle/>
+          <a:p>
+            <a:r>
+              <a:rPr lang="en-US" sz="1000" dirty="0" smtClean="0">
+                <a:solidFill>
+                  <a:srgbClr val="3366FF"/>
+                </a:solidFill>
+              </a:rPr>
+              <a:t>Quark II (d)</a:t>
+            </a:r>
+          </a:p>
+          <a:p>
+            <a:r>
+              <a:rPr lang="en-US" sz="1000" dirty="0" smtClean="0">
+                <a:solidFill>
+                  <a:srgbClr val="3366FF"/>
+                </a:solidFill>
+              </a:rPr>
+              <a:t>(+t.s.</a:t>
+            </a:r>
+            <a:r>
+              <a:rPr lang="en-US" sz="1000" dirty="0" smtClean="0">
+                <a:solidFill>
+                  <a:srgbClr val="3366FF"/>
+                </a:solidFill>
+              </a:rPr>
+              <a:t>+</a:t>
+            </a:r>
+            <a:r>
+              <a:rPr lang="en-US" sz="1000" dirty="0" err="1" smtClean="0">
+                <a:solidFill>
+                  <a:srgbClr val="3366FF"/>
+                </a:solidFill>
+              </a:rPr>
+              <a:t>ch</a:t>
+            </a:r>
+            <a:r>
+              <a:rPr lang="en-US" sz="1000" dirty="0" smtClean="0">
+                <a:solidFill>
+                  <a:srgbClr val="3366FF"/>
+                </a:solidFill>
+              </a:rPr>
+              <a:t>)</a:t>
+            </a:r>
+            <a:endParaRPr lang="en-US" sz="1000" dirty="0">
+              <a:solidFill>
+                <a:srgbClr val="3366FF"/>
+              </a:solidFill>
+            </a:endParaRPr>
           </a:p>
         </p:txBody>
       </p:sp>
       <p:cxnSp>
         <p:nvCxnSpPr>
-          <p:cNvPr id="68" name="Straight Arrow Connector 67"/>
-          <p:cNvCxnSpPr>
-            <a:stCxn id="9" idx="0"/>
-          </p:cNvCxnSpPr>
+          <p:cNvPr id="17" name="Straight Arrow Connector 16"/>
+          <p:cNvCxnSpPr/>
           <p:nvPr/>
         </p:nvCxnSpPr>
         <p:spPr>
-          <a:xfrm flipH="1" flipV="1">
-            <a:off x="3302232" y="4709366"/>
-            <a:ext cx="17434" cy="309349"/>
+          <a:xfrm flipV="1">
+            <a:off x="4594909" y="1542598"/>
+            <a:ext cx="0" cy="267581"/>
           </a:xfrm>
           <a:prstGeom prst="straightConnector1">
             <a:avLst/>
@@ -6762,14 +7785,14 @@
       </p:cxnSp>
       <p:sp>
         <p:nvSpPr>
-          <p:cNvPr id="80" name="TextBox 79"/>
+          <p:cNvPr id="92" name="TextBox 91"/>
           <p:cNvSpPr txBox="1"/>
           <p:nvPr/>
         </p:nvSpPr>
         <p:spPr>
           <a:xfrm>
-            <a:off x="3817287" y="4449955"/>
-            <a:ext cx="497878" cy="246221"/>
+            <a:off x="8126395" y="1296377"/>
+            <a:ext cx="662874" cy="246221"/>
           </a:xfrm>
           <a:prstGeom prst="rect">
             <a:avLst/>
@@ -6783,23 +7806,31 @@
           <a:lstStyle/>
           <a:p>
             <a:r>
-              <a:rPr lang="en-US" sz="1000" dirty="0" smtClean="0"/>
-              <a:t>mules</a:t>
-            </a:r>
-            <a:endParaRPr lang="en-US" sz="1000" dirty="0"/>
-          </a:p>
-        </p:txBody>
-      </p:sp>
-      <p:sp>
-        <p:nvSpPr>
-          <p:cNvPr id="65" name="TextBox 64"/>
+              <a:rPr lang="en-US" sz="1000" dirty="0" smtClean="0">
+                <a:solidFill>
+                  <a:srgbClr val="3366FF"/>
+                </a:solidFill>
+              </a:rPr>
+              <a:t>worm (1)</a:t>
+            </a:r>
+            <a:endParaRPr lang="en-US" sz="1000" dirty="0">
+              <a:solidFill>
+                <a:srgbClr val="3366FF"/>
+              </a:solidFill>
+            </a:endParaRPr>
+          </a:p>
+        </p:txBody>
+      </p:sp>
+      <p:sp>
+        <p:nvSpPr>
+          <p:cNvPr id="96" name="TextBox 95"/>
           <p:cNvSpPr txBox="1"/>
           <p:nvPr/>
         </p:nvSpPr>
         <p:spPr>
           <a:xfrm>
-            <a:off x="3780760" y="1244585"/>
-            <a:ext cx="1109586" cy="246221"/>
+            <a:off x="6388242" y="836882"/>
+            <a:ext cx="851415" cy="246221"/>
           </a:xfrm>
           <a:prstGeom prst="rect">
             <a:avLst/>
@@ -6813,31 +7844,23 @@
           <a:lstStyle/>
           <a:p>
             <a:r>
-              <a:rPr lang="en-US" sz="1000" dirty="0" smtClean="0"/>
-              <a:t>John the Ripper(</a:t>
-            </a:r>
-            <a:r>
-              <a:rPr lang="en-US" sz="1000" dirty="0" err="1" smtClean="0"/>
-              <a:t>i</a:t>
-            </a:r>
-            <a:r>
-              <a:rPr lang="en-US" sz="1000" dirty="0" smtClean="0"/>
-              <a:t>)</a:t>
-            </a:r>
-            <a:endParaRPr lang="en-US" sz="1000" dirty="0"/>
-          </a:p>
-        </p:txBody>
-      </p:sp>
-      <p:sp>
-        <p:nvSpPr>
-          <p:cNvPr id="67" name="TextBox 66"/>
+              <a:rPr lang="en-US" sz="1000" u="sng" dirty="0" smtClean="0"/>
+              <a:t>Other access</a:t>
+            </a:r>
+            <a:endParaRPr lang="en-US" sz="1000" u="sng" dirty="0"/>
+          </a:p>
+        </p:txBody>
+      </p:sp>
+      <p:sp>
+        <p:nvSpPr>
+          <p:cNvPr id="19" name="TextBox 18"/>
           <p:cNvSpPr txBox="1"/>
           <p:nvPr/>
         </p:nvSpPr>
         <p:spPr>
           <a:xfrm>
-            <a:off x="5520003" y="1597604"/>
-            <a:ext cx="919730" cy="400110"/>
+            <a:off x="3084050" y="940004"/>
+            <a:ext cx="442461" cy="246221"/>
           </a:xfrm>
           <a:prstGeom prst="rect">
             <a:avLst/>
@@ -6851,37 +7874,23 @@
           <a:lstStyle/>
           <a:p>
             <a:r>
-              <a:rPr lang="en-US" sz="1000" dirty="0" smtClean="0"/>
-              <a:t>Deep Crack(d)</a:t>
-            </a:r>
-          </a:p>
-          <a:p>
-            <a:r>
-              <a:rPr lang="en-US" sz="1000" dirty="0" smtClean="0"/>
-              <a:t>(+t.s.+</a:t>
-            </a:r>
-            <a:r>
-              <a:rPr lang="en-US" sz="1000" dirty="0" err="1" smtClean="0"/>
-              <a:t>hw</a:t>
-            </a:r>
-            <a:r>
-              <a:rPr lang="en-US" sz="1000" dirty="0" smtClean="0"/>
-              <a:t>)</a:t>
-            </a:r>
-            <a:endParaRPr lang="en-US" sz="1000" dirty="0"/>
-          </a:p>
-        </p:txBody>
-      </p:sp>
-      <p:sp>
-        <p:nvSpPr>
-          <p:cNvPr id="69" name="TextBox 68"/>
+              <a:rPr lang="en-US" sz="1000" u="sng" dirty="0" smtClean="0"/>
+              <a:t>tools</a:t>
+            </a:r>
+            <a:endParaRPr lang="en-US" sz="1000" u="sng" dirty="0"/>
+          </a:p>
+        </p:txBody>
+      </p:sp>
+      <p:sp>
+        <p:nvSpPr>
+          <p:cNvPr id="97" name="TextBox 96"/>
           <p:cNvSpPr txBox="1"/>
           <p:nvPr/>
         </p:nvSpPr>
         <p:spPr>
           <a:xfrm>
-            <a:off x="4139464" y="1802398"/>
-            <a:ext cx="945967" cy="246221"/>
+            <a:off x="7366567" y="1332312"/>
+            <a:ext cx="710025" cy="246221"/>
           </a:xfrm>
           <a:prstGeom prst="rect">
             <a:avLst/>
@@ -6895,415 +7904,18 @@
           <a:lstStyle/>
           <a:p>
             <a:r>
-              <a:rPr lang="en-US" sz="1000" dirty="0" smtClean="0"/>
-              <a:t>Dictionaries(1)</a:t>
-            </a:r>
-            <a:endParaRPr lang="en-US" sz="1000" dirty="0"/>
-          </a:p>
-        </p:txBody>
-      </p:sp>
-      <p:sp>
-        <p:nvSpPr>
-          <p:cNvPr id="76" name="TextBox 75"/>
-          <p:cNvSpPr txBox="1"/>
-          <p:nvPr/>
-        </p:nvSpPr>
-        <p:spPr>
-          <a:xfrm>
-            <a:off x="6374874" y="1679287"/>
-            <a:ext cx="981409" cy="400110"/>
-          </a:xfrm>
-          <a:prstGeom prst="rect">
-            <a:avLst/>
-          </a:prstGeom>
-          <a:noFill/>
-        </p:spPr>
-        <p:txBody>
-          <a:bodyPr wrap="none" rtlCol="0">
-            <a:spAutoFit/>
-          </a:bodyPr>
-          <a:lstStyle/>
-          <a:p>
-            <a:r>
-              <a:rPr lang="en-US" sz="1000" dirty="0" smtClean="0"/>
-              <a:t>Trojan (d)</a:t>
-            </a:r>
-          </a:p>
-          <a:p>
-            <a:r>
-              <a:rPr lang="en-US" sz="1000" dirty="0" smtClean="0"/>
-              <a:t>(+</a:t>
-            </a:r>
-            <a:r>
-              <a:rPr lang="en-US" sz="1000" dirty="0" err="1" smtClean="0"/>
-              <a:t>exploits+usd</a:t>
-            </a:r>
-            <a:r>
-              <a:rPr lang="en-US" sz="1000" dirty="0" smtClean="0"/>
-              <a:t>)</a:t>
-            </a:r>
-            <a:endParaRPr lang="en-US" sz="1000" dirty="0"/>
-          </a:p>
-        </p:txBody>
-      </p:sp>
-      <p:sp>
-        <p:nvSpPr>
-          <p:cNvPr id="77" name="TextBox 76"/>
-          <p:cNvSpPr txBox="1"/>
-          <p:nvPr/>
-        </p:nvSpPr>
-        <p:spPr>
-          <a:xfrm>
-            <a:off x="6369380" y="1230295"/>
-            <a:ext cx="981409" cy="400110"/>
-          </a:xfrm>
-          <a:prstGeom prst="rect">
-            <a:avLst/>
-          </a:prstGeom>
-          <a:noFill/>
-        </p:spPr>
-        <p:txBody>
-          <a:bodyPr wrap="none" rtlCol="0">
-            <a:spAutoFit/>
-          </a:bodyPr>
-          <a:lstStyle/>
-          <a:p>
-            <a:r>
-              <a:rPr lang="en-US" sz="1000" dirty="0" smtClean="0"/>
-              <a:t>Virus (1)</a:t>
-            </a:r>
-          </a:p>
-          <a:p>
-            <a:r>
-              <a:rPr lang="en-US" sz="1000" dirty="0" smtClean="0"/>
-              <a:t>(+</a:t>
-            </a:r>
-            <a:r>
-              <a:rPr lang="en-US" sz="1000" dirty="0" err="1" smtClean="0"/>
-              <a:t>exploits+usd</a:t>
-            </a:r>
-            <a:r>
-              <a:rPr lang="en-US" sz="1000" dirty="0" smtClean="0"/>
-              <a:t>)</a:t>
-            </a:r>
-            <a:endParaRPr lang="en-US" sz="1000" dirty="0"/>
-          </a:p>
-        </p:txBody>
-      </p:sp>
-      <p:sp>
-        <p:nvSpPr>
-          <p:cNvPr id="6" name="TextBox 5"/>
-          <p:cNvSpPr txBox="1"/>
-          <p:nvPr/>
-        </p:nvSpPr>
-        <p:spPr>
-          <a:xfrm>
-            <a:off x="0" y="1398128"/>
-            <a:ext cx="1043901" cy="246221"/>
-          </a:xfrm>
-          <a:prstGeom prst="rect">
-            <a:avLst/>
-          </a:prstGeom>
-          <a:noFill/>
-        </p:spPr>
-        <p:txBody>
-          <a:bodyPr wrap="none" rtlCol="0">
-            <a:spAutoFit/>
-          </a:bodyPr>
-          <a:lstStyle/>
-          <a:p>
-            <a:r>
-              <a:rPr lang="en-US" sz="1000" dirty="0" smtClean="0"/>
-              <a:t>HACKING TOOLS</a:t>
-            </a:r>
-            <a:endParaRPr lang="en-US" sz="1000" dirty="0"/>
-          </a:p>
-        </p:txBody>
-      </p:sp>
-      <p:sp>
-        <p:nvSpPr>
-          <p:cNvPr id="12" name="TextBox 11"/>
-          <p:cNvSpPr txBox="1"/>
-          <p:nvPr/>
-        </p:nvSpPr>
-        <p:spPr>
-          <a:xfrm>
-            <a:off x="1567699" y="1398128"/>
-            <a:ext cx="796124" cy="246221"/>
-          </a:xfrm>
-          <a:prstGeom prst="rect">
-            <a:avLst/>
-          </a:prstGeom>
-          <a:noFill/>
-        </p:spPr>
-        <p:txBody>
-          <a:bodyPr wrap="none" rtlCol="0">
-            <a:spAutoFit/>
-          </a:bodyPr>
-          <a:lstStyle/>
-          <a:p>
-            <a:r>
-              <a:rPr lang="en-US" sz="1000" dirty="0" err="1" smtClean="0"/>
-              <a:t>hackerware</a:t>
-            </a:r>
-            <a:endParaRPr lang="en-US" sz="1000" dirty="0"/>
-          </a:p>
-        </p:txBody>
-      </p:sp>
-      <p:sp>
-        <p:nvSpPr>
-          <p:cNvPr id="13" name="TextBox 12"/>
-          <p:cNvSpPr txBox="1"/>
-          <p:nvPr/>
-        </p:nvSpPr>
-        <p:spPr>
-          <a:xfrm>
-            <a:off x="4251369" y="952962"/>
-            <a:ext cx="1143086" cy="246221"/>
-          </a:xfrm>
-          <a:prstGeom prst="rect">
-            <a:avLst/>
-          </a:prstGeom>
-          <a:noFill/>
-        </p:spPr>
-        <p:txBody>
-          <a:bodyPr wrap="none" rtlCol="0">
-            <a:spAutoFit/>
-          </a:bodyPr>
-          <a:lstStyle/>
-          <a:p>
-            <a:r>
-              <a:rPr lang="en-US" sz="1000" u="sng" dirty="0" smtClean="0"/>
-              <a:t>Password cracking</a:t>
-            </a:r>
-            <a:endParaRPr lang="en-US" sz="1000" u="sng" dirty="0"/>
-          </a:p>
-        </p:txBody>
-      </p:sp>
-      <p:sp>
-        <p:nvSpPr>
-          <p:cNvPr id="78" name="TextBox 77"/>
-          <p:cNvSpPr txBox="1"/>
-          <p:nvPr/>
-        </p:nvSpPr>
-        <p:spPr>
-          <a:xfrm>
-            <a:off x="5521625" y="1178423"/>
-            <a:ext cx="788923" cy="400110"/>
-          </a:xfrm>
-          <a:prstGeom prst="rect">
-            <a:avLst/>
-          </a:prstGeom>
-          <a:noFill/>
-        </p:spPr>
-        <p:txBody>
-          <a:bodyPr wrap="none" rtlCol="0">
-            <a:spAutoFit/>
-          </a:bodyPr>
-          <a:lstStyle/>
-          <a:p>
-            <a:r>
-              <a:rPr lang="en-US" sz="1000" dirty="0" smtClean="0"/>
-              <a:t>Quark II (d)</a:t>
-            </a:r>
-          </a:p>
-          <a:p>
-            <a:r>
-              <a:rPr lang="en-US" sz="1000" dirty="0" smtClean="0"/>
-              <a:t>(+t.s.+</a:t>
-            </a:r>
-            <a:r>
-              <a:rPr lang="en-US" sz="1000" dirty="0" err="1" smtClean="0"/>
-              <a:t>hw</a:t>
-            </a:r>
-            <a:r>
-              <a:rPr lang="en-US" sz="1000" dirty="0" smtClean="0"/>
-              <a:t>)</a:t>
-            </a:r>
-            <a:endParaRPr lang="en-US" sz="1000" dirty="0"/>
-          </a:p>
-        </p:txBody>
-      </p:sp>
-      <p:cxnSp>
-        <p:nvCxnSpPr>
-          <p:cNvPr id="17" name="Straight Arrow Connector 16"/>
-          <p:cNvCxnSpPr/>
-          <p:nvPr/>
-        </p:nvCxnSpPr>
-        <p:spPr>
-          <a:xfrm flipV="1">
-            <a:off x="4594909" y="1542598"/>
-            <a:ext cx="0" cy="267581"/>
-          </a:xfrm>
-          <a:prstGeom prst="straightConnector1">
-            <a:avLst/>
-          </a:prstGeom>
-          <a:ln>
-            <a:tailEnd type="arrow"/>
-          </a:ln>
-        </p:spPr>
-        <p:style>
-          <a:lnRef idx="2">
-            <a:schemeClr val="accent1"/>
-          </a:lnRef>
-          <a:fillRef idx="0">
-            <a:schemeClr val="accent1"/>
-          </a:fillRef>
-          <a:effectRef idx="1">
-            <a:schemeClr val="accent1"/>
-          </a:effectRef>
-          <a:fontRef idx="minor">
-            <a:schemeClr val="tx1"/>
-          </a:fontRef>
-        </p:style>
-      </p:cxnSp>
-      <p:sp>
-        <p:nvSpPr>
-          <p:cNvPr id="92" name="TextBox 91"/>
-          <p:cNvSpPr txBox="1"/>
-          <p:nvPr/>
-        </p:nvSpPr>
-        <p:spPr>
-          <a:xfrm>
-            <a:off x="8126395" y="1296377"/>
-            <a:ext cx="662874" cy="246221"/>
-          </a:xfrm>
-          <a:prstGeom prst="rect">
-            <a:avLst/>
-          </a:prstGeom>
-          <a:noFill/>
-        </p:spPr>
-        <p:txBody>
-          <a:bodyPr wrap="none" rtlCol="0">
-            <a:spAutoFit/>
-          </a:bodyPr>
-          <a:lstStyle/>
-          <a:p>
-            <a:r>
-              <a:rPr lang="en-US" sz="1000" dirty="0" smtClean="0"/>
-              <a:t>worm (1)</a:t>
-            </a:r>
-            <a:endParaRPr lang="en-US" sz="1000" dirty="0"/>
-          </a:p>
-        </p:txBody>
-      </p:sp>
-      <p:sp>
-        <p:nvSpPr>
-          <p:cNvPr id="96" name="TextBox 95"/>
-          <p:cNvSpPr txBox="1"/>
-          <p:nvPr/>
-        </p:nvSpPr>
-        <p:spPr>
-          <a:xfrm>
-            <a:off x="6388242" y="836882"/>
-            <a:ext cx="851415" cy="246221"/>
-          </a:xfrm>
-          <a:prstGeom prst="rect">
-            <a:avLst/>
-          </a:prstGeom>
-          <a:noFill/>
-        </p:spPr>
-        <p:txBody>
-          <a:bodyPr wrap="none" rtlCol="0">
-            <a:spAutoFit/>
-          </a:bodyPr>
-          <a:lstStyle/>
-          <a:p>
-            <a:r>
-              <a:rPr lang="en-US" sz="1000" u="sng" dirty="0" smtClean="0"/>
-              <a:t>Other access</a:t>
-            </a:r>
-            <a:endParaRPr lang="en-US" sz="1000" u="sng" dirty="0"/>
-          </a:p>
-        </p:txBody>
-      </p:sp>
-      <p:sp>
-        <p:nvSpPr>
-          <p:cNvPr id="19" name="TextBox 18"/>
-          <p:cNvSpPr txBox="1"/>
-          <p:nvPr/>
-        </p:nvSpPr>
-        <p:spPr>
-          <a:xfrm>
-            <a:off x="3084050" y="940004"/>
-            <a:ext cx="442461" cy="246221"/>
-          </a:xfrm>
-          <a:prstGeom prst="rect">
-            <a:avLst/>
-          </a:prstGeom>
-          <a:noFill/>
-        </p:spPr>
-        <p:txBody>
-          <a:bodyPr wrap="none" rtlCol="0">
-            <a:spAutoFit/>
-          </a:bodyPr>
-          <a:lstStyle/>
-          <a:p>
-            <a:r>
-              <a:rPr lang="en-US" sz="1000" u="sng" dirty="0" smtClean="0"/>
-              <a:t>tools</a:t>
-            </a:r>
-            <a:endParaRPr lang="en-US" sz="1000" u="sng" dirty="0"/>
-          </a:p>
-        </p:txBody>
-      </p:sp>
-      <p:sp>
-        <p:nvSpPr>
-          <p:cNvPr id="20" name="TextBox 19"/>
-          <p:cNvSpPr txBox="1"/>
-          <p:nvPr/>
-        </p:nvSpPr>
-        <p:spPr>
-          <a:xfrm>
-            <a:off x="3084050" y="1254264"/>
-            <a:ext cx="518091" cy="246221"/>
-          </a:xfrm>
-          <a:prstGeom prst="rect">
-            <a:avLst/>
-          </a:prstGeom>
-          <a:noFill/>
-        </p:spPr>
-        <p:txBody>
-          <a:bodyPr wrap="none" rtlCol="0">
-            <a:spAutoFit/>
-          </a:bodyPr>
-          <a:lstStyle/>
-          <a:p>
-            <a:r>
-              <a:rPr lang="en-US" sz="1000" dirty="0" smtClean="0"/>
-              <a:t>sniffer</a:t>
-            </a:r>
-            <a:endParaRPr lang="en-US" sz="1000" dirty="0"/>
-          </a:p>
-        </p:txBody>
-      </p:sp>
-      <p:sp>
-        <p:nvSpPr>
-          <p:cNvPr id="97" name="TextBox 96"/>
-          <p:cNvSpPr txBox="1"/>
-          <p:nvPr/>
-        </p:nvSpPr>
-        <p:spPr>
-          <a:xfrm>
-            <a:off x="7294191" y="1751493"/>
-            <a:ext cx="710025" cy="246221"/>
-          </a:xfrm>
-          <a:prstGeom prst="rect">
-            <a:avLst/>
-          </a:prstGeom>
-          <a:noFill/>
-        </p:spPr>
-        <p:txBody>
-          <a:bodyPr wrap="none" rtlCol="0">
-            <a:spAutoFit/>
-          </a:bodyPr>
-          <a:lstStyle/>
-          <a:p>
-            <a:r>
-              <a:rPr lang="en-US" sz="1000" dirty="0" smtClean="0"/>
+              <a:rPr lang="en-US" sz="1000" dirty="0" smtClean="0">
+                <a:solidFill>
+                  <a:srgbClr val="3366FF"/>
+                </a:solidFill>
+              </a:rPr>
               <a:t>rootkit (1)</a:t>
             </a:r>
-            <a:endParaRPr lang="en-US" sz="1000" dirty="0"/>
+            <a:endParaRPr lang="en-US" sz="1000" dirty="0">
+              <a:solidFill>
+                <a:srgbClr val="3366FF"/>
+              </a:solidFill>
+            </a:endParaRPr>
           </a:p>
         </p:txBody>
       </p:sp>
@@ -7449,80 +8061,18 @@
           </a:fontRef>
         </p:style>
       </p:cxnSp>
-      <p:sp>
-        <p:nvSpPr>
-          <p:cNvPr id="102" name="TextBox 101"/>
-          <p:cNvSpPr txBox="1"/>
-          <p:nvPr/>
-        </p:nvSpPr>
-        <p:spPr>
-          <a:xfrm>
-            <a:off x="4596535" y="2307569"/>
-            <a:ext cx="687170" cy="246221"/>
-          </a:xfrm>
-          <a:prstGeom prst="rect">
-            <a:avLst/>
-          </a:prstGeom>
-          <a:noFill/>
-        </p:spPr>
-        <p:txBody>
-          <a:bodyPr wrap="none" rtlCol="0">
-            <a:spAutoFit/>
-          </a:bodyPr>
-          <a:lstStyle/>
-          <a:p>
-            <a:r>
-              <a:rPr lang="en-US" sz="1000" dirty="0" smtClean="0"/>
-              <a:t>hardware</a:t>
-            </a:r>
-            <a:endParaRPr lang="en-US" sz="1000" dirty="0"/>
-          </a:p>
-        </p:txBody>
-      </p:sp>
       <p:cxnSp>
         <p:nvCxnSpPr>
           <p:cNvPr id="103" name="Straight Arrow Connector 102"/>
-          <p:cNvCxnSpPr/>
+          <p:cNvCxnSpPr>
+            <a:endCxn id="122" idx="1"/>
+          </p:cNvCxnSpPr>
           <p:nvPr/>
         </p:nvCxnSpPr>
         <p:spPr>
           <a:xfrm>
-            <a:off x="4858945" y="2553790"/>
-            <a:ext cx="1" cy="282507"/>
-          </a:xfrm>
-          <a:prstGeom prst="straightConnector1">
-            <a:avLst/>
-          </a:prstGeom>
-          <a:ln>
-            <a:headEnd type="arrow"/>
-            <a:tailEnd type="arrow"/>
-          </a:ln>
-        </p:spPr>
-        <p:style>
-          <a:lnRef idx="2">
-            <a:schemeClr val="accent1"/>
-          </a:lnRef>
-          <a:fillRef idx="0">
-            <a:schemeClr val="accent1"/>
-          </a:fillRef>
-          <a:effectRef idx="1">
-            <a:schemeClr val="accent1"/>
-          </a:effectRef>
-          <a:fontRef idx="minor">
-            <a:schemeClr val="tx1"/>
-          </a:fontRef>
-        </p:style>
-      </p:cxnSp>
-      <p:cxnSp>
-        <p:nvCxnSpPr>
-          <p:cNvPr id="107" name="Straight Arrow Connector 106"/>
-          <p:cNvCxnSpPr/>
-          <p:nvPr/>
-        </p:nvCxnSpPr>
-        <p:spPr>
-          <a:xfrm>
-            <a:off x="3550216" y="1485350"/>
-            <a:ext cx="764949" cy="1350947"/>
+            <a:off x="5371620" y="3200661"/>
+            <a:ext cx="2191225" cy="456640"/>
           </a:xfrm>
           <a:prstGeom prst="straightConnector1">
             <a:avLst/>
@@ -7763,7 +8313,7 @@
         </p:nvSpPr>
         <p:spPr>
           <a:xfrm>
-            <a:off x="7496963" y="1296377"/>
+            <a:off x="7418941" y="1756269"/>
             <a:ext cx="560307" cy="246221"/>
           </a:xfrm>
           <a:prstGeom prst="rect">
@@ -7778,10 +8328,18 @@
           <a:lstStyle/>
           <a:p>
             <a:r>
-              <a:rPr lang="en-US" sz="1000" dirty="0" smtClean="0"/>
+              <a:rPr lang="en-US" sz="1000" dirty="0" smtClean="0">
+                <a:solidFill>
+                  <a:srgbClr val="3366FF"/>
+                </a:solidFill>
+              </a:rPr>
               <a:t>Bots(d)</a:t>
             </a:r>
-            <a:endParaRPr lang="en-US" sz="1000" dirty="0"/>
+            <a:endParaRPr lang="en-US" sz="1000" dirty="0">
+              <a:solidFill>
+                <a:srgbClr val="3366FF"/>
+              </a:solidFill>
+            </a:endParaRPr>
           </a:p>
         </p:txBody>
       </p:sp>
@@ -7808,10 +8366,18 @@
           <a:lstStyle/>
           <a:p>
             <a:r>
-              <a:rPr lang="en-US" sz="1000" dirty="0" err="1" smtClean="0"/>
+              <a:rPr lang="en-US" sz="1000" dirty="0" err="1" smtClean="0">
+                <a:solidFill>
+                  <a:schemeClr val="accent6"/>
+                </a:solidFill>
+              </a:rPr>
               <a:t>orangebox</a:t>
             </a:r>
-            <a:endParaRPr lang="en-US" sz="1000" dirty="0"/>
+            <a:endParaRPr lang="en-US" sz="1000" dirty="0">
+              <a:solidFill>
+                <a:schemeClr val="accent6"/>
+              </a:solidFill>
+            </a:endParaRPr>
           </a:p>
         </p:txBody>
       </p:sp>
@@ -7854,7 +8420,7 @@
         <p:spPr>
           <a:xfrm>
             <a:off x="7562845" y="3534190"/>
-            <a:ext cx="687170" cy="246221"/>
+            <a:ext cx="453232" cy="246221"/>
           </a:xfrm>
           <a:prstGeom prst="rect">
             <a:avLst/>
@@ -7868,10 +8434,18 @@
           <a:lstStyle/>
           <a:p>
             <a:r>
-              <a:rPr lang="en-US" sz="1000" dirty="0" smtClean="0"/>
-              <a:t>hardware</a:t>
-            </a:r>
-            <a:endParaRPr lang="en-US" sz="1000" dirty="0"/>
+              <a:rPr lang="en-US" sz="1000" dirty="0" smtClean="0">
+                <a:solidFill>
+                  <a:srgbClr val="9BBB59"/>
+                </a:solidFill>
+              </a:rPr>
+              <a:t>chips</a:t>
+            </a:r>
+            <a:endParaRPr lang="en-US" sz="1000" dirty="0">
+              <a:solidFill>
+                <a:srgbClr val="9BBB59"/>
+              </a:solidFill>
+            </a:endParaRPr>
           </a:p>
         </p:txBody>
       </p:sp>
@@ -7949,8 +8523,8 @@
         </p:nvCxnSpPr>
         <p:spPr>
           <a:xfrm flipH="1" flipV="1">
-            <a:off x="7906430" y="3780411"/>
-            <a:ext cx="17509" cy="467819"/>
+            <a:off x="7789461" y="3780411"/>
+            <a:ext cx="134484" cy="467820"/>
           </a:xfrm>
           <a:prstGeom prst="straightConnector1">
             <a:avLst/>
@@ -8038,10 +8612,18 @@
           <a:lstStyle/>
           <a:p>
             <a:r>
-              <a:rPr lang="en-US" sz="1000" dirty="0" smtClean="0"/>
+              <a:rPr lang="en-US" sz="1000" dirty="0" smtClean="0">
+                <a:solidFill>
+                  <a:srgbClr val="9BBB59"/>
+                </a:solidFill>
+              </a:rPr>
               <a:t>exploits</a:t>
             </a:r>
-            <a:endParaRPr lang="en-US" sz="1000" dirty="0"/>
+            <a:endParaRPr lang="en-US" sz="1000" dirty="0">
+              <a:solidFill>
+                <a:srgbClr val="9BBB59"/>
+              </a:solidFill>
+            </a:endParaRPr>
           </a:p>
         </p:txBody>
       </p:sp>
@@ -8068,10 +8650,18 @@
           <a:lstStyle/>
           <a:p>
             <a:r>
-              <a:rPr lang="en-US" sz="1000" dirty="0" err="1" smtClean="0"/>
+              <a:rPr lang="en-US" sz="1000" dirty="0" err="1" smtClean="0">
+                <a:solidFill>
+                  <a:schemeClr val="accent6"/>
+                </a:solidFill>
+              </a:rPr>
               <a:t>safeware</a:t>
             </a:r>
-            <a:endParaRPr lang="en-US" sz="1000" dirty="0"/>
+            <a:endParaRPr lang="en-US" sz="1000" dirty="0">
+              <a:solidFill>
+                <a:schemeClr val="accent6"/>
+              </a:solidFill>
+            </a:endParaRPr>
           </a:p>
         </p:txBody>
       </p:sp>
@@ -8281,7 +8871,7 @@
         <p:spPr>
           <a:xfrm>
             <a:off x="8382044" y="5162727"/>
-            <a:ext cx="796562" cy="246221"/>
+            <a:ext cx="755297" cy="246221"/>
           </a:xfrm>
           <a:prstGeom prst="rect">
             <a:avLst/>
@@ -8296,7 +8886,7 @@
           <a:p>
             <a:r>
               <a:rPr lang="en-US" sz="1000" dirty="0" smtClean="0"/>
-              <a:t>Gov’t organ</a:t>
+              <a:t>E.Q. Group</a:t>
             </a:r>
             <a:endParaRPr lang="en-US" sz="1000" dirty="0"/>
           </a:p>
@@ -8311,7 +8901,7 @@
         <p:spPr>
           <a:xfrm>
             <a:off x="8370380" y="5408948"/>
-            <a:ext cx="787395" cy="246221"/>
+            <a:ext cx="610839" cy="553998"/>
           </a:xfrm>
           <a:prstGeom prst="rect">
             <a:avLst/>
@@ -8325,16 +8915,25 @@
           <a:lstStyle/>
           <a:p>
             <a:r>
-              <a:rPr lang="en-US" sz="1000" dirty="0" err="1" smtClean="0"/>
-              <a:t>Ts+dip</a:t>
-            </a:r>
-            <a:r>
               <a:rPr lang="en-US" sz="1000" dirty="0" smtClean="0"/>
-              <a:t> </a:t>
+              <a:t>dip </a:t>
             </a:r>
             <a:r>
               <a:rPr lang="en-US" sz="1000" dirty="0" err="1" smtClean="0"/>
               <a:t>intel</a:t>
+            </a:r>
+            <a:endParaRPr lang="en-US" sz="1000" dirty="0" smtClean="0"/>
+          </a:p>
+          <a:p>
+            <a:r>
+              <a:rPr lang="en-US" sz="1000" dirty="0" smtClean="0"/>
+              <a:t>OR</a:t>
+            </a:r>
+          </a:p>
+          <a:p>
+            <a:r>
+              <a:rPr lang="en-US" sz="1000" dirty="0" smtClean="0"/>
+              <a:t>Puzzle</a:t>
             </a:r>
             <a:endParaRPr lang="en-US" sz="1000" dirty="0"/>
           </a:p>
@@ -8397,10 +8996,18 @@
           <a:lstStyle/>
           <a:p>
             <a:r>
-              <a:rPr lang="en-US" sz="1000" dirty="0" smtClean="0"/>
+              <a:rPr lang="en-US" sz="1000" dirty="0" smtClean="0">
+                <a:solidFill>
+                  <a:schemeClr val="accent6"/>
+                </a:solidFill>
+              </a:rPr>
               <a:t>Commodities group</a:t>
             </a:r>
-            <a:endParaRPr lang="en-US" sz="1000" dirty="0"/>
+            <a:endParaRPr lang="en-US" sz="1000" dirty="0">
+              <a:solidFill>
+                <a:schemeClr val="accent6"/>
+              </a:solidFill>
+            </a:endParaRPr>
           </a:p>
         </p:txBody>
       </p:sp>
@@ -8556,10 +9163,18 @@
           <a:lstStyle/>
           <a:p>
             <a:r>
-              <a:rPr lang="en-US" sz="1000" dirty="0" smtClean="0"/>
+              <a:rPr lang="en-US" sz="1000" dirty="0" smtClean="0">
+                <a:solidFill>
+                  <a:srgbClr val="9BBB59"/>
+                </a:solidFill>
+              </a:rPr>
               <a:t>silicon</a:t>
             </a:r>
-            <a:endParaRPr lang="en-US" sz="1000" dirty="0"/>
+            <a:endParaRPr lang="en-US" sz="1000" dirty="0">
+              <a:solidFill>
+                <a:srgbClr val="9BBB59"/>
+              </a:solidFill>
+            </a:endParaRPr>
           </a:p>
         </p:txBody>
       </p:sp>
@@ -8571,8 +9186,8 @@
         </p:nvSpPr>
         <p:spPr>
           <a:xfrm>
-            <a:off x="2641871" y="4051624"/>
-            <a:ext cx="636450" cy="246221"/>
+            <a:off x="2499322" y="4064582"/>
+            <a:ext cx="424052" cy="246221"/>
           </a:xfrm>
           <a:prstGeom prst="rect">
             <a:avLst/>
@@ -8586,10 +9201,18 @@
           <a:lstStyle/>
           <a:p>
             <a:r>
-              <a:rPr lang="en-US" sz="1000" dirty="0" smtClean="0"/>
-              <a:t>passport</a:t>
-            </a:r>
-            <a:endParaRPr lang="en-US" sz="1000" dirty="0"/>
+              <a:rPr lang="en-US" sz="1000" dirty="0" smtClean="0">
+                <a:solidFill>
+                  <a:schemeClr val="accent3"/>
+                </a:solidFill>
+              </a:rPr>
+              <a:t>docs</a:t>
+            </a:r>
+            <a:endParaRPr lang="en-US" sz="1000" dirty="0">
+              <a:solidFill>
+                <a:schemeClr val="accent3"/>
+              </a:solidFill>
+            </a:endParaRPr>
           </a:p>
         </p:txBody>
       </p:sp>
@@ -8616,10 +9239,18 @@
           <a:lstStyle/>
           <a:p>
             <a:r>
-              <a:rPr lang="en-US" sz="1000" dirty="0" smtClean="0"/>
+              <a:rPr lang="en-US" sz="1000" dirty="0" smtClean="0">
+                <a:solidFill>
+                  <a:schemeClr val="accent6"/>
+                </a:solidFill>
+              </a:rPr>
               <a:t>E-Z-Passport</a:t>
             </a:r>
-            <a:endParaRPr lang="en-US" sz="1000" dirty="0"/>
+            <a:endParaRPr lang="en-US" sz="1000" dirty="0">
+              <a:solidFill>
+                <a:schemeClr val="accent6"/>
+              </a:solidFill>
+            </a:endParaRPr>
           </a:p>
         </p:txBody>
       </p:sp>
@@ -8762,6 +9393,357 @@
           </a:fontRef>
         </p:style>
       </p:cxnSp>
+      <p:cxnSp>
+        <p:nvCxnSpPr>
+          <p:cNvPr id="129" name="Straight Arrow Connector 128"/>
+          <p:cNvCxnSpPr/>
+          <p:nvPr/>
+        </p:nvCxnSpPr>
+        <p:spPr>
+          <a:xfrm flipH="1">
+            <a:off x="4175640" y="3388403"/>
+            <a:ext cx="373444" cy="528625"/>
+          </a:xfrm>
+          <a:prstGeom prst="straightConnector1">
+            <a:avLst/>
+          </a:prstGeom>
+          <a:ln>
+            <a:headEnd type="arrow"/>
+            <a:tailEnd type="arrow"/>
+          </a:ln>
+        </p:spPr>
+        <p:style>
+          <a:lnRef idx="2">
+            <a:schemeClr val="accent1"/>
+          </a:lnRef>
+          <a:fillRef idx="0">
+            <a:schemeClr val="accent1"/>
+          </a:fillRef>
+          <a:effectRef idx="1">
+            <a:schemeClr val="accent1"/>
+          </a:effectRef>
+          <a:fontRef idx="minor">
+            <a:schemeClr val="tx1"/>
+          </a:fontRef>
+        </p:style>
+      </p:cxnSp>
+      <p:sp>
+        <p:nvSpPr>
+          <p:cNvPr id="136" name="TextBox 135"/>
+          <p:cNvSpPr txBox="1"/>
+          <p:nvPr/>
+        </p:nvSpPr>
+        <p:spPr>
+          <a:xfrm>
+            <a:off x="5563722" y="2871341"/>
+            <a:ext cx="589675" cy="400110"/>
+          </a:xfrm>
+          <a:prstGeom prst="rect">
+            <a:avLst/>
+          </a:prstGeom>
+          <a:noFill/>
+        </p:spPr>
+        <p:txBody>
+          <a:bodyPr wrap="none" rtlCol="0">
+            <a:spAutoFit/>
+          </a:bodyPr>
+          <a:lstStyle/>
+          <a:p>
+            <a:r>
+              <a:rPr lang="en-US" sz="1000" dirty="0" smtClean="0"/>
+              <a:t>Epsilon</a:t>
+            </a:r>
+          </a:p>
+          <a:p>
+            <a:r>
+              <a:rPr lang="en-US" sz="1000" dirty="0" smtClean="0"/>
+              <a:t>address</a:t>
+            </a:r>
+            <a:endParaRPr lang="en-US" sz="1000" dirty="0"/>
+          </a:p>
+        </p:txBody>
+      </p:sp>
+      <p:cxnSp>
+        <p:nvCxnSpPr>
+          <p:cNvPr id="141" name="Straight Arrow Connector 140"/>
+          <p:cNvCxnSpPr>
+            <a:stCxn id="136" idx="1"/>
+            <a:endCxn id="28" idx="3"/>
+          </p:cNvCxnSpPr>
+          <p:nvPr/>
+        </p:nvCxnSpPr>
+        <p:spPr>
+          <a:xfrm flipH="1">
+            <a:off x="5219666" y="3071396"/>
+            <a:ext cx="344056" cy="23364"/>
+          </a:xfrm>
+          <a:prstGeom prst="straightConnector1">
+            <a:avLst/>
+          </a:prstGeom>
+          <a:ln>
+            <a:headEnd type="arrow"/>
+            <a:tailEnd type="arrow"/>
+          </a:ln>
+        </p:spPr>
+        <p:style>
+          <a:lnRef idx="2">
+            <a:schemeClr val="accent1"/>
+          </a:lnRef>
+          <a:fillRef idx="0">
+            <a:schemeClr val="accent1"/>
+          </a:fillRef>
+          <a:effectRef idx="1">
+            <a:schemeClr val="accent1"/>
+          </a:effectRef>
+          <a:fontRef idx="minor">
+            <a:schemeClr val="tx1"/>
+          </a:fontRef>
+        </p:style>
+      </p:cxnSp>
+      <p:cxnSp>
+        <p:nvCxnSpPr>
+          <p:cNvPr id="149" name="Straight Arrow Connector 148"/>
+          <p:cNvCxnSpPr/>
+          <p:nvPr/>
+        </p:nvCxnSpPr>
+        <p:spPr>
+          <a:xfrm flipV="1">
+            <a:off x="2837319" y="3231669"/>
+            <a:ext cx="1597420" cy="832913"/>
+          </a:xfrm>
+          <a:prstGeom prst="straightConnector1">
+            <a:avLst/>
+          </a:prstGeom>
+          <a:ln>
+            <a:headEnd type="arrow"/>
+            <a:tailEnd type="arrow"/>
+          </a:ln>
+        </p:spPr>
+        <p:style>
+          <a:lnRef idx="2">
+            <a:schemeClr val="accent1"/>
+          </a:lnRef>
+          <a:fillRef idx="0">
+            <a:schemeClr val="accent1"/>
+          </a:fillRef>
+          <a:effectRef idx="1">
+            <a:schemeClr val="accent1"/>
+          </a:effectRef>
+          <a:fontRef idx="minor">
+            <a:schemeClr val="tx1"/>
+          </a:fontRef>
+        </p:style>
+      </p:cxnSp>
+      <p:sp>
+        <p:nvSpPr>
+          <p:cNvPr id="150" name="TextBox 149"/>
+          <p:cNvSpPr txBox="1"/>
+          <p:nvPr/>
+        </p:nvSpPr>
+        <p:spPr>
+          <a:xfrm>
+            <a:off x="2937583" y="1610341"/>
+            <a:ext cx="549537" cy="246221"/>
+          </a:xfrm>
+          <a:prstGeom prst="rect">
+            <a:avLst/>
+          </a:prstGeom>
+          <a:noFill/>
+        </p:spPr>
+        <p:txBody>
+          <a:bodyPr wrap="none" rtlCol="0">
+            <a:spAutoFit/>
+          </a:bodyPr>
+          <a:lstStyle/>
+          <a:p>
+            <a:r>
+              <a:rPr lang="en-US" sz="1000" dirty="0" err="1" smtClean="0">
+                <a:solidFill>
+                  <a:schemeClr val="accent5"/>
+                </a:solidFill>
+              </a:rPr>
+              <a:t>dospro</a:t>
+            </a:r>
+            <a:endParaRPr lang="en-US" sz="1000" dirty="0">
+              <a:solidFill>
+                <a:schemeClr val="accent5"/>
+              </a:solidFill>
+            </a:endParaRPr>
+          </a:p>
+        </p:txBody>
+      </p:sp>
+      <p:cxnSp>
+        <p:nvCxnSpPr>
+          <p:cNvPr id="151" name="Straight Arrow Connector 150"/>
+          <p:cNvCxnSpPr/>
+          <p:nvPr/>
+        </p:nvCxnSpPr>
+        <p:spPr>
+          <a:xfrm>
+            <a:off x="3407241" y="1863365"/>
+            <a:ext cx="844128" cy="884716"/>
+          </a:xfrm>
+          <a:prstGeom prst="straightConnector1">
+            <a:avLst/>
+          </a:prstGeom>
+          <a:ln>
+            <a:headEnd type="arrow"/>
+            <a:tailEnd type="arrow"/>
+          </a:ln>
+        </p:spPr>
+        <p:style>
+          <a:lnRef idx="2">
+            <a:schemeClr val="accent1"/>
+          </a:lnRef>
+          <a:fillRef idx="0">
+            <a:schemeClr val="accent1"/>
+          </a:fillRef>
+          <a:effectRef idx="1">
+            <a:schemeClr val="accent1"/>
+          </a:effectRef>
+          <a:fontRef idx="minor">
+            <a:schemeClr val="tx1"/>
+          </a:fontRef>
+        </p:style>
+      </p:cxnSp>
+      <p:cxnSp>
+        <p:nvCxnSpPr>
+          <p:cNvPr id="152" name="Straight Arrow Connector 151"/>
+          <p:cNvCxnSpPr/>
+          <p:nvPr/>
+        </p:nvCxnSpPr>
+        <p:spPr>
+          <a:xfrm flipV="1">
+            <a:off x="3111397" y="4006104"/>
+            <a:ext cx="550670" cy="357398"/>
+          </a:xfrm>
+          <a:prstGeom prst="straightConnector1">
+            <a:avLst/>
+          </a:prstGeom>
+          <a:ln>
+            <a:solidFill>
+              <a:schemeClr val="accent3"/>
+            </a:solidFill>
+            <a:tailEnd type="arrow"/>
+          </a:ln>
+        </p:spPr>
+        <p:style>
+          <a:lnRef idx="2">
+            <a:schemeClr val="accent1"/>
+          </a:lnRef>
+          <a:fillRef idx="0">
+            <a:schemeClr val="accent1"/>
+          </a:fillRef>
+          <a:effectRef idx="1">
+            <a:schemeClr val="accent1"/>
+          </a:effectRef>
+          <a:fontRef idx="minor">
+            <a:schemeClr val="tx1"/>
+          </a:fontRef>
+        </p:style>
+      </p:cxnSp>
+      <p:sp>
+        <p:nvSpPr>
+          <p:cNvPr id="153" name="TextBox 152"/>
+          <p:cNvSpPr txBox="1"/>
+          <p:nvPr/>
+        </p:nvSpPr>
+        <p:spPr>
+          <a:xfrm>
+            <a:off x="3435450" y="3715437"/>
+            <a:ext cx="333382" cy="246221"/>
+          </a:xfrm>
+          <a:prstGeom prst="rect">
+            <a:avLst/>
+          </a:prstGeom>
+          <a:noFill/>
+        </p:spPr>
+        <p:txBody>
+          <a:bodyPr wrap="none" rtlCol="0">
+            <a:spAutoFit/>
+          </a:bodyPr>
+          <a:lstStyle/>
+          <a:p>
+            <a:r>
+              <a:rPr lang="en-US" sz="1000" dirty="0" smtClean="0">
+                <a:solidFill>
+                  <a:srgbClr val="9BBB59"/>
+                </a:solidFill>
+              </a:rPr>
+              <a:t>IPs</a:t>
+            </a:r>
+            <a:endParaRPr lang="en-US" sz="1000" dirty="0">
+              <a:solidFill>
+                <a:srgbClr val="9BBB59"/>
+              </a:solidFill>
+            </a:endParaRPr>
+          </a:p>
+        </p:txBody>
+      </p:sp>
+      <p:cxnSp>
+        <p:nvCxnSpPr>
+          <p:cNvPr id="154" name="Straight Arrow Connector 153"/>
+          <p:cNvCxnSpPr/>
+          <p:nvPr/>
+        </p:nvCxnSpPr>
+        <p:spPr>
+          <a:xfrm flipH="1">
+            <a:off x="7369144" y="2079397"/>
+            <a:ext cx="280060" cy="843504"/>
+          </a:xfrm>
+          <a:prstGeom prst="straightConnector1">
+            <a:avLst/>
+          </a:prstGeom>
+          <a:ln>
+            <a:headEnd type="arrow"/>
+            <a:tailEnd type="arrow"/>
+          </a:ln>
+        </p:spPr>
+        <p:style>
+          <a:lnRef idx="2">
+            <a:schemeClr val="accent1"/>
+          </a:lnRef>
+          <a:fillRef idx="0">
+            <a:schemeClr val="accent1"/>
+          </a:fillRef>
+          <a:effectRef idx="1">
+            <a:schemeClr val="accent1"/>
+          </a:effectRef>
+          <a:fontRef idx="minor">
+            <a:schemeClr val="tx1"/>
+          </a:fontRef>
+        </p:style>
+      </p:cxnSp>
+      <p:sp>
+        <p:nvSpPr>
+          <p:cNvPr id="155" name="TextBox 154"/>
+          <p:cNvSpPr txBox="1"/>
+          <p:nvPr/>
+        </p:nvSpPr>
+        <p:spPr>
+          <a:xfrm>
+            <a:off x="7513453" y="2330291"/>
+            <a:ext cx="397252" cy="246221"/>
+          </a:xfrm>
+          <a:prstGeom prst="rect">
+            <a:avLst/>
+          </a:prstGeom>
+          <a:noFill/>
+        </p:spPr>
+        <p:txBody>
+          <a:bodyPr wrap="none" rtlCol="0">
+            <a:spAutoFit/>
+          </a:bodyPr>
+          <a:lstStyle/>
+          <a:p>
+            <a:r>
+              <a:rPr lang="en-US" sz="1000" dirty="0" smtClean="0"/>
+              <a:t>+IPs</a:t>
+            </a:r>
+            <a:endParaRPr lang="en-US" sz="1000" dirty="0"/>
+          </a:p>
+        </p:txBody>
+      </p:sp>
     </p:spTree>
     <p:extLst>
       <p:ext uri="{BB962C8B-B14F-4D97-AF65-F5344CB8AC3E}">
@@ -12422,6 +13404,710 @@
           <a:p>
             <a:r>
               <a:rPr lang="en-US" dirty="0" smtClean="0"/>
+              <a:t>Hacking Progression</a:t>
+            </a:r>
+            <a:endParaRPr lang="en-US" dirty="0"/>
+          </a:p>
+        </p:txBody>
+      </p:sp>
+      <p:cxnSp>
+        <p:nvCxnSpPr>
+          <p:cNvPr id="5" name="Straight Arrow Connector 4"/>
+          <p:cNvCxnSpPr/>
+          <p:nvPr/>
+        </p:nvCxnSpPr>
+        <p:spPr>
+          <a:xfrm>
+            <a:off x="311009" y="4548244"/>
+            <a:ext cx="8375791" cy="25916"/>
+          </a:xfrm>
+          <a:prstGeom prst="straightConnector1">
+            <a:avLst/>
+          </a:prstGeom>
+          <a:ln>
+            <a:tailEnd type="arrow"/>
+          </a:ln>
+        </p:spPr>
+        <p:style>
+          <a:lnRef idx="2">
+            <a:schemeClr val="accent1"/>
+          </a:lnRef>
+          <a:fillRef idx="0">
+            <a:schemeClr val="accent1"/>
+          </a:fillRef>
+          <a:effectRef idx="1">
+            <a:schemeClr val="accent1"/>
+          </a:effectRef>
+          <a:fontRef idx="minor">
+            <a:schemeClr val="tx1"/>
+          </a:fontRef>
+        </p:style>
+      </p:cxnSp>
+      <p:sp>
+        <p:nvSpPr>
+          <p:cNvPr id="6" name="TextBox 5"/>
+          <p:cNvSpPr txBox="1"/>
+          <p:nvPr/>
+        </p:nvSpPr>
+        <p:spPr>
+          <a:xfrm>
+            <a:off x="457200" y="3394986"/>
+            <a:ext cx="1241446" cy="646331"/>
+          </a:xfrm>
+          <a:prstGeom prst="rect">
+            <a:avLst/>
+          </a:prstGeom>
+          <a:noFill/>
+        </p:spPr>
+        <p:txBody>
+          <a:bodyPr wrap="none" rtlCol="0">
+            <a:spAutoFit/>
+          </a:bodyPr>
+          <a:lstStyle/>
+          <a:p>
+            <a:r>
+              <a:rPr lang="en-US" dirty="0" smtClean="0"/>
+              <a:t>Guessing</a:t>
+            </a:r>
+          </a:p>
+          <a:p>
+            <a:r>
+              <a:rPr lang="en-US" dirty="0" smtClean="0"/>
+              <a:t>Brute force</a:t>
+            </a:r>
+            <a:endParaRPr lang="en-US" dirty="0"/>
+          </a:p>
+        </p:txBody>
+      </p:sp>
+      <p:cxnSp>
+        <p:nvCxnSpPr>
+          <p:cNvPr id="8" name="Straight Connector 7"/>
+          <p:cNvCxnSpPr>
+            <a:stCxn id="6" idx="2"/>
+          </p:cNvCxnSpPr>
+          <p:nvPr/>
+        </p:nvCxnSpPr>
+        <p:spPr>
+          <a:xfrm flipH="1">
+            <a:off x="1075574" y="4041317"/>
+            <a:ext cx="2349" cy="506927"/>
+          </a:xfrm>
+          <a:prstGeom prst="line">
+            <a:avLst/>
+          </a:prstGeom>
+        </p:spPr>
+        <p:style>
+          <a:lnRef idx="2">
+            <a:schemeClr val="accent1"/>
+          </a:lnRef>
+          <a:fillRef idx="0">
+            <a:schemeClr val="accent1"/>
+          </a:fillRef>
+          <a:effectRef idx="1">
+            <a:schemeClr val="accent1"/>
+          </a:effectRef>
+          <a:fontRef idx="minor">
+            <a:schemeClr val="tx1"/>
+          </a:fontRef>
+        </p:style>
+      </p:cxnSp>
+      <p:sp>
+        <p:nvSpPr>
+          <p:cNvPr id="9" name="TextBox 8"/>
+          <p:cNvSpPr txBox="1"/>
+          <p:nvPr/>
+        </p:nvSpPr>
+        <p:spPr>
+          <a:xfrm>
+            <a:off x="1619201" y="3394986"/>
+            <a:ext cx="1969898" cy="646331"/>
+          </a:xfrm>
+          <a:prstGeom prst="rect">
+            <a:avLst/>
+          </a:prstGeom>
+          <a:noFill/>
+        </p:spPr>
+        <p:txBody>
+          <a:bodyPr wrap="none" rtlCol="0">
+            <a:spAutoFit/>
+          </a:bodyPr>
+          <a:lstStyle/>
+          <a:p>
+            <a:pPr algn="ctr"/>
+            <a:r>
+              <a:rPr lang="en-US" dirty="0" smtClean="0"/>
+              <a:t>Using Password</a:t>
+            </a:r>
+          </a:p>
+          <a:p>
+            <a:r>
+              <a:rPr lang="en-US" dirty="0" smtClean="0"/>
+              <a:t>Crackers – get bots</a:t>
+            </a:r>
+          </a:p>
+        </p:txBody>
+      </p:sp>
+      <p:cxnSp>
+        <p:nvCxnSpPr>
+          <p:cNvPr id="10" name="Straight Connector 9"/>
+          <p:cNvCxnSpPr>
+            <a:stCxn id="9" idx="2"/>
+          </p:cNvCxnSpPr>
+          <p:nvPr/>
+        </p:nvCxnSpPr>
+        <p:spPr>
+          <a:xfrm>
+            <a:off x="2604150" y="4041317"/>
+            <a:ext cx="0" cy="532843"/>
+          </a:xfrm>
+          <a:prstGeom prst="line">
+            <a:avLst/>
+          </a:prstGeom>
+        </p:spPr>
+        <p:style>
+          <a:lnRef idx="2">
+            <a:schemeClr val="accent1"/>
+          </a:lnRef>
+          <a:fillRef idx="0">
+            <a:schemeClr val="accent1"/>
+          </a:fillRef>
+          <a:effectRef idx="1">
+            <a:schemeClr val="accent1"/>
+          </a:effectRef>
+          <a:fontRef idx="minor">
+            <a:schemeClr val="tx1"/>
+          </a:fontRef>
+        </p:style>
+      </p:cxnSp>
+      <p:sp>
+        <p:nvSpPr>
+          <p:cNvPr id="12" name="TextBox 11"/>
+          <p:cNvSpPr txBox="1"/>
+          <p:nvPr/>
+        </p:nvSpPr>
+        <p:spPr>
+          <a:xfrm>
+            <a:off x="3463629" y="3369070"/>
+            <a:ext cx="1762960" cy="646331"/>
+          </a:xfrm>
+          <a:prstGeom prst="rect">
+            <a:avLst/>
+          </a:prstGeom>
+          <a:noFill/>
+        </p:spPr>
+        <p:txBody>
+          <a:bodyPr wrap="none" rtlCol="0">
+            <a:spAutoFit/>
+          </a:bodyPr>
+          <a:lstStyle/>
+          <a:p>
+            <a:pPr algn="ctr"/>
+            <a:r>
+              <a:rPr lang="en-US" dirty="0" smtClean="0"/>
+              <a:t>Released Viruses</a:t>
+            </a:r>
+          </a:p>
+          <a:p>
+            <a:pPr algn="ctr"/>
+            <a:r>
+              <a:rPr lang="en-US" dirty="0" smtClean="0"/>
+              <a:t>Acquire Bots</a:t>
+            </a:r>
+          </a:p>
+        </p:txBody>
+      </p:sp>
+      <p:cxnSp>
+        <p:nvCxnSpPr>
+          <p:cNvPr id="13" name="Straight Connector 12"/>
+          <p:cNvCxnSpPr>
+            <a:stCxn id="12" idx="2"/>
+          </p:cNvCxnSpPr>
+          <p:nvPr/>
+        </p:nvCxnSpPr>
+        <p:spPr>
+          <a:xfrm>
+            <a:off x="4345109" y="4015401"/>
+            <a:ext cx="0" cy="532843"/>
+          </a:xfrm>
+          <a:prstGeom prst="line">
+            <a:avLst/>
+          </a:prstGeom>
+        </p:spPr>
+        <p:style>
+          <a:lnRef idx="2">
+            <a:schemeClr val="accent1"/>
+          </a:lnRef>
+          <a:fillRef idx="0">
+            <a:schemeClr val="accent1"/>
+          </a:fillRef>
+          <a:effectRef idx="1">
+            <a:schemeClr val="accent1"/>
+          </a:effectRef>
+          <a:fontRef idx="minor">
+            <a:schemeClr val="tx1"/>
+          </a:fontRef>
+        </p:style>
+      </p:cxnSp>
+      <p:sp>
+        <p:nvSpPr>
+          <p:cNvPr id="14" name="TextBox 13"/>
+          <p:cNvSpPr txBox="1"/>
+          <p:nvPr/>
+        </p:nvSpPr>
+        <p:spPr>
+          <a:xfrm>
+            <a:off x="5226589" y="3369070"/>
+            <a:ext cx="1441420" cy="646331"/>
+          </a:xfrm>
+          <a:prstGeom prst="rect">
+            <a:avLst/>
+          </a:prstGeom>
+          <a:noFill/>
+        </p:spPr>
+        <p:txBody>
+          <a:bodyPr wrap="none" rtlCol="0">
+            <a:spAutoFit/>
+          </a:bodyPr>
+          <a:lstStyle/>
+          <a:p>
+            <a:pPr algn="ctr"/>
+            <a:r>
+              <a:rPr lang="en-US" dirty="0" smtClean="0"/>
+              <a:t>DDOS attacks</a:t>
+            </a:r>
+          </a:p>
+          <a:p>
+            <a:pPr algn="ctr"/>
+            <a:r>
+              <a:rPr lang="en-US" dirty="0" smtClean="0"/>
+              <a:t>w/bots</a:t>
+            </a:r>
+          </a:p>
+        </p:txBody>
+      </p:sp>
+      <p:cxnSp>
+        <p:nvCxnSpPr>
+          <p:cNvPr id="15" name="Straight Connector 14"/>
+          <p:cNvCxnSpPr>
+            <a:stCxn id="14" idx="2"/>
+          </p:cNvCxnSpPr>
+          <p:nvPr/>
+        </p:nvCxnSpPr>
+        <p:spPr>
+          <a:xfrm>
+            <a:off x="5947299" y="4015401"/>
+            <a:ext cx="0" cy="532843"/>
+          </a:xfrm>
+          <a:prstGeom prst="line">
+            <a:avLst/>
+          </a:prstGeom>
+        </p:spPr>
+        <p:style>
+          <a:lnRef idx="2">
+            <a:schemeClr val="accent1"/>
+          </a:lnRef>
+          <a:fillRef idx="0">
+            <a:schemeClr val="accent1"/>
+          </a:fillRef>
+          <a:effectRef idx="1">
+            <a:schemeClr val="accent1"/>
+          </a:effectRef>
+          <a:fontRef idx="minor">
+            <a:schemeClr val="tx1"/>
+          </a:fontRef>
+        </p:style>
+      </p:cxnSp>
+      <p:sp>
+        <p:nvSpPr>
+          <p:cNvPr id="16" name="TextBox 15"/>
+          <p:cNvSpPr txBox="1"/>
+          <p:nvPr/>
+        </p:nvSpPr>
+        <p:spPr>
+          <a:xfrm>
+            <a:off x="6840909" y="3356113"/>
+            <a:ext cx="1418628" cy="923330"/>
+          </a:xfrm>
+          <a:prstGeom prst="rect">
+            <a:avLst/>
+          </a:prstGeom>
+          <a:noFill/>
+        </p:spPr>
+        <p:txBody>
+          <a:bodyPr wrap="none" rtlCol="0">
+            <a:spAutoFit/>
+          </a:bodyPr>
+          <a:lstStyle/>
+          <a:p>
+            <a:pPr algn="ctr"/>
+            <a:r>
+              <a:rPr lang="en-US" dirty="0" smtClean="0"/>
+              <a:t>Quark II</a:t>
+            </a:r>
+          </a:p>
+          <a:p>
+            <a:pPr algn="ctr"/>
+            <a:r>
+              <a:rPr lang="en-US" dirty="0" smtClean="0"/>
+              <a:t>To crack high </a:t>
+            </a:r>
+          </a:p>
+          <a:p>
+            <a:pPr algn="ctr"/>
+            <a:r>
+              <a:rPr lang="en-US" dirty="0" smtClean="0"/>
+              <a:t>profile sites</a:t>
+            </a:r>
+          </a:p>
+        </p:txBody>
+      </p:sp>
+      <p:cxnSp>
+        <p:nvCxnSpPr>
+          <p:cNvPr id="17" name="Straight Connector 16"/>
+          <p:cNvCxnSpPr>
+            <a:stCxn id="16" idx="2"/>
+          </p:cNvCxnSpPr>
+          <p:nvPr/>
+        </p:nvCxnSpPr>
+        <p:spPr>
+          <a:xfrm>
+            <a:off x="7550223" y="4279443"/>
+            <a:ext cx="0" cy="255845"/>
+          </a:xfrm>
+          <a:prstGeom prst="line">
+            <a:avLst/>
+          </a:prstGeom>
+        </p:spPr>
+        <p:style>
+          <a:lnRef idx="2">
+            <a:schemeClr val="accent1"/>
+          </a:lnRef>
+          <a:fillRef idx="0">
+            <a:schemeClr val="accent1"/>
+          </a:fillRef>
+          <a:effectRef idx="1">
+            <a:schemeClr val="accent1"/>
+          </a:effectRef>
+          <a:fontRef idx="minor">
+            <a:schemeClr val="tx1"/>
+          </a:fontRef>
+        </p:style>
+      </p:cxnSp>
+      <p:cxnSp>
+        <p:nvCxnSpPr>
+          <p:cNvPr id="18" name="Straight Connector 17"/>
+          <p:cNvCxnSpPr/>
+          <p:nvPr/>
+        </p:nvCxnSpPr>
+        <p:spPr>
+          <a:xfrm>
+            <a:off x="8441270" y="3369070"/>
+            <a:ext cx="0" cy="1205090"/>
+          </a:xfrm>
+          <a:prstGeom prst="line">
+            <a:avLst/>
+          </a:prstGeom>
+        </p:spPr>
+        <p:style>
+          <a:lnRef idx="2">
+            <a:schemeClr val="accent1"/>
+          </a:lnRef>
+          <a:fillRef idx="0">
+            <a:schemeClr val="accent1"/>
+          </a:fillRef>
+          <a:effectRef idx="1">
+            <a:schemeClr val="accent1"/>
+          </a:effectRef>
+          <a:fontRef idx="minor">
+            <a:schemeClr val="tx1"/>
+          </a:fontRef>
+        </p:style>
+      </p:cxnSp>
+      <p:sp>
+        <p:nvSpPr>
+          <p:cNvPr id="20" name="TextBox 19"/>
+          <p:cNvSpPr txBox="1"/>
+          <p:nvPr/>
+        </p:nvSpPr>
+        <p:spPr>
+          <a:xfrm>
+            <a:off x="7695166" y="2722739"/>
+            <a:ext cx="1448834" cy="646331"/>
+          </a:xfrm>
+          <a:prstGeom prst="rect">
+            <a:avLst/>
+          </a:prstGeom>
+          <a:noFill/>
+        </p:spPr>
+        <p:txBody>
+          <a:bodyPr wrap="none" rtlCol="0">
+            <a:spAutoFit/>
+          </a:bodyPr>
+          <a:lstStyle/>
+          <a:p>
+            <a:pPr algn="ctr"/>
+            <a:r>
+              <a:rPr lang="en-US" dirty="0" smtClean="0"/>
+              <a:t>worms attack</a:t>
+            </a:r>
+          </a:p>
+          <a:p>
+            <a:pPr algn="ctr"/>
+            <a:r>
+              <a:rPr lang="en-US" dirty="0" smtClean="0"/>
+              <a:t>datacenters</a:t>
+            </a:r>
+          </a:p>
+        </p:txBody>
+      </p:sp>
+      <p:cxnSp>
+        <p:nvCxnSpPr>
+          <p:cNvPr id="21" name="Straight Connector 20"/>
+          <p:cNvCxnSpPr/>
+          <p:nvPr/>
+        </p:nvCxnSpPr>
+        <p:spPr>
+          <a:xfrm>
+            <a:off x="5568391" y="4548244"/>
+            <a:ext cx="0" cy="532843"/>
+          </a:xfrm>
+          <a:prstGeom prst="line">
+            <a:avLst/>
+          </a:prstGeom>
+        </p:spPr>
+        <p:style>
+          <a:lnRef idx="2">
+            <a:schemeClr val="accent1"/>
+          </a:lnRef>
+          <a:fillRef idx="0">
+            <a:schemeClr val="accent1"/>
+          </a:fillRef>
+          <a:effectRef idx="1">
+            <a:schemeClr val="accent1"/>
+          </a:effectRef>
+          <a:fontRef idx="minor">
+            <a:schemeClr val="tx1"/>
+          </a:fontRef>
+        </p:style>
+      </p:cxnSp>
+      <p:sp>
+        <p:nvSpPr>
+          <p:cNvPr id="22" name="TextBox 21"/>
+          <p:cNvSpPr txBox="1"/>
+          <p:nvPr/>
+        </p:nvSpPr>
+        <p:spPr>
+          <a:xfrm>
+            <a:off x="4714498" y="5134486"/>
+            <a:ext cx="1326004" cy="646331"/>
+          </a:xfrm>
+          <a:prstGeom prst="rect">
+            <a:avLst/>
+          </a:prstGeom>
+          <a:noFill/>
+        </p:spPr>
+        <p:txBody>
+          <a:bodyPr wrap="none" rtlCol="0">
+            <a:spAutoFit/>
+          </a:bodyPr>
+          <a:lstStyle/>
+          <a:p>
+            <a:pPr algn="ctr"/>
+            <a:r>
+              <a:rPr lang="en-US" dirty="0" smtClean="0"/>
+              <a:t>Use bots for </a:t>
+            </a:r>
+          </a:p>
+          <a:p>
+            <a:pPr algn="ctr"/>
+            <a:r>
+              <a:rPr lang="en-US" dirty="0" smtClean="0"/>
+              <a:t>Mining </a:t>
+            </a:r>
+            <a:r>
+              <a:rPr lang="en-US" dirty="0" err="1" smtClean="0"/>
+              <a:t>btc</a:t>
+            </a:r>
+            <a:endParaRPr lang="en-US" dirty="0" smtClean="0"/>
+          </a:p>
+        </p:txBody>
+      </p:sp>
+      <p:cxnSp>
+        <p:nvCxnSpPr>
+          <p:cNvPr id="23" name="Straight Connector 22"/>
+          <p:cNvCxnSpPr/>
+          <p:nvPr/>
+        </p:nvCxnSpPr>
+        <p:spPr>
+          <a:xfrm>
+            <a:off x="6674002" y="4574160"/>
+            <a:ext cx="0" cy="532843"/>
+          </a:xfrm>
+          <a:prstGeom prst="line">
+            <a:avLst/>
+          </a:prstGeom>
+        </p:spPr>
+        <p:style>
+          <a:lnRef idx="2">
+            <a:schemeClr val="accent1"/>
+          </a:lnRef>
+          <a:fillRef idx="0">
+            <a:schemeClr val="accent1"/>
+          </a:fillRef>
+          <a:effectRef idx="1">
+            <a:schemeClr val="accent1"/>
+          </a:effectRef>
+          <a:fontRef idx="minor">
+            <a:schemeClr val="tx1"/>
+          </a:fontRef>
+        </p:style>
+      </p:cxnSp>
+      <p:sp>
+        <p:nvSpPr>
+          <p:cNvPr id="24" name="TextBox 23"/>
+          <p:cNvSpPr txBox="1"/>
+          <p:nvPr/>
+        </p:nvSpPr>
+        <p:spPr>
+          <a:xfrm>
+            <a:off x="6146465" y="5160440"/>
+            <a:ext cx="1326004" cy="646331"/>
+          </a:xfrm>
+          <a:prstGeom prst="rect">
+            <a:avLst/>
+          </a:prstGeom>
+          <a:noFill/>
+        </p:spPr>
+        <p:txBody>
+          <a:bodyPr wrap="none" rtlCol="0">
+            <a:spAutoFit/>
+          </a:bodyPr>
+          <a:lstStyle/>
+          <a:p>
+            <a:pPr algn="ctr"/>
+            <a:r>
+              <a:rPr lang="en-US" dirty="0" smtClean="0"/>
+              <a:t>Use bots for </a:t>
+            </a:r>
+          </a:p>
+          <a:p>
+            <a:pPr algn="ctr"/>
+            <a:r>
+              <a:rPr lang="en-US" dirty="0" smtClean="0"/>
+              <a:t>defense</a:t>
+            </a:r>
+          </a:p>
+        </p:txBody>
+      </p:sp>
+      <p:sp>
+        <p:nvSpPr>
+          <p:cNvPr id="25" name="TextBox 24"/>
+          <p:cNvSpPr txBox="1"/>
+          <p:nvPr/>
+        </p:nvSpPr>
+        <p:spPr>
+          <a:xfrm>
+            <a:off x="4047826" y="2774572"/>
+            <a:ext cx="2072014" cy="369332"/>
+          </a:xfrm>
+          <a:prstGeom prst="rect">
+            <a:avLst/>
+          </a:prstGeom>
+          <a:noFill/>
+        </p:spPr>
+        <p:txBody>
+          <a:bodyPr wrap="none" rtlCol="0">
+            <a:spAutoFit/>
+          </a:bodyPr>
+          <a:lstStyle/>
+          <a:p>
+            <a:pPr algn="ctr"/>
+            <a:r>
+              <a:rPr lang="en-US" dirty="0" smtClean="0"/>
+              <a:t>Use bots to get Bots</a:t>
+            </a:r>
+          </a:p>
+        </p:txBody>
+      </p:sp>
+      <p:cxnSp>
+        <p:nvCxnSpPr>
+          <p:cNvPr id="26" name="Straight Connector 25"/>
+          <p:cNvCxnSpPr>
+            <a:stCxn id="25" idx="2"/>
+          </p:cNvCxnSpPr>
+          <p:nvPr/>
+        </p:nvCxnSpPr>
+        <p:spPr>
+          <a:xfrm>
+            <a:off x="5083833" y="3143904"/>
+            <a:ext cx="0" cy="1391384"/>
+          </a:xfrm>
+          <a:prstGeom prst="line">
+            <a:avLst/>
+          </a:prstGeom>
+        </p:spPr>
+        <p:style>
+          <a:lnRef idx="2">
+            <a:schemeClr val="accent1"/>
+          </a:lnRef>
+          <a:fillRef idx="0">
+            <a:schemeClr val="accent1"/>
+          </a:fillRef>
+          <a:effectRef idx="1">
+            <a:schemeClr val="accent1"/>
+          </a:effectRef>
+          <a:fontRef idx="minor">
+            <a:schemeClr val="tx1"/>
+          </a:fontRef>
+        </p:style>
+      </p:cxnSp>
+    </p:spTree>
+    <p:extLst>
+      <p:ext uri="{BB962C8B-B14F-4D97-AF65-F5344CB8AC3E}">
+        <p14:creationId xmlns:p14="http://schemas.microsoft.com/office/powerpoint/2010/main" val="1633030385"/>
+      </p:ext>
+    </p:extLst>
+  </p:cSld>
+  <p:clrMapOvr>
+    <a:masterClrMapping/>
+  </p:clrMapOvr>
+</p:sld>
+</file>
+
+<file path=ppt/slides/slide8.xml><?xml version="1.0" encoding="utf-8"?>
+<p:sld xmlns:a="http://schemas.openxmlformats.org/drawingml/2006/main" xmlns:r="http://schemas.openxmlformats.org/officeDocument/2006/relationships" xmlns:p="http://schemas.openxmlformats.org/presentationml/2006/main">
+  <p:cSld>
+    <p:spTree>
+      <p:nvGrpSpPr>
+        <p:cNvPr id="1" name=""/>
+        <p:cNvGrpSpPr/>
+        <p:nvPr/>
+      </p:nvGrpSpPr>
+      <p:grpSpPr>
+        <a:xfrm>
+          <a:off x="0" y="0"/>
+          <a:ext cx="0" cy="0"/>
+          <a:chOff x="0" y="0"/>
+          <a:chExt cx="0" cy="0"/>
+        </a:xfrm>
+      </p:grpSpPr>
+      <p:sp>
+        <p:nvSpPr>
+          <p:cNvPr id="2" name="Title 1"/>
+          <p:cNvSpPr>
+            <a:spLocks noGrp="1"/>
+          </p:cNvSpPr>
+          <p:nvPr>
+            <p:ph type="title"/>
+          </p:nvPr>
+        </p:nvSpPr>
+        <p:spPr/>
+        <p:txBody>
+          <a:bodyPr/>
+          <a:lstStyle/>
+          <a:p>
+            <a:r>
+              <a:rPr lang="en-US" dirty="0" smtClean="0"/>
               <a:t>Game Flow</a:t>
             </a:r>
             <a:endParaRPr lang="en-US" dirty="0"/>
@@ -12620,7 +14306,7 @@
 </p:sld>
 </file>
 
-<file path=ppt/slides/slide8.xml><?xml version="1.0" encoding="utf-8"?>
+<file path=ppt/slides/slide9.xml><?xml version="1.0" encoding="utf-8"?>
 <p:sld xmlns:a="http://schemas.openxmlformats.org/drawingml/2006/main" xmlns:r="http://schemas.openxmlformats.org/officeDocument/2006/relationships" xmlns:p="http://schemas.openxmlformats.org/presentationml/2006/main">
   <p:cSld>
     <p:spTree>

</xml_diff>

<commit_message>
oslayout up and running
</commit_message>
<xml_diff>
--- a/puzzle9_resourceGuide.pptx
+++ b/puzzle9_resourceGuide.pptx
@@ -297,7 +297,7 @@
           <a:p>
             <a:fld id="{83C2B043-E5D7-564F-B47B-C0FE35424682}" type="datetimeFigureOut">
               <a:rPr lang="en-US" smtClean="0"/>
-              <a:t>11/11/15</a:t>
+              <a:t>11/26/15</a:t>
             </a:fld>
             <a:endParaRPr lang="en-US"/>
           </a:p>
@@ -467,7 +467,7 @@
           <a:p>
             <a:fld id="{83C2B043-E5D7-564F-B47B-C0FE35424682}" type="datetimeFigureOut">
               <a:rPr lang="en-US" smtClean="0"/>
-              <a:t>11/11/15</a:t>
+              <a:t>11/26/15</a:t>
             </a:fld>
             <a:endParaRPr lang="en-US"/>
           </a:p>
@@ -647,7 +647,7 @@
           <a:p>
             <a:fld id="{83C2B043-E5D7-564F-B47B-C0FE35424682}" type="datetimeFigureOut">
               <a:rPr lang="en-US" smtClean="0"/>
-              <a:t>11/11/15</a:t>
+              <a:t>11/26/15</a:t>
             </a:fld>
             <a:endParaRPr lang="en-US"/>
           </a:p>
@@ -817,7 +817,7 @@
           <a:p>
             <a:fld id="{83C2B043-E5D7-564F-B47B-C0FE35424682}" type="datetimeFigureOut">
               <a:rPr lang="en-US" smtClean="0"/>
-              <a:t>11/11/15</a:t>
+              <a:t>11/26/15</a:t>
             </a:fld>
             <a:endParaRPr lang="en-US"/>
           </a:p>
@@ -1063,7 +1063,7 @@
           <a:p>
             <a:fld id="{83C2B043-E5D7-564F-B47B-C0FE35424682}" type="datetimeFigureOut">
               <a:rPr lang="en-US" smtClean="0"/>
-              <a:t>11/11/15</a:t>
+              <a:t>11/26/15</a:t>
             </a:fld>
             <a:endParaRPr lang="en-US"/>
           </a:p>
@@ -1351,7 +1351,7 @@
           <a:p>
             <a:fld id="{83C2B043-E5D7-564F-B47B-C0FE35424682}" type="datetimeFigureOut">
               <a:rPr lang="en-US" smtClean="0"/>
-              <a:t>11/11/15</a:t>
+              <a:t>11/26/15</a:t>
             </a:fld>
             <a:endParaRPr lang="en-US"/>
           </a:p>
@@ -1773,7 +1773,7 @@
           <a:p>
             <a:fld id="{83C2B043-E5D7-564F-B47B-C0FE35424682}" type="datetimeFigureOut">
               <a:rPr lang="en-US" smtClean="0"/>
-              <a:t>11/11/15</a:t>
+              <a:t>11/26/15</a:t>
             </a:fld>
             <a:endParaRPr lang="en-US"/>
           </a:p>
@@ -1891,7 +1891,7 @@
           <a:p>
             <a:fld id="{83C2B043-E5D7-564F-B47B-C0FE35424682}" type="datetimeFigureOut">
               <a:rPr lang="en-US" smtClean="0"/>
-              <a:t>11/11/15</a:t>
+              <a:t>11/26/15</a:t>
             </a:fld>
             <a:endParaRPr lang="en-US"/>
           </a:p>
@@ -1986,7 +1986,7 @@
           <a:p>
             <a:fld id="{83C2B043-E5D7-564F-B47B-C0FE35424682}" type="datetimeFigureOut">
               <a:rPr lang="en-US" smtClean="0"/>
-              <a:t>11/11/15</a:t>
+              <a:t>11/26/15</a:t>
             </a:fld>
             <a:endParaRPr lang="en-US"/>
           </a:p>
@@ -2263,7 +2263,7 @@
           <a:p>
             <a:fld id="{83C2B043-E5D7-564F-B47B-C0FE35424682}" type="datetimeFigureOut">
               <a:rPr lang="en-US" smtClean="0"/>
-              <a:t>11/11/15</a:t>
+              <a:t>11/26/15</a:t>
             </a:fld>
             <a:endParaRPr lang="en-US"/>
           </a:p>
@@ -2516,7 +2516,7 @@
           <a:p>
             <a:fld id="{83C2B043-E5D7-564F-B47B-C0FE35424682}" type="datetimeFigureOut">
               <a:rPr lang="en-US" smtClean="0"/>
-              <a:t>11/11/15</a:t>
+              <a:t>11/26/15</a:t>
             </a:fld>
             <a:endParaRPr lang="en-US"/>
           </a:p>
@@ -2729,7 +2729,7 @@
           <a:p>
             <a:fld id="{83C2B043-E5D7-564F-B47B-C0FE35424682}" type="datetimeFigureOut">
               <a:rPr lang="en-US" smtClean="0"/>
-              <a:t>11/11/15</a:t>
+              <a:t>11/26/15</a:t>
             </a:fld>
             <a:endParaRPr lang="en-US"/>
           </a:p>
@@ -7716,15 +7716,7 @@
                   <a:srgbClr val="3366FF"/>
                 </a:solidFill>
               </a:rPr>
-              <a:t>(+t.s.</a:t>
-            </a:r>
-            <a:r>
-              <a:rPr lang="en-US" sz="1000" dirty="0" smtClean="0">
-                <a:solidFill>
-                  <a:srgbClr val="3366FF"/>
-                </a:solidFill>
-              </a:rPr>
-              <a:t>+</a:t>
+              <a:t>(+t.s.+</a:t>
             </a:r>
             <a:r>
               <a:rPr lang="en-US" sz="1000" dirty="0" err="1" smtClean="0">
@@ -14381,8 +14373,8 @@
           <a:p>
             <a:pPr algn="ctr"/>
             <a:r>
-              <a:rPr lang="en-US" dirty="0" err="1" smtClean="0"/>
-              <a:t>btc</a:t>
+              <a:rPr lang="en-US" dirty="0" smtClean="0"/>
+              <a:t>ads</a:t>
             </a:r>
             <a:endParaRPr lang="en-US" dirty="0"/>
           </a:p>
@@ -14465,8 +14457,8 @@
           <a:p>
             <a:pPr algn="ctr"/>
             <a:r>
-              <a:rPr lang="en-US" dirty="0" smtClean="0"/>
-              <a:t>pills</a:t>
+              <a:rPr lang="en-US" dirty="0"/>
+              <a:t>cards</a:t>
             </a:r>
             <a:endParaRPr lang="en-US" dirty="0"/>
           </a:p>
@@ -14633,8 +14625,8 @@
           <a:p>
             <a:pPr algn="ctr"/>
             <a:r>
-              <a:rPr lang="en-US" dirty="0" err="1" smtClean="0"/>
-              <a:t>usd</a:t>
+              <a:rPr lang="en-US" dirty="0" smtClean="0"/>
+              <a:t>workers</a:t>
             </a:r>
             <a:endParaRPr lang="en-US" dirty="0"/>
           </a:p>
@@ -14923,8 +14915,8 @@
           <a:p>
             <a:pPr algn="ctr"/>
             <a:r>
-              <a:rPr lang="en-US" dirty="0" smtClean="0"/>
-              <a:t>Trade sec</a:t>
+              <a:rPr lang="en-US" dirty="0" err="1"/>
+              <a:t>ssns</a:t>
             </a:r>
             <a:endParaRPr lang="en-US" dirty="0"/>
           </a:p>
@@ -14964,6 +14956,10 @@
           <a:lstStyle/>
           <a:p>
             <a:pPr algn="ctr"/>
+            <a:r>
+              <a:rPr lang="en-US" dirty="0"/>
+              <a:t>pills</a:t>
+            </a:r>
             <a:endParaRPr lang="en-US" dirty="0"/>
           </a:p>
         </p:txBody>
@@ -15041,12 +15037,8 @@
           <a:p>
             <a:pPr algn="ctr"/>
             <a:r>
-              <a:rPr lang="en-US" dirty="0" smtClean="0"/>
-              <a:t>Deep </a:t>
-            </a:r>
-            <a:r>
-              <a:rPr lang="en-US" dirty="0" err="1" smtClean="0"/>
-              <a:t>Ckd</a:t>
+              <a:rPr lang="en-US" dirty="0"/>
+              <a:t>Quark II</a:t>
             </a:r>
             <a:endParaRPr lang="en-US" dirty="0"/>
           </a:p>
@@ -15130,7 +15122,7 @@
             <a:pPr algn="ctr"/>
             <a:r>
               <a:rPr lang="en-US" dirty="0" smtClean="0"/>
-              <a:t>workers</a:t>
+              <a:t/>
             </a:r>
             <a:endParaRPr lang="en-US" dirty="0"/>
           </a:p>
@@ -15217,8 +15209,8 @@
           <a:p>
             <a:pPr algn="ctr"/>
             <a:r>
-              <a:rPr lang="en-US" dirty="0" smtClean="0"/>
-              <a:t>exploits</a:t>
+              <a:rPr lang="en-US" dirty="0"/>
+              <a:t>silicon</a:t>
             </a:r>
             <a:endParaRPr lang="en-US" dirty="0"/>
           </a:p>
@@ -15296,10 +15288,6 @@
           <a:lstStyle/>
           <a:p>
             <a:pPr algn="ctr"/>
-            <a:r>
-              <a:rPr lang="en-US" dirty="0" smtClean="0"/>
-              <a:t>Quark II</a:t>
-            </a:r>
             <a:endParaRPr lang="en-US" dirty="0"/>
           </a:p>
         </p:txBody>
@@ -15380,10 +15368,6 @@
           <a:lstStyle/>
           <a:p>
             <a:pPr algn="ctr"/>
-            <a:r>
-              <a:rPr lang="en-US" dirty="0" smtClean="0"/>
-              <a:t>ads</a:t>
-            </a:r>
             <a:endParaRPr lang="en-US" dirty="0"/>
           </a:p>
         </p:txBody>
@@ -15422,7 +15406,11 @@
           <a:lstStyle/>
           <a:p>
             <a:pPr algn="ctr"/>
-            <a:endParaRPr lang="en-US"/>
+            <a:r>
+              <a:rPr lang="en-US" dirty="0"/>
+              <a:t>Trade sec</a:t>
+            </a:r>
+            <a:endParaRPr lang="en-US" dirty="0"/>
           </a:p>
         </p:txBody>
       </p:sp>
@@ -15461,8 +15449,8 @@
           <a:p>
             <a:pPr algn="ctr"/>
             <a:r>
-              <a:rPr lang="en-US" dirty="0" smtClean="0"/>
-              <a:t>hardware</a:t>
+              <a:rPr lang="en-US" dirty="0"/>
+              <a:t>chips</a:t>
             </a:r>
             <a:endParaRPr lang="en-US" dirty="0"/>
           </a:p>
@@ -15654,7 +15642,11 @@
           <a:lstStyle/>
           <a:p>
             <a:pPr algn="ctr"/>
-            <a:endParaRPr lang="en-US"/>
+            <a:r>
+              <a:rPr lang="en-US" dirty="0"/>
+              <a:t>exploits</a:t>
+            </a:r>
+            <a:endParaRPr lang="en-US" dirty="0"/>
           </a:p>
         </p:txBody>
       </p:sp>
@@ -15692,10 +15684,6 @@
           <a:lstStyle/>
           <a:p>
             <a:pPr algn="ctr"/>
-            <a:r>
-              <a:rPr lang="en-US" dirty="0" smtClean="0"/>
-              <a:t>silicon</a:t>
-            </a:r>
             <a:endParaRPr lang="en-US" dirty="0"/>
           </a:p>
         </p:txBody>
@@ -15886,7 +15874,7 @@
           <a:lstStyle/>
           <a:p>
             <a:pPr algn="ctr"/>
-            <a:endParaRPr lang="en-US"/>
+            <a:endParaRPr lang="en-US" dirty="0"/>
           </a:p>
         </p:txBody>
       </p:sp>
@@ -16273,6 +16261,232 @@
               <a:t>1                   2                       3                       4                        5                       6  </a:t>
             </a:r>
             <a:endParaRPr lang="en-US" dirty="0"/>
+          </a:p>
+        </p:txBody>
+      </p:sp>
+      <p:sp>
+        <p:nvSpPr>
+          <p:cNvPr id="5" name="TextBox 4"/>
+          <p:cNvSpPr txBox="1"/>
+          <p:nvPr/>
+        </p:nvSpPr>
+        <p:spPr>
+          <a:xfrm>
+            <a:off x="457200" y="1714218"/>
+            <a:ext cx="590990" cy="369332"/>
+          </a:xfrm>
+          <a:prstGeom prst="rect">
+            <a:avLst/>
+          </a:prstGeom>
+          <a:noFill/>
+        </p:spPr>
+        <p:txBody>
+          <a:bodyPr wrap="none" rtlCol="0">
+            <a:spAutoFit/>
+          </a:bodyPr>
+          <a:lstStyle/>
+          <a:p>
+            <a:r>
+              <a:rPr lang="en-US" dirty="0" smtClean="0"/>
+              <a:t>Occ.</a:t>
+            </a:r>
+            <a:endParaRPr lang="en-US" dirty="0"/>
+          </a:p>
+        </p:txBody>
+      </p:sp>
+      <p:sp>
+        <p:nvSpPr>
+          <p:cNvPr id="54" name="TextBox 53"/>
+          <p:cNvSpPr txBox="1"/>
+          <p:nvPr/>
+        </p:nvSpPr>
+        <p:spPr>
+          <a:xfrm>
+            <a:off x="1751398" y="1714218"/>
+            <a:ext cx="551090" cy="369332"/>
+          </a:xfrm>
+          <a:prstGeom prst="rect">
+            <a:avLst/>
+          </a:prstGeom>
+          <a:noFill/>
+        </p:spPr>
+        <p:txBody>
+          <a:bodyPr wrap="none" rtlCol="0">
+            <a:spAutoFit/>
+          </a:bodyPr>
+          <a:lstStyle/>
+          <a:p>
+            <a:r>
+              <a:rPr lang="en-US" dirty="0" smtClean="0"/>
+              <a:t>info</a:t>
+            </a:r>
+            <a:endParaRPr lang="en-US" dirty="0"/>
+          </a:p>
+        </p:txBody>
+      </p:sp>
+      <p:sp>
+        <p:nvSpPr>
+          <p:cNvPr id="55" name="TextBox 54"/>
+          <p:cNvSpPr txBox="1"/>
+          <p:nvPr/>
+        </p:nvSpPr>
+        <p:spPr>
+          <a:xfrm>
+            <a:off x="3084083" y="1725413"/>
+            <a:ext cx="621985" cy="369332"/>
+          </a:xfrm>
+          <a:prstGeom prst="rect">
+            <a:avLst/>
+          </a:prstGeom>
+          <a:noFill/>
+        </p:spPr>
+        <p:txBody>
+          <a:bodyPr wrap="none" rtlCol="0">
+            <a:spAutoFit/>
+          </a:bodyPr>
+          <a:lstStyle/>
+          <a:p>
+            <a:r>
+              <a:rPr lang="en-US" dirty="0" err="1" smtClean="0"/>
+              <a:t>phys</a:t>
+            </a:r>
+            <a:endParaRPr lang="en-US" dirty="0"/>
+          </a:p>
+        </p:txBody>
+      </p:sp>
+      <p:sp>
+        <p:nvSpPr>
+          <p:cNvPr id="6" name="TextBox 5"/>
+          <p:cNvSpPr txBox="1"/>
+          <p:nvPr/>
+        </p:nvSpPr>
+        <p:spPr>
+          <a:xfrm>
+            <a:off x="1502611" y="6444575"/>
+            <a:ext cx="1096499" cy="369332"/>
+          </a:xfrm>
+          <a:prstGeom prst="rect">
+            <a:avLst/>
+          </a:prstGeom>
+          <a:noFill/>
+        </p:spPr>
+        <p:txBody>
+          <a:bodyPr wrap="none" rtlCol="0">
+            <a:spAutoFit/>
+          </a:bodyPr>
+          <a:lstStyle/>
+          <a:p>
+            <a:r>
+              <a:rPr lang="en-US" dirty="0" smtClean="0"/>
+              <a:t>resources</a:t>
+            </a:r>
+            <a:endParaRPr lang="en-US" dirty="0"/>
+          </a:p>
+        </p:txBody>
+      </p:sp>
+      <p:sp>
+        <p:nvSpPr>
+          <p:cNvPr id="7" name="Left Brace 6"/>
+          <p:cNvSpPr/>
+          <p:nvPr/>
+        </p:nvSpPr>
+        <p:spPr>
+          <a:xfrm rot="16200000">
+            <a:off x="1837204" y="5041639"/>
+            <a:ext cx="484430" cy="2321441"/>
+          </a:xfrm>
+          <a:prstGeom prst="leftBrace">
+            <a:avLst/>
+          </a:prstGeom>
+        </p:spPr>
+        <p:style>
+          <a:lnRef idx="2">
+            <a:schemeClr val="accent1"/>
+          </a:lnRef>
+          <a:fillRef idx="0">
+            <a:schemeClr val="accent1"/>
+          </a:fillRef>
+          <a:effectRef idx="1">
+            <a:schemeClr val="accent1"/>
+          </a:effectRef>
+          <a:fontRef idx="minor">
+            <a:schemeClr val="tx1"/>
+          </a:fontRef>
+        </p:style>
+        <p:txBody>
+          <a:bodyPr rtlCol="0" anchor="ctr"/>
+          <a:lstStyle/>
+          <a:p>
+            <a:pPr algn="ctr"/>
+            <a:endParaRPr lang="en-US"/>
+          </a:p>
+        </p:txBody>
+      </p:sp>
+      <p:sp>
+        <p:nvSpPr>
+          <p:cNvPr id="58" name="TextBox 57"/>
+          <p:cNvSpPr txBox="1"/>
+          <p:nvPr/>
+        </p:nvSpPr>
+        <p:spPr>
+          <a:xfrm>
+            <a:off x="5657718" y="6444574"/>
+            <a:ext cx="648698" cy="369332"/>
+          </a:xfrm>
+          <a:prstGeom prst="rect">
+            <a:avLst/>
+          </a:prstGeom>
+          <a:noFill/>
+        </p:spPr>
+        <p:txBody>
+          <a:bodyPr wrap="none" rtlCol="0">
+            <a:spAutoFit/>
+          </a:bodyPr>
+          <a:lstStyle/>
+          <a:p>
+            <a:r>
+              <a:rPr lang="en-US" dirty="0" smtClean="0"/>
+              <a:t>tools</a:t>
+            </a:r>
+            <a:endParaRPr lang="en-US" dirty="0"/>
+          </a:p>
+        </p:txBody>
+      </p:sp>
+      <p:sp>
+        <p:nvSpPr>
+          <p:cNvPr id="65" name="Left Brace 64"/>
+          <p:cNvSpPr/>
+          <p:nvPr/>
+        </p:nvSpPr>
+        <p:spPr>
+          <a:xfrm rot="16200000">
+            <a:off x="5761385" y="5041638"/>
+            <a:ext cx="484430" cy="2321441"/>
+          </a:xfrm>
+          <a:prstGeom prst="leftBrace">
+            <a:avLst/>
+          </a:prstGeom>
+        </p:spPr>
+        <p:style>
+          <a:lnRef idx="2">
+            <a:schemeClr val="accent1"/>
+          </a:lnRef>
+          <a:fillRef idx="0">
+            <a:schemeClr val="accent1"/>
+          </a:fillRef>
+          <a:effectRef idx="1">
+            <a:schemeClr val="accent1"/>
+          </a:effectRef>
+          <a:fontRef idx="minor">
+            <a:schemeClr val="tx1"/>
+          </a:fontRef>
+        </p:style>
+        <p:txBody>
+          <a:bodyPr rtlCol="0" anchor="ctr"/>
+          <a:lstStyle/>
+          <a:p>
+            <a:pPr algn="ctr"/>
+            <a:endParaRPr lang="en-US"/>
           </a:p>
         </p:txBody>
       </p:sp>

</xml_diff>